<commit_message>
Final preparations for week 4
</commit_message>
<xml_diff>
--- a/docs/lectures/wk4/ML_wk4_Neurale_netwerken.pptx
+++ b/docs/lectures/wk4/ML_wk4_Neurale_netwerken.pptx
@@ -2535,7 +2535,7 @@
           </a:ln>
           <a:extLst>
             <a:ext uri="{C572A759-6A51-4108-AA02-DFA0A04FC94B}">
-              <ma14:wrappingTextBoxFlag xmlns="" xmlns:m="http://schemas.openxmlformats.org/officeDocument/2006/math" xmlns:a14="http://schemas.microsoft.com/office/drawing/2010/main" xmlns:ma14="http://schemas.microsoft.com/office/mac/drawingml/2011/main" val="1"/>
+              <ma14:wrappingTextBoxFlag xmlns:ma14="http://schemas.microsoft.com/office/mac/drawingml/2011/main" xmlns:a14="http://schemas.microsoft.com/office/drawing/2010/main" xmlns:m="http://schemas.openxmlformats.org/officeDocument/2006/math" xmlns="" val="1"/>
             </a:ext>
           </a:extLst>
         </p:spPr>
@@ -2574,7 +2574,7 @@
           </a:ln>
           <a:extLst>
             <a:ext uri="{C572A759-6A51-4108-AA02-DFA0A04FC94B}">
-              <ma14:wrappingTextBoxFlag xmlns="" xmlns:m="http://schemas.openxmlformats.org/officeDocument/2006/math" xmlns:a14="http://schemas.microsoft.com/office/drawing/2010/main" xmlns:ma14="http://schemas.microsoft.com/office/mac/drawingml/2011/main" val="1"/>
+              <ma14:wrappingTextBoxFlag xmlns:ma14="http://schemas.microsoft.com/office/mac/drawingml/2011/main" xmlns:a14="http://schemas.microsoft.com/office/drawing/2010/main" xmlns:m="http://schemas.openxmlformats.org/officeDocument/2006/math" xmlns="" val="1"/>
             </a:ext>
           </a:extLst>
         </p:spPr>
@@ -3448,7 +3448,7 @@
           </a:ln>
           <a:extLst>
             <a:ext uri="{C572A759-6A51-4108-AA02-DFA0A04FC94B}">
-              <ma14:wrappingTextBoxFlag xmlns="" xmlns:m="http://schemas.openxmlformats.org/officeDocument/2006/math" xmlns:a14="http://schemas.microsoft.com/office/drawing/2010/main" xmlns:ma14="http://schemas.microsoft.com/office/mac/drawingml/2011/main" val="1"/>
+              <ma14:wrappingTextBoxFlag xmlns:ma14="http://schemas.microsoft.com/office/mac/drawingml/2011/main" xmlns:a14="http://schemas.microsoft.com/office/drawing/2010/main" xmlns:m="http://schemas.openxmlformats.org/officeDocument/2006/math" xmlns="" val="1"/>
             </a:ext>
           </a:extLst>
         </p:spPr>
@@ -3530,7 +3530,7 @@
           </a:ln>
           <a:extLst>
             <a:ext uri="{C572A759-6A51-4108-AA02-DFA0A04FC94B}">
-              <ma14:wrappingTextBoxFlag xmlns="" xmlns:m="http://schemas.openxmlformats.org/officeDocument/2006/math" xmlns:a14="http://schemas.microsoft.com/office/drawing/2010/main" xmlns:ma14="http://schemas.microsoft.com/office/mac/drawingml/2011/main" val="1"/>
+              <ma14:wrappingTextBoxFlag xmlns:ma14="http://schemas.microsoft.com/office/mac/drawingml/2011/main" xmlns:a14="http://schemas.microsoft.com/office/drawing/2010/main" xmlns:m="http://schemas.openxmlformats.org/officeDocument/2006/math" xmlns="" val="1"/>
             </a:ext>
           </a:extLst>
         </p:spPr>
@@ -3633,7 +3633,7 @@
             <a:effectLst/>
             <a:extLst>
               <a:ext uri="{C572A759-6A51-4108-AA02-DFA0A04FC94B}">
-                <ma14:wrappingTextBoxFlag xmlns="" xmlns:m="http://schemas.openxmlformats.org/officeDocument/2006/math" xmlns:a14="http://schemas.microsoft.com/office/drawing/2010/main" xmlns:ma14="http://schemas.microsoft.com/office/mac/drawingml/2011/main" val="1"/>
+                <ma14:wrappingTextBoxFlag xmlns:ma14="http://schemas.microsoft.com/office/mac/drawingml/2011/main" xmlns:a14="http://schemas.microsoft.com/office/drawing/2010/main" xmlns:m="http://schemas.openxmlformats.org/officeDocument/2006/math" xmlns="" val="1"/>
               </a:ext>
             </a:extLst>
           </p:spPr>
@@ -4036,7 +4036,7 @@
             <a:effectLst/>
             <a:extLst>
               <a:ext uri="{C572A759-6A51-4108-AA02-DFA0A04FC94B}">
-                <ma14:wrappingTextBoxFlag xmlns="" xmlns:m="http://schemas.openxmlformats.org/officeDocument/2006/math" xmlns:a14="http://schemas.microsoft.com/office/drawing/2010/main" xmlns:ma14="http://schemas.microsoft.com/office/mac/drawingml/2011/main" val="1"/>
+                <ma14:wrappingTextBoxFlag xmlns:ma14="http://schemas.microsoft.com/office/mac/drawingml/2011/main" xmlns:a14="http://schemas.microsoft.com/office/drawing/2010/main" xmlns:m="http://schemas.openxmlformats.org/officeDocument/2006/math" xmlns="" val="1"/>
               </a:ext>
             </a:extLst>
           </p:spPr>
@@ -6214,7 +6214,7 @@
             <a:effectLst/>
             <a:extLst>
               <a:ext uri="{C572A759-6A51-4108-AA02-DFA0A04FC94B}">
-                <ma14:wrappingTextBoxFlag xmlns="" xmlns:m="http://schemas.openxmlformats.org/officeDocument/2006/math" xmlns:a14="http://schemas.microsoft.com/office/drawing/2010/main" xmlns:ma14="http://schemas.microsoft.com/office/mac/drawingml/2011/main" val="1"/>
+                <ma14:wrappingTextBoxFlag xmlns:ma14="http://schemas.microsoft.com/office/mac/drawingml/2011/main" xmlns:a14="http://schemas.microsoft.com/office/drawing/2010/main" xmlns:m="http://schemas.openxmlformats.org/officeDocument/2006/math" xmlns="" val="1"/>
               </a:ext>
             </a:extLst>
           </p:spPr>
@@ -6261,7 +6261,7 @@
             <a:effectLst/>
             <a:extLst>
               <a:ext uri="{C572A759-6A51-4108-AA02-DFA0A04FC94B}">
-                <ma14:wrappingTextBoxFlag xmlns="" xmlns:m="http://schemas.openxmlformats.org/officeDocument/2006/math" xmlns:a14="http://schemas.microsoft.com/office/drawing/2010/main" xmlns:ma14="http://schemas.microsoft.com/office/mac/drawingml/2011/main" val="1"/>
+                <ma14:wrappingTextBoxFlag xmlns:ma14="http://schemas.microsoft.com/office/mac/drawingml/2011/main" xmlns:a14="http://schemas.microsoft.com/office/drawing/2010/main" xmlns:m="http://schemas.openxmlformats.org/officeDocument/2006/math" xmlns="" val="1"/>
               </a:ext>
             </a:extLst>
           </p:spPr>
@@ -6308,7 +6308,7 @@
             <a:effectLst/>
             <a:extLst>
               <a:ext uri="{C572A759-6A51-4108-AA02-DFA0A04FC94B}">
-                <ma14:wrappingTextBoxFlag xmlns="" xmlns:m="http://schemas.openxmlformats.org/officeDocument/2006/math" xmlns:a14="http://schemas.microsoft.com/office/drawing/2010/main" xmlns:ma14="http://schemas.microsoft.com/office/mac/drawingml/2011/main" val="1"/>
+                <ma14:wrappingTextBoxFlag xmlns:ma14="http://schemas.microsoft.com/office/mac/drawingml/2011/main" xmlns:a14="http://schemas.microsoft.com/office/drawing/2010/main" xmlns:m="http://schemas.openxmlformats.org/officeDocument/2006/math" xmlns="" val="1"/>
               </a:ext>
             </a:extLst>
           </p:spPr>
@@ -6553,7 +6553,7 @@
             <a:effectLst/>
             <a:extLst>
               <a:ext uri="{C572A759-6A51-4108-AA02-DFA0A04FC94B}">
-                <ma14:wrappingTextBoxFlag xmlns="" xmlns:m="http://schemas.openxmlformats.org/officeDocument/2006/math" xmlns:a14="http://schemas.microsoft.com/office/drawing/2010/main" xmlns:ma14="http://schemas.microsoft.com/office/mac/drawingml/2011/main" val="1"/>
+                <ma14:wrappingTextBoxFlag xmlns:ma14="http://schemas.microsoft.com/office/mac/drawingml/2011/main" xmlns:a14="http://schemas.microsoft.com/office/drawing/2010/main" xmlns:m="http://schemas.openxmlformats.org/officeDocument/2006/math" xmlns="" val="1"/>
               </a:ext>
             </a:extLst>
           </p:spPr>
@@ -6729,7 +6729,7 @@
             <a:effectLst/>
             <a:extLst>
               <a:ext uri="{C572A759-6A51-4108-AA02-DFA0A04FC94B}">
-                <ma14:wrappingTextBoxFlag xmlns="" xmlns:m="http://schemas.openxmlformats.org/officeDocument/2006/math" xmlns:a14="http://schemas.microsoft.com/office/drawing/2010/main" xmlns:ma14="http://schemas.microsoft.com/office/mac/drawingml/2011/main" val="1"/>
+                <ma14:wrappingTextBoxFlag xmlns:ma14="http://schemas.microsoft.com/office/mac/drawingml/2011/main" xmlns:a14="http://schemas.microsoft.com/office/drawing/2010/main" xmlns:m="http://schemas.openxmlformats.org/officeDocument/2006/math" xmlns="" val="1"/>
               </a:ext>
             </a:extLst>
           </p:spPr>
@@ -7949,7 +7949,7 @@
           </a:ln>
           <a:extLst>
             <a:ext uri="{C572A759-6A51-4108-AA02-DFA0A04FC94B}">
-              <ma14:wrappingTextBoxFlag xmlns="" xmlns:m="http://schemas.openxmlformats.org/officeDocument/2006/math" xmlns:a14="http://schemas.microsoft.com/office/drawing/2010/main" xmlns:ma14="http://schemas.microsoft.com/office/mac/drawingml/2011/main" val="1"/>
+              <ma14:wrappingTextBoxFlag xmlns:ma14="http://schemas.microsoft.com/office/mac/drawingml/2011/main" xmlns:a14="http://schemas.microsoft.com/office/drawing/2010/main" xmlns:m="http://schemas.openxmlformats.org/officeDocument/2006/math" xmlns="" val="1"/>
             </a:ext>
           </a:extLst>
         </p:spPr>
@@ -8016,7 +8016,7 @@
           </a:ln>
           <a:extLst>
             <a:ext uri="{C572A759-6A51-4108-AA02-DFA0A04FC94B}">
-              <ma14:wrappingTextBoxFlag xmlns="" xmlns:m="http://schemas.openxmlformats.org/officeDocument/2006/math" xmlns:a14="http://schemas.microsoft.com/office/drawing/2010/main" xmlns:ma14="http://schemas.microsoft.com/office/mac/drawingml/2011/main" val="1"/>
+              <ma14:wrappingTextBoxFlag xmlns:ma14="http://schemas.microsoft.com/office/mac/drawingml/2011/main" xmlns:a14="http://schemas.microsoft.com/office/drawing/2010/main" xmlns:m="http://schemas.openxmlformats.org/officeDocument/2006/math" xmlns="" val="1"/>
             </a:ext>
           </a:extLst>
         </p:spPr>
@@ -8124,7 +8124,7 @@
           </a:ln>
           <a:extLst>
             <a:ext uri="{C572A759-6A51-4108-AA02-DFA0A04FC94B}">
-              <ma14:wrappingTextBoxFlag xmlns="" xmlns:m="http://schemas.openxmlformats.org/officeDocument/2006/math" xmlns:a14="http://schemas.microsoft.com/office/drawing/2010/main" xmlns:ma14="http://schemas.microsoft.com/office/mac/drawingml/2011/main" val="1"/>
+              <ma14:wrappingTextBoxFlag xmlns:ma14="http://schemas.microsoft.com/office/mac/drawingml/2011/main" xmlns:a14="http://schemas.microsoft.com/office/drawing/2010/main" xmlns:m="http://schemas.openxmlformats.org/officeDocument/2006/math" xmlns="" val="1"/>
             </a:ext>
           </a:extLst>
         </p:spPr>
@@ -8180,7 +8180,7 @@
           </a:ln>
           <a:extLst>
             <a:ext uri="{C572A759-6A51-4108-AA02-DFA0A04FC94B}">
-              <ma14:wrappingTextBoxFlag xmlns="" xmlns:m="http://schemas.openxmlformats.org/officeDocument/2006/math" xmlns:a14="http://schemas.microsoft.com/office/drawing/2010/main" xmlns:ma14="http://schemas.microsoft.com/office/mac/drawingml/2011/main" val="1"/>
+              <ma14:wrappingTextBoxFlag xmlns:ma14="http://schemas.microsoft.com/office/mac/drawingml/2011/main" xmlns:a14="http://schemas.microsoft.com/office/drawing/2010/main" xmlns:m="http://schemas.openxmlformats.org/officeDocument/2006/math" xmlns="" val="1"/>
             </a:ext>
           </a:extLst>
         </p:spPr>
@@ -8378,7 +8378,7 @@
           </a:ln>
           <a:extLst>
             <a:ext uri="{C572A759-6A51-4108-AA02-DFA0A04FC94B}">
-              <ma14:wrappingTextBoxFlag xmlns="" xmlns:m="http://schemas.openxmlformats.org/officeDocument/2006/math" xmlns:a14="http://schemas.microsoft.com/office/drawing/2010/main" xmlns:ma14="http://schemas.microsoft.com/office/mac/drawingml/2011/main" val="1"/>
+              <ma14:wrappingTextBoxFlag xmlns:ma14="http://schemas.microsoft.com/office/mac/drawingml/2011/main" xmlns:a14="http://schemas.microsoft.com/office/drawing/2010/main" xmlns:m="http://schemas.openxmlformats.org/officeDocument/2006/math" xmlns="" val="1"/>
             </a:ext>
           </a:extLst>
         </p:spPr>
@@ -8437,7 +8437,7 @@
           </a:ln>
           <a:extLst>
             <a:ext uri="{C572A759-6A51-4108-AA02-DFA0A04FC94B}">
-              <ma14:wrappingTextBoxFlag xmlns="" xmlns:m="http://schemas.openxmlformats.org/officeDocument/2006/math" xmlns:a14="http://schemas.microsoft.com/office/drawing/2010/main" xmlns:ma14="http://schemas.microsoft.com/office/mac/drawingml/2011/main" val="1"/>
+              <ma14:wrappingTextBoxFlag xmlns:ma14="http://schemas.microsoft.com/office/mac/drawingml/2011/main" xmlns:a14="http://schemas.microsoft.com/office/drawing/2010/main" xmlns:m="http://schemas.openxmlformats.org/officeDocument/2006/math" xmlns="" val="1"/>
             </a:ext>
           </a:extLst>
         </p:spPr>
@@ -8482,7 +8482,7 @@
           </a:ln>
           <a:extLst>
             <a:ext uri="{C572A759-6A51-4108-AA02-DFA0A04FC94B}">
-              <ma14:wrappingTextBoxFlag xmlns="" xmlns:m="http://schemas.openxmlformats.org/officeDocument/2006/math" xmlns:a14="http://schemas.microsoft.com/office/drawing/2010/main" xmlns:ma14="http://schemas.microsoft.com/office/mac/drawingml/2011/main" val="1"/>
+              <ma14:wrappingTextBoxFlag xmlns:ma14="http://schemas.microsoft.com/office/mac/drawingml/2011/main" xmlns:a14="http://schemas.microsoft.com/office/drawing/2010/main" xmlns:m="http://schemas.openxmlformats.org/officeDocument/2006/math" xmlns="" val="1"/>
             </a:ext>
           </a:extLst>
         </p:spPr>
@@ -8526,7 +8526,7 @@
           </a:ln>
           <a:extLst>
             <a:ext uri="{C572A759-6A51-4108-AA02-DFA0A04FC94B}">
-              <ma14:wrappingTextBoxFlag xmlns="" xmlns:m="http://schemas.openxmlformats.org/officeDocument/2006/math" xmlns:a14="http://schemas.microsoft.com/office/drawing/2010/main" xmlns:ma14="http://schemas.microsoft.com/office/mac/drawingml/2011/main" val="1"/>
+              <ma14:wrappingTextBoxFlag xmlns:ma14="http://schemas.microsoft.com/office/mac/drawingml/2011/main" xmlns:a14="http://schemas.microsoft.com/office/drawing/2010/main" xmlns:m="http://schemas.openxmlformats.org/officeDocument/2006/math" xmlns="" val="1"/>
             </a:ext>
           </a:extLst>
         </p:spPr>
@@ -8570,7 +8570,7 @@
           </a:ln>
           <a:extLst>
             <a:ext uri="{C572A759-6A51-4108-AA02-DFA0A04FC94B}">
-              <ma14:wrappingTextBoxFlag xmlns="" xmlns:m="http://schemas.openxmlformats.org/officeDocument/2006/math" xmlns:a14="http://schemas.microsoft.com/office/drawing/2010/main" xmlns:ma14="http://schemas.microsoft.com/office/mac/drawingml/2011/main" val="1"/>
+              <ma14:wrappingTextBoxFlag xmlns:ma14="http://schemas.microsoft.com/office/mac/drawingml/2011/main" xmlns:a14="http://schemas.microsoft.com/office/drawing/2010/main" xmlns:m="http://schemas.openxmlformats.org/officeDocument/2006/math" xmlns="" val="1"/>
             </a:ext>
           </a:extLst>
         </p:spPr>
@@ -8614,7 +8614,7 @@
           </a:ln>
           <a:extLst>
             <a:ext uri="{C572A759-6A51-4108-AA02-DFA0A04FC94B}">
-              <ma14:wrappingTextBoxFlag xmlns="" xmlns:m="http://schemas.openxmlformats.org/officeDocument/2006/math" xmlns:a14="http://schemas.microsoft.com/office/drawing/2010/main" xmlns:ma14="http://schemas.microsoft.com/office/mac/drawingml/2011/main" val="1"/>
+              <ma14:wrappingTextBoxFlag xmlns:ma14="http://schemas.microsoft.com/office/mac/drawingml/2011/main" xmlns:a14="http://schemas.microsoft.com/office/drawing/2010/main" xmlns:m="http://schemas.openxmlformats.org/officeDocument/2006/math" xmlns="" val="1"/>
             </a:ext>
           </a:extLst>
         </p:spPr>
@@ -8658,7 +8658,7 @@
           </a:ln>
           <a:extLst>
             <a:ext uri="{C572A759-6A51-4108-AA02-DFA0A04FC94B}">
-              <ma14:wrappingTextBoxFlag xmlns="" xmlns:m="http://schemas.openxmlformats.org/officeDocument/2006/math" xmlns:a14="http://schemas.microsoft.com/office/drawing/2010/main" xmlns:ma14="http://schemas.microsoft.com/office/mac/drawingml/2011/main" val="1"/>
+              <ma14:wrappingTextBoxFlag xmlns:ma14="http://schemas.microsoft.com/office/mac/drawingml/2011/main" xmlns:a14="http://schemas.microsoft.com/office/drawing/2010/main" xmlns:m="http://schemas.openxmlformats.org/officeDocument/2006/math" xmlns="" val="1"/>
             </a:ext>
           </a:extLst>
         </p:spPr>
@@ -8702,7 +8702,7 @@
           </a:ln>
           <a:extLst>
             <a:ext uri="{C572A759-6A51-4108-AA02-DFA0A04FC94B}">
-              <ma14:wrappingTextBoxFlag xmlns="" xmlns:m="http://schemas.openxmlformats.org/officeDocument/2006/math" xmlns:a14="http://schemas.microsoft.com/office/drawing/2010/main" xmlns:ma14="http://schemas.microsoft.com/office/mac/drawingml/2011/main" val="1"/>
+              <ma14:wrappingTextBoxFlag xmlns:ma14="http://schemas.microsoft.com/office/mac/drawingml/2011/main" xmlns:a14="http://schemas.microsoft.com/office/drawing/2010/main" xmlns:m="http://schemas.openxmlformats.org/officeDocument/2006/math" xmlns="" val="1"/>
             </a:ext>
           </a:extLst>
         </p:spPr>
@@ -8746,7 +8746,7 @@
           </a:ln>
           <a:extLst>
             <a:ext uri="{C572A759-6A51-4108-AA02-DFA0A04FC94B}">
-              <ma14:wrappingTextBoxFlag xmlns="" xmlns:m="http://schemas.openxmlformats.org/officeDocument/2006/math" xmlns:a14="http://schemas.microsoft.com/office/drawing/2010/main" xmlns:ma14="http://schemas.microsoft.com/office/mac/drawingml/2011/main" val="1"/>
+              <ma14:wrappingTextBoxFlag xmlns:ma14="http://schemas.microsoft.com/office/mac/drawingml/2011/main" xmlns:a14="http://schemas.microsoft.com/office/drawing/2010/main" xmlns:m="http://schemas.openxmlformats.org/officeDocument/2006/math" xmlns="" val="1"/>
             </a:ext>
           </a:extLst>
         </p:spPr>
@@ -8790,7 +8790,7 @@
           </a:ln>
           <a:extLst>
             <a:ext uri="{C572A759-6A51-4108-AA02-DFA0A04FC94B}">
-              <ma14:wrappingTextBoxFlag xmlns="" xmlns:m="http://schemas.openxmlformats.org/officeDocument/2006/math" xmlns:a14="http://schemas.microsoft.com/office/drawing/2010/main" xmlns:ma14="http://schemas.microsoft.com/office/mac/drawingml/2011/main" val="1"/>
+              <ma14:wrappingTextBoxFlag xmlns:ma14="http://schemas.microsoft.com/office/mac/drawingml/2011/main" xmlns:a14="http://schemas.microsoft.com/office/drawing/2010/main" xmlns:m="http://schemas.openxmlformats.org/officeDocument/2006/math" xmlns="" val="1"/>
             </a:ext>
           </a:extLst>
         </p:spPr>
@@ -8834,7 +8834,7 @@
           </a:ln>
           <a:extLst>
             <a:ext uri="{C572A759-6A51-4108-AA02-DFA0A04FC94B}">
-              <ma14:wrappingTextBoxFlag xmlns="" xmlns:m="http://schemas.openxmlformats.org/officeDocument/2006/math" xmlns:a14="http://schemas.microsoft.com/office/drawing/2010/main" xmlns:ma14="http://schemas.microsoft.com/office/mac/drawingml/2011/main" val="1"/>
+              <ma14:wrappingTextBoxFlag xmlns:ma14="http://schemas.microsoft.com/office/mac/drawingml/2011/main" xmlns:a14="http://schemas.microsoft.com/office/drawing/2010/main" xmlns:m="http://schemas.openxmlformats.org/officeDocument/2006/math" xmlns="" val="1"/>
             </a:ext>
           </a:extLst>
         </p:spPr>
@@ -8878,7 +8878,7 @@
           </a:ln>
           <a:extLst>
             <a:ext uri="{C572A759-6A51-4108-AA02-DFA0A04FC94B}">
-              <ma14:wrappingTextBoxFlag xmlns="" xmlns:m="http://schemas.openxmlformats.org/officeDocument/2006/math" xmlns:a14="http://schemas.microsoft.com/office/drawing/2010/main" xmlns:ma14="http://schemas.microsoft.com/office/mac/drawingml/2011/main" val="1"/>
+              <ma14:wrappingTextBoxFlag xmlns:ma14="http://schemas.microsoft.com/office/mac/drawingml/2011/main" xmlns:a14="http://schemas.microsoft.com/office/drawing/2010/main" xmlns:m="http://schemas.openxmlformats.org/officeDocument/2006/math" xmlns="" val="1"/>
             </a:ext>
           </a:extLst>
         </p:spPr>
@@ -10402,7 +10402,7 @@
             <a:effectLst/>
             <a:extLst>
               <a:ext uri="{C572A759-6A51-4108-AA02-DFA0A04FC94B}">
-                <ma14:wrappingTextBoxFlag xmlns="" xmlns:m="http://schemas.openxmlformats.org/officeDocument/2006/math" xmlns:a14="http://schemas.microsoft.com/office/drawing/2010/main" xmlns:ma14="http://schemas.microsoft.com/office/mac/drawingml/2011/main" val="1"/>
+                <ma14:wrappingTextBoxFlag xmlns:ma14="http://schemas.microsoft.com/office/mac/drawingml/2011/main" xmlns:a14="http://schemas.microsoft.com/office/drawing/2010/main" xmlns:m="http://schemas.openxmlformats.org/officeDocument/2006/math" xmlns="" val="1"/>
               </a:ext>
             </a:extLst>
           </p:spPr>
@@ -10449,7 +10449,7 @@
             <a:effectLst/>
             <a:extLst>
               <a:ext uri="{C572A759-6A51-4108-AA02-DFA0A04FC94B}">
-                <ma14:wrappingTextBoxFlag xmlns="" xmlns:m="http://schemas.openxmlformats.org/officeDocument/2006/math" xmlns:a14="http://schemas.microsoft.com/office/drawing/2010/main" xmlns:ma14="http://schemas.microsoft.com/office/mac/drawingml/2011/main" val="1"/>
+                <ma14:wrappingTextBoxFlag xmlns:ma14="http://schemas.microsoft.com/office/mac/drawingml/2011/main" xmlns:a14="http://schemas.microsoft.com/office/drawing/2010/main" xmlns:m="http://schemas.openxmlformats.org/officeDocument/2006/math" xmlns="" val="1"/>
               </a:ext>
             </a:extLst>
           </p:spPr>
@@ -11756,7 +11756,7 @@
             <a:effectLst/>
             <a:extLst>
               <a:ext uri="{C572A759-6A51-4108-AA02-DFA0A04FC94B}">
-                <ma14:wrappingTextBoxFlag xmlns="" xmlns:m="http://schemas.openxmlformats.org/officeDocument/2006/math" xmlns:a14="http://schemas.microsoft.com/office/drawing/2010/main" xmlns:ma14="http://schemas.microsoft.com/office/mac/drawingml/2011/main" val="1"/>
+                <ma14:wrappingTextBoxFlag xmlns:ma14="http://schemas.microsoft.com/office/mac/drawingml/2011/main" xmlns:a14="http://schemas.microsoft.com/office/drawing/2010/main" xmlns:m="http://schemas.openxmlformats.org/officeDocument/2006/math" xmlns="" val="1"/>
               </a:ext>
             </a:extLst>
           </p:spPr>
@@ -11822,7 +11822,7 @@
             <a:effectLst/>
             <a:extLst>
               <a:ext uri="{C572A759-6A51-4108-AA02-DFA0A04FC94B}">
-                <ma14:wrappingTextBoxFlag xmlns="" xmlns:m="http://schemas.openxmlformats.org/officeDocument/2006/math" xmlns:a14="http://schemas.microsoft.com/office/drawing/2010/main" xmlns:ma14="http://schemas.microsoft.com/office/mac/drawingml/2011/main" val="1"/>
+                <ma14:wrappingTextBoxFlag xmlns:ma14="http://schemas.microsoft.com/office/mac/drawingml/2011/main" xmlns:a14="http://schemas.microsoft.com/office/drawing/2010/main" xmlns:m="http://schemas.openxmlformats.org/officeDocument/2006/math" xmlns="" val="1"/>
               </a:ext>
             </a:extLst>
           </p:spPr>
@@ -11893,7 +11893,7 @@
             <a:effectLst/>
             <a:extLst>
               <a:ext uri="{C572A759-6A51-4108-AA02-DFA0A04FC94B}">
-                <ma14:wrappingTextBoxFlag xmlns="" xmlns:m="http://schemas.openxmlformats.org/officeDocument/2006/math" xmlns:a14="http://schemas.microsoft.com/office/drawing/2010/main" xmlns:ma14="http://schemas.microsoft.com/office/mac/drawingml/2011/main" val="1"/>
+                <ma14:wrappingTextBoxFlag xmlns:ma14="http://schemas.microsoft.com/office/mac/drawingml/2011/main" xmlns:a14="http://schemas.microsoft.com/office/drawing/2010/main" xmlns:m="http://schemas.openxmlformats.org/officeDocument/2006/math" xmlns="" val="1"/>
               </a:ext>
             </a:extLst>
           </p:spPr>
@@ -11961,7 +11961,7 @@
             <a:effectLst/>
             <a:extLst>
               <a:ext uri="{C572A759-6A51-4108-AA02-DFA0A04FC94B}">
-                <ma14:wrappingTextBoxFlag xmlns="" xmlns:m="http://schemas.openxmlformats.org/officeDocument/2006/math" xmlns:a14="http://schemas.microsoft.com/office/drawing/2010/main" xmlns:ma14="http://schemas.microsoft.com/office/mac/drawingml/2011/main" val="1"/>
+                <ma14:wrappingTextBoxFlag xmlns:ma14="http://schemas.microsoft.com/office/mac/drawingml/2011/main" xmlns:a14="http://schemas.microsoft.com/office/drawing/2010/main" xmlns:m="http://schemas.openxmlformats.org/officeDocument/2006/math" xmlns="" val="1"/>
               </a:ext>
             </a:extLst>
           </p:spPr>
@@ -12339,7 +12339,7 @@
           </a:ln>
           <a:extLst>
             <a:ext uri="{C572A759-6A51-4108-AA02-DFA0A04FC94B}">
-              <ma14:wrappingTextBoxFlag xmlns="" xmlns:m="http://schemas.openxmlformats.org/officeDocument/2006/math" xmlns:a14="http://schemas.microsoft.com/office/drawing/2010/main" xmlns:ma14="http://schemas.microsoft.com/office/mac/drawingml/2011/main" val="1"/>
+              <ma14:wrappingTextBoxFlag xmlns:ma14="http://schemas.microsoft.com/office/mac/drawingml/2011/main" xmlns:a14="http://schemas.microsoft.com/office/drawing/2010/main" xmlns:m="http://schemas.openxmlformats.org/officeDocument/2006/math" xmlns="" val="1"/>
             </a:ext>
           </a:extLst>
         </p:spPr>
@@ -12405,7 +12405,7 @@
           </a:ln>
           <a:extLst>
             <a:ext uri="{C572A759-6A51-4108-AA02-DFA0A04FC94B}">
-              <ma14:wrappingTextBoxFlag xmlns="" xmlns:m="http://schemas.openxmlformats.org/officeDocument/2006/math" xmlns:a14="http://schemas.microsoft.com/office/drawing/2010/main" xmlns:ma14="http://schemas.microsoft.com/office/mac/drawingml/2011/main" val="1"/>
+              <ma14:wrappingTextBoxFlag xmlns:ma14="http://schemas.microsoft.com/office/mac/drawingml/2011/main" xmlns:a14="http://schemas.microsoft.com/office/drawing/2010/main" xmlns:m="http://schemas.openxmlformats.org/officeDocument/2006/math" xmlns="" val="1"/>
             </a:ext>
           </a:extLst>
         </p:spPr>
@@ -12666,7 +12666,7 @@
           </a:ln>
           <a:extLst>
             <a:ext uri="{C572A759-6A51-4108-AA02-DFA0A04FC94B}">
-              <ma14:wrappingTextBoxFlag xmlns="" xmlns:m="http://schemas.openxmlformats.org/officeDocument/2006/math" xmlns:a14="http://schemas.microsoft.com/office/drawing/2010/main" xmlns:ma14="http://schemas.microsoft.com/office/mac/drawingml/2011/main" val="1"/>
+              <ma14:wrappingTextBoxFlag xmlns:ma14="http://schemas.microsoft.com/office/mac/drawingml/2011/main" xmlns:a14="http://schemas.microsoft.com/office/drawing/2010/main" xmlns:m="http://schemas.openxmlformats.org/officeDocument/2006/math" xmlns="" val="1"/>
             </a:ext>
           </a:extLst>
         </p:spPr>
@@ -12725,7 +12725,7 @@
           </a:ln>
           <a:extLst>
             <a:ext uri="{C572A759-6A51-4108-AA02-DFA0A04FC94B}">
-              <ma14:wrappingTextBoxFlag xmlns="" xmlns:m="http://schemas.openxmlformats.org/officeDocument/2006/math" xmlns:a14="http://schemas.microsoft.com/office/drawing/2010/main" xmlns:ma14="http://schemas.microsoft.com/office/mac/drawingml/2011/main" val="1"/>
+              <ma14:wrappingTextBoxFlag xmlns:ma14="http://schemas.microsoft.com/office/mac/drawingml/2011/main" xmlns:a14="http://schemas.microsoft.com/office/drawing/2010/main" xmlns:m="http://schemas.openxmlformats.org/officeDocument/2006/math" xmlns="" val="1"/>
             </a:ext>
           </a:extLst>
         </p:spPr>
@@ -12791,7 +12791,7 @@
           </a:ln>
           <a:extLst>
             <a:ext uri="{C572A759-6A51-4108-AA02-DFA0A04FC94B}">
-              <ma14:wrappingTextBoxFlag xmlns="" xmlns:m="http://schemas.openxmlformats.org/officeDocument/2006/math" xmlns:a14="http://schemas.microsoft.com/office/drawing/2010/main" xmlns:ma14="http://schemas.microsoft.com/office/mac/drawingml/2011/main" val="1"/>
+              <ma14:wrappingTextBoxFlag xmlns:ma14="http://schemas.microsoft.com/office/mac/drawingml/2011/main" xmlns:a14="http://schemas.microsoft.com/office/drawing/2010/main" xmlns:m="http://schemas.openxmlformats.org/officeDocument/2006/math" xmlns="" val="1"/>
             </a:ext>
           </a:extLst>
         </p:spPr>
@@ -13270,7 +13270,7 @@
           </a:ln>
           <a:extLst>
             <a:ext uri="{C572A759-6A51-4108-AA02-DFA0A04FC94B}">
-              <ma14:wrappingTextBoxFlag xmlns="" xmlns:m="http://schemas.openxmlformats.org/officeDocument/2006/math" xmlns:a14="http://schemas.microsoft.com/office/drawing/2010/main" xmlns:ma14="http://schemas.microsoft.com/office/mac/drawingml/2011/main" val="1"/>
+              <ma14:wrappingTextBoxFlag xmlns:ma14="http://schemas.microsoft.com/office/mac/drawingml/2011/main" xmlns:a14="http://schemas.microsoft.com/office/drawing/2010/main" xmlns:m="http://schemas.openxmlformats.org/officeDocument/2006/math" xmlns="" val="1"/>
             </a:ext>
           </a:extLst>
         </p:spPr>
@@ -13421,7 +13421,7 @@
               </a:ln>
               <a:extLst>
                 <a:ext uri="{C572A759-6A51-4108-AA02-DFA0A04FC94B}">
-                  <ma14:wrappingTextBoxFlag xmlns="" xmlns:m="http://schemas.openxmlformats.org/officeDocument/2006/math" xmlns:ma14="http://schemas.microsoft.com/office/mac/drawingml/2011/main" val="1"/>
+                  <ma14:wrappingTextBoxFlag xmlns:ma14="http://schemas.microsoft.com/office/mac/drawingml/2011/main" xmlns:m="http://schemas.openxmlformats.org/officeDocument/2006/math" xmlns="" val="1"/>
                 </a:ext>
               </a:extLst>
             </p:spPr>
@@ -14173,7 +14173,7 @@
               </a:ln>
               <a:extLst>
                 <a:ext uri="{C572A759-6A51-4108-AA02-DFA0A04FC94B}">
-                  <ma14:wrappingTextBoxFlag xmlns="" xmlns:m="http://schemas.openxmlformats.org/officeDocument/2006/math" xmlns:ma14="http://schemas.microsoft.com/office/mac/drawingml/2011/main" val="1"/>
+                  <ma14:wrappingTextBoxFlag xmlns:ma14="http://schemas.microsoft.com/office/mac/drawingml/2011/main" xmlns:m="http://schemas.openxmlformats.org/officeDocument/2006/math" xmlns="" val="1"/>
                 </a:ext>
               </a:extLst>
             </p:spPr>
@@ -14294,7 +14294,7 @@
               </a:ln>
               <a:extLst>
                 <a:ext uri="{C572A759-6A51-4108-AA02-DFA0A04FC94B}">
-                  <ma14:wrappingTextBoxFlag xmlns="" xmlns:m="http://schemas.openxmlformats.org/officeDocument/2006/math" xmlns:ma14="http://schemas.microsoft.com/office/mac/drawingml/2011/main" val="1"/>
+                  <ma14:wrappingTextBoxFlag xmlns:ma14="http://schemas.microsoft.com/office/mac/drawingml/2011/main" xmlns:m="http://schemas.openxmlformats.org/officeDocument/2006/math" xmlns="" val="1"/>
                 </a:ext>
               </a:extLst>
             </p:spPr>
@@ -14415,7 +14415,7 @@
               </a:ln>
               <a:extLst>
                 <a:ext uri="{C572A759-6A51-4108-AA02-DFA0A04FC94B}">
-                  <ma14:wrappingTextBoxFlag xmlns="" xmlns:m="http://schemas.openxmlformats.org/officeDocument/2006/math" xmlns:ma14="http://schemas.microsoft.com/office/mac/drawingml/2011/main" val="1"/>
+                  <ma14:wrappingTextBoxFlag xmlns:ma14="http://schemas.microsoft.com/office/mac/drawingml/2011/main" xmlns:m="http://schemas.openxmlformats.org/officeDocument/2006/math" xmlns="" val="1"/>
                 </a:ext>
               </a:extLst>
             </p:spPr>
@@ -14528,7 +14528,7 @@
           </a:ln>
           <a:extLst>
             <a:ext uri="{C572A759-6A51-4108-AA02-DFA0A04FC94B}">
-              <ma14:wrappingTextBoxFlag xmlns="" xmlns:m="http://schemas.openxmlformats.org/officeDocument/2006/math" xmlns:a14="http://schemas.microsoft.com/office/drawing/2010/main" xmlns:ma14="http://schemas.microsoft.com/office/mac/drawingml/2011/main" val="1"/>
+              <ma14:wrappingTextBoxFlag xmlns:ma14="http://schemas.microsoft.com/office/mac/drawingml/2011/main" xmlns:a14="http://schemas.microsoft.com/office/drawing/2010/main" xmlns:m="http://schemas.openxmlformats.org/officeDocument/2006/math" xmlns="" val="1"/>
             </a:ext>
           </a:extLst>
         </p:spPr>
@@ -14955,7 +14955,7 @@
                 <a:effectLst/>
                 <a:extLst>
                   <a:ext uri="{C572A759-6A51-4108-AA02-DFA0A04FC94B}">
-                    <ma14:wrappingTextBoxFlag xmlns="" xmlns:m="http://schemas.openxmlformats.org/officeDocument/2006/math" xmlns:ma14="http://schemas.microsoft.com/office/mac/drawingml/2011/main" val="1"/>
+                    <ma14:wrappingTextBoxFlag xmlns:ma14="http://schemas.microsoft.com/office/mac/drawingml/2011/main" xmlns:m="http://schemas.openxmlformats.org/officeDocument/2006/math" xmlns="" val="1"/>
                   </a:ext>
                 </a:extLst>
               </p:spPr>
@@ -15894,7 +15894,7 @@
                 <a:effectLst/>
                 <a:extLst>
                   <a:ext uri="{C572A759-6A51-4108-AA02-DFA0A04FC94B}">
-                    <ma14:wrappingTextBoxFlag xmlns="" xmlns:m="http://schemas.openxmlformats.org/officeDocument/2006/math" xmlns:ma14="http://schemas.microsoft.com/office/mac/drawingml/2011/main" val="1"/>
+                    <ma14:wrappingTextBoxFlag xmlns:ma14="http://schemas.microsoft.com/office/mac/drawingml/2011/main" xmlns:m="http://schemas.openxmlformats.org/officeDocument/2006/math" xmlns="" val="1"/>
                   </a:ext>
                 </a:extLst>
               </p:spPr>
@@ -16021,7 +16021,7 @@
                 <a:effectLst/>
                 <a:extLst>
                   <a:ext uri="{C572A759-6A51-4108-AA02-DFA0A04FC94B}">
-                    <ma14:wrappingTextBoxFlag xmlns="" xmlns:m="http://schemas.openxmlformats.org/officeDocument/2006/math" xmlns:ma14="http://schemas.microsoft.com/office/mac/drawingml/2011/main" val="1"/>
+                    <ma14:wrappingTextBoxFlag xmlns:ma14="http://schemas.microsoft.com/office/mac/drawingml/2011/main" xmlns:m="http://schemas.openxmlformats.org/officeDocument/2006/math" xmlns="" val="1"/>
                   </a:ext>
                 </a:extLst>
               </p:spPr>
@@ -16148,7 +16148,7 @@
                 <a:effectLst/>
                 <a:extLst>
                   <a:ext uri="{C572A759-6A51-4108-AA02-DFA0A04FC94B}">
-                    <ma14:wrappingTextBoxFlag xmlns="" xmlns:m="http://schemas.openxmlformats.org/officeDocument/2006/math" xmlns:ma14="http://schemas.microsoft.com/office/mac/drawingml/2011/main" val="1"/>
+                    <ma14:wrappingTextBoxFlag xmlns:ma14="http://schemas.microsoft.com/office/mac/drawingml/2011/main" xmlns:m="http://schemas.openxmlformats.org/officeDocument/2006/math" xmlns="" val="1"/>
                   </a:ext>
                 </a:extLst>
               </p:spPr>
@@ -16266,7 +16266,7 @@
           </a:ln>
           <a:extLst>
             <a:ext uri="{C572A759-6A51-4108-AA02-DFA0A04FC94B}">
-              <ma14:wrappingTextBoxFlag xmlns="" xmlns:m="http://schemas.openxmlformats.org/officeDocument/2006/math" xmlns:a14="http://schemas.microsoft.com/office/drawing/2010/main" xmlns:ma14="http://schemas.microsoft.com/office/mac/drawingml/2011/main" val="1"/>
+              <ma14:wrappingTextBoxFlag xmlns:ma14="http://schemas.microsoft.com/office/mac/drawingml/2011/main" xmlns:a14="http://schemas.microsoft.com/office/drawing/2010/main" xmlns:m="http://schemas.openxmlformats.org/officeDocument/2006/math" xmlns="" val="1"/>
             </a:ext>
           </a:extLst>
         </p:spPr>
@@ -16366,7 +16366,7 @@
           </a:ln>
           <a:extLst>
             <a:ext uri="{C572A759-6A51-4108-AA02-DFA0A04FC94B}">
-              <ma14:wrappingTextBoxFlag xmlns="" xmlns:m="http://schemas.openxmlformats.org/officeDocument/2006/math" xmlns:a14="http://schemas.microsoft.com/office/drawing/2010/main" xmlns:ma14="http://schemas.microsoft.com/office/mac/drawingml/2011/main" val="1"/>
+              <ma14:wrappingTextBoxFlag xmlns:ma14="http://schemas.microsoft.com/office/mac/drawingml/2011/main" xmlns:a14="http://schemas.microsoft.com/office/drawing/2010/main" xmlns:m="http://schemas.openxmlformats.org/officeDocument/2006/math" xmlns="" val="1"/>
             </a:ext>
           </a:extLst>
         </p:spPr>
@@ -16901,7 +16901,7 @@
                 <a:effectLst/>
                 <a:extLst>
                   <a:ext uri="{C572A759-6A51-4108-AA02-DFA0A04FC94B}">
-                    <ma14:wrappingTextBoxFlag xmlns="" xmlns:m="http://schemas.openxmlformats.org/officeDocument/2006/math" xmlns:ma14="http://schemas.microsoft.com/office/mac/drawingml/2011/main" val="1"/>
+                    <ma14:wrappingTextBoxFlag xmlns:ma14="http://schemas.microsoft.com/office/mac/drawingml/2011/main" xmlns:m="http://schemas.openxmlformats.org/officeDocument/2006/math" xmlns="" val="1"/>
                   </a:ext>
                 </a:extLst>
               </p:spPr>
@@ -18677,7 +18677,7 @@
                 <a:effectLst/>
                 <a:extLst>
                   <a:ext uri="{C572A759-6A51-4108-AA02-DFA0A04FC94B}">
-                    <ma14:wrappingTextBoxFlag xmlns="" xmlns:m="http://schemas.openxmlformats.org/officeDocument/2006/math" xmlns:ma14="http://schemas.microsoft.com/office/mac/drawingml/2011/main" val="1"/>
+                    <ma14:wrappingTextBoxFlag xmlns:ma14="http://schemas.microsoft.com/office/mac/drawingml/2011/main" xmlns:m="http://schemas.openxmlformats.org/officeDocument/2006/math" xmlns="" val="1"/>
                   </a:ext>
                 </a:extLst>
               </p:spPr>
@@ -18804,7 +18804,7 @@
                 <a:effectLst/>
                 <a:extLst>
                   <a:ext uri="{C572A759-6A51-4108-AA02-DFA0A04FC94B}">
-                    <ma14:wrappingTextBoxFlag xmlns="" xmlns:m="http://schemas.openxmlformats.org/officeDocument/2006/math" xmlns:ma14="http://schemas.microsoft.com/office/mac/drawingml/2011/main" val="1"/>
+                    <ma14:wrappingTextBoxFlag xmlns:ma14="http://schemas.microsoft.com/office/mac/drawingml/2011/main" xmlns:m="http://schemas.openxmlformats.org/officeDocument/2006/math" xmlns="" val="1"/>
                   </a:ext>
                 </a:extLst>
               </p:spPr>
@@ -18931,7 +18931,7 @@
                 <a:effectLst/>
                 <a:extLst>
                   <a:ext uri="{C572A759-6A51-4108-AA02-DFA0A04FC94B}">
-                    <ma14:wrappingTextBoxFlag xmlns="" xmlns:m="http://schemas.openxmlformats.org/officeDocument/2006/math" xmlns:ma14="http://schemas.microsoft.com/office/mac/drawingml/2011/main" val="1"/>
+                    <ma14:wrappingTextBoxFlag xmlns:ma14="http://schemas.microsoft.com/office/mac/drawingml/2011/main" xmlns:m="http://schemas.openxmlformats.org/officeDocument/2006/math" xmlns="" val="1"/>
                   </a:ext>
                 </a:extLst>
               </p:spPr>
@@ -19075,7 +19075,7 @@
           </a:ln>
           <a:extLst>
             <a:ext uri="{C572A759-6A51-4108-AA02-DFA0A04FC94B}">
-              <ma14:wrappingTextBoxFlag xmlns="" xmlns:m="http://schemas.openxmlformats.org/officeDocument/2006/math" xmlns:a14="http://schemas.microsoft.com/office/drawing/2010/main" xmlns:ma14="http://schemas.microsoft.com/office/mac/drawingml/2011/main" val="1"/>
+              <ma14:wrappingTextBoxFlag xmlns:ma14="http://schemas.microsoft.com/office/mac/drawingml/2011/main" xmlns:a14="http://schemas.microsoft.com/office/drawing/2010/main" xmlns:m="http://schemas.openxmlformats.org/officeDocument/2006/math" xmlns="" val="1"/>
             </a:ext>
           </a:extLst>
         </p:spPr>
@@ -20743,7 +20743,7 @@
           </a:ln>
           <a:extLst>
             <a:ext uri="{C572A759-6A51-4108-AA02-DFA0A04FC94B}">
-              <ma14:wrappingTextBoxFlag xmlns="" xmlns:m="http://schemas.openxmlformats.org/officeDocument/2006/math" xmlns:a14="http://schemas.microsoft.com/office/drawing/2010/main" xmlns:ma14="http://schemas.microsoft.com/office/mac/drawingml/2011/main" val="1"/>
+              <ma14:wrappingTextBoxFlag xmlns:ma14="http://schemas.microsoft.com/office/mac/drawingml/2011/main" xmlns:a14="http://schemas.microsoft.com/office/drawing/2010/main" xmlns:m="http://schemas.openxmlformats.org/officeDocument/2006/math" xmlns="" val="1"/>
             </a:ext>
           </a:extLst>
         </p:spPr>
@@ -20830,7 +20830,7 @@
           </a:ln>
           <a:extLst>
             <a:ext uri="{C572A759-6A51-4108-AA02-DFA0A04FC94B}">
-              <ma14:wrappingTextBoxFlag xmlns="" xmlns:m="http://schemas.openxmlformats.org/officeDocument/2006/math" xmlns:a14="http://schemas.microsoft.com/office/drawing/2010/main" xmlns:ma14="http://schemas.microsoft.com/office/mac/drawingml/2011/main" val="1"/>
+              <ma14:wrappingTextBoxFlag xmlns:ma14="http://schemas.microsoft.com/office/mac/drawingml/2011/main" xmlns:a14="http://schemas.microsoft.com/office/drawing/2010/main" xmlns:m="http://schemas.openxmlformats.org/officeDocument/2006/math" xmlns="" val="1"/>
             </a:ext>
           </a:extLst>
         </p:spPr>
@@ -20893,7 +20893,7 @@
           </a:ln>
           <a:extLst>
             <a:ext uri="{C572A759-6A51-4108-AA02-DFA0A04FC94B}">
-              <ma14:wrappingTextBoxFlag xmlns="" xmlns:m="http://schemas.openxmlformats.org/officeDocument/2006/math" xmlns:a14="http://schemas.microsoft.com/office/drawing/2010/main" xmlns:ma14="http://schemas.microsoft.com/office/mac/drawingml/2011/main" val="1"/>
+              <ma14:wrappingTextBoxFlag xmlns:ma14="http://schemas.microsoft.com/office/mac/drawingml/2011/main" xmlns:a14="http://schemas.microsoft.com/office/drawing/2010/main" xmlns:m="http://schemas.openxmlformats.org/officeDocument/2006/math" xmlns="" val="1"/>
             </a:ext>
           </a:extLst>
         </p:spPr>
@@ -20957,7 +20957,7 @@
           </a:ln>
           <a:extLst>
             <a:ext uri="{C572A759-6A51-4108-AA02-DFA0A04FC94B}">
-              <ma14:wrappingTextBoxFlag xmlns="" xmlns:m="http://schemas.openxmlformats.org/officeDocument/2006/math" xmlns:a14="http://schemas.microsoft.com/office/drawing/2010/main" xmlns:ma14="http://schemas.microsoft.com/office/mac/drawingml/2011/main" val="1"/>
+              <ma14:wrappingTextBoxFlag xmlns:ma14="http://schemas.microsoft.com/office/mac/drawingml/2011/main" xmlns:a14="http://schemas.microsoft.com/office/drawing/2010/main" xmlns:m="http://schemas.openxmlformats.org/officeDocument/2006/math" xmlns="" val="1"/>
             </a:ext>
           </a:extLst>
         </p:spPr>
@@ -24359,7 +24359,7 @@
           </a:ln>
           <a:extLst>
             <a:ext uri="{C572A759-6A51-4108-AA02-DFA0A04FC94B}">
-              <ma14:wrappingTextBoxFlag xmlns="" xmlns:m="http://schemas.openxmlformats.org/officeDocument/2006/math" xmlns:a14="http://schemas.microsoft.com/office/drawing/2010/main" xmlns:ma14="http://schemas.microsoft.com/office/mac/drawingml/2011/main" val="1"/>
+              <ma14:wrappingTextBoxFlag xmlns:ma14="http://schemas.microsoft.com/office/mac/drawingml/2011/main" xmlns:a14="http://schemas.microsoft.com/office/drawing/2010/main" xmlns:m="http://schemas.openxmlformats.org/officeDocument/2006/math" xmlns="" val="1"/>
             </a:ext>
           </a:extLst>
         </p:spPr>
@@ -24425,7 +24425,7 @@
           </a:ln>
           <a:extLst>
             <a:ext uri="{C572A759-6A51-4108-AA02-DFA0A04FC94B}">
-              <ma14:wrappingTextBoxFlag xmlns="" xmlns:m="http://schemas.openxmlformats.org/officeDocument/2006/math" xmlns:a14="http://schemas.microsoft.com/office/drawing/2010/main" xmlns:ma14="http://schemas.microsoft.com/office/mac/drawingml/2011/main" val="1"/>
+              <ma14:wrappingTextBoxFlag xmlns:ma14="http://schemas.microsoft.com/office/mac/drawingml/2011/main" xmlns:a14="http://schemas.microsoft.com/office/drawing/2010/main" xmlns:m="http://schemas.openxmlformats.org/officeDocument/2006/math" xmlns="" val="1"/>
             </a:ext>
           </a:extLst>
         </p:spPr>
@@ -24686,7 +24686,7 @@
           </a:ln>
           <a:extLst>
             <a:ext uri="{C572A759-6A51-4108-AA02-DFA0A04FC94B}">
-              <ma14:wrappingTextBoxFlag xmlns="" xmlns:m="http://schemas.openxmlformats.org/officeDocument/2006/math" xmlns:a14="http://schemas.microsoft.com/office/drawing/2010/main" xmlns:ma14="http://schemas.microsoft.com/office/mac/drawingml/2011/main" val="1"/>
+              <ma14:wrappingTextBoxFlag xmlns:ma14="http://schemas.microsoft.com/office/mac/drawingml/2011/main" xmlns:a14="http://schemas.microsoft.com/office/drawing/2010/main" xmlns:m="http://schemas.openxmlformats.org/officeDocument/2006/math" xmlns="" val="1"/>
             </a:ext>
           </a:extLst>
         </p:spPr>
@@ -24745,7 +24745,7 @@
           </a:ln>
           <a:extLst>
             <a:ext uri="{C572A759-6A51-4108-AA02-DFA0A04FC94B}">
-              <ma14:wrappingTextBoxFlag xmlns="" xmlns:m="http://schemas.openxmlformats.org/officeDocument/2006/math" xmlns:a14="http://schemas.microsoft.com/office/drawing/2010/main" xmlns:ma14="http://schemas.microsoft.com/office/mac/drawingml/2011/main" val="1"/>
+              <ma14:wrappingTextBoxFlag xmlns:ma14="http://schemas.microsoft.com/office/mac/drawingml/2011/main" xmlns:a14="http://schemas.microsoft.com/office/drawing/2010/main" xmlns:m="http://schemas.openxmlformats.org/officeDocument/2006/math" xmlns="" val="1"/>
             </a:ext>
           </a:extLst>
         </p:spPr>
@@ -24811,7 +24811,7 @@
           </a:ln>
           <a:extLst>
             <a:ext uri="{C572A759-6A51-4108-AA02-DFA0A04FC94B}">
-              <ma14:wrappingTextBoxFlag xmlns="" xmlns:m="http://schemas.openxmlformats.org/officeDocument/2006/math" xmlns:a14="http://schemas.microsoft.com/office/drawing/2010/main" xmlns:ma14="http://schemas.microsoft.com/office/mac/drawingml/2011/main" val="1"/>
+              <ma14:wrappingTextBoxFlag xmlns:ma14="http://schemas.microsoft.com/office/mac/drawingml/2011/main" xmlns:a14="http://schemas.microsoft.com/office/drawing/2010/main" xmlns:m="http://schemas.openxmlformats.org/officeDocument/2006/math" xmlns="" val="1"/>
             </a:ext>
           </a:extLst>
         </p:spPr>
@@ -25290,7 +25290,7 @@
           </a:ln>
           <a:extLst>
             <a:ext uri="{C572A759-6A51-4108-AA02-DFA0A04FC94B}">
-              <ma14:wrappingTextBoxFlag xmlns="" xmlns:m="http://schemas.openxmlformats.org/officeDocument/2006/math" xmlns:a14="http://schemas.microsoft.com/office/drawing/2010/main" xmlns:ma14="http://schemas.microsoft.com/office/mac/drawingml/2011/main" val="1"/>
+              <ma14:wrappingTextBoxFlag xmlns:ma14="http://schemas.microsoft.com/office/mac/drawingml/2011/main" xmlns:a14="http://schemas.microsoft.com/office/drawing/2010/main" xmlns:m="http://schemas.openxmlformats.org/officeDocument/2006/math" xmlns="" val="1"/>
             </a:ext>
           </a:extLst>
         </p:spPr>
@@ -25334,7 +25334,7 @@
           </a:ln>
           <a:extLst>
             <a:ext uri="{C572A759-6A51-4108-AA02-DFA0A04FC94B}">
-              <ma14:wrappingTextBoxFlag xmlns="" xmlns:m="http://schemas.openxmlformats.org/officeDocument/2006/math" xmlns:a14="http://schemas.microsoft.com/office/drawing/2010/main" xmlns:ma14="http://schemas.microsoft.com/office/mac/drawingml/2011/main" val="1"/>
+              <ma14:wrappingTextBoxFlag xmlns:ma14="http://schemas.microsoft.com/office/mac/drawingml/2011/main" xmlns:a14="http://schemas.microsoft.com/office/drawing/2010/main" xmlns:m="http://schemas.openxmlformats.org/officeDocument/2006/math" xmlns="" val="1"/>
             </a:ext>
           </a:extLst>
         </p:spPr>
@@ -26197,7 +26197,7 @@
           </a:ln>
           <a:extLst>
             <a:ext uri="{C572A759-6A51-4108-AA02-DFA0A04FC94B}">
-              <ma14:wrappingTextBoxFlag xmlns="" xmlns:m="http://schemas.openxmlformats.org/officeDocument/2006/math" xmlns:a14="http://schemas.microsoft.com/office/drawing/2010/main" xmlns:ma14="http://schemas.microsoft.com/office/mac/drawingml/2011/main" val="1"/>
+              <ma14:wrappingTextBoxFlag xmlns:ma14="http://schemas.microsoft.com/office/mac/drawingml/2011/main" xmlns:a14="http://schemas.microsoft.com/office/drawing/2010/main" xmlns:m="http://schemas.openxmlformats.org/officeDocument/2006/math" xmlns="" val="1"/>
             </a:ext>
           </a:extLst>
         </p:spPr>
@@ -26259,7 +26259,7 @@
           </a:ln>
           <a:extLst>
             <a:ext uri="{C572A759-6A51-4108-AA02-DFA0A04FC94B}">
-              <ma14:wrappingTextBoxFlag xmlns="" xmlns:m="http://schemas.openxmlformats.org/officeDocument/2006/math" xmlns:a14="http://schemas.microsoft.com/office/drawing/2010/main" xmlns:ma14="http://schemas.microsoft.com/office/mac/drawingml/2011/main" val="1"/>
+              <ma14:wrappingTextBoxFlag xmlns:ma14="http://schemas.microsoft.com/office/mac/drawingml/2011/main" xmlns:a14="http://schemas.microsoft.com/office/drawing/2010/main" xmlns:m="http://schemas.openxmlformats.org/officeDocument/2006/math" xmlns="" val="1"/>
             </a:ext>
           </a:extLst>
         </p:spPr>
@@ -26326,7 +26326,7 @@
           </a:ln>
           <a:extLst>
             <a:ext uri="{C572A759-6A51-4108-AA02-DFA0A04FC94B}">
-              <ma14:wrappingTextBoxFlag xmlns="" xmlns:m="http://schemas.openxmlformats.org/officeDocument/2006/math" xmlns:a14="http://schemas.microsoft.com/office/drawing/2010/main" xmlns:ma14="http://schemas.microsoft.com/office/mac/drawingml/2011/main" val="1"/>
+              <ma14:wrappingTextBoxFlag xmlns:ma14="http://schemas.microsoft.com/office/mac/drawingml/2011/main" xmlns:a14="http://schemas.microsoft.com/office/drawing/2010/main" xmlns:m="http://schemas.openxmlformats.org/officeDocument/2006/math" xmlns="" val="1"/>
             </a:ext>
           </a:extLst>
         </p:spPr>
@@ -26390,7 +26390,7 @@
           </a:ln>
           <a:extLst>
             <a:ext uri="{C572A759-6A51-4108-AA02-DFA0A04FC94B}">
-              <ma14:wrappingTextBoxFlag xmlns="" xmlns:m="http://schemas.openxmlformats.org/officeDocument/2006/math" xmlns:a14="http://schemas.microsoft.com/office/drawing/2010/main" xmlns:ma14="http://schemas.microsoft.com/office/mac/drawingml/2011/main" val="1"/>
+              <ma14:wrappingTextBoxFlag xmlns:ma14="http://schemas.microsoft.com/office/mac/drawingml/2011/main" xmlns:a14="http://schemas.microsoft.com/office/drawing/2010/main" xmlns:m="http://schemas.openxmlformats.org/officeDocument/2006/math" xmlns="" val="1"/>
             </a:ext>
           </a:extLst>
         </p:spPr>
@@ -27694,7 +27694,7 @@
           </a:ln>
           <a:extLst>
             <a:ext uri="{C572A759-6A51-4108-AA02-DFA0A04FC94B}">
-              <ma14:wrappingTextBoxFlag xmlns="" xmlns:m="http://schemas.openxmlformats.org/officeDocument/2006/math" xmlns:a14="http://schemas.microsoft.com/office/drawing/2010/main" xmlns:ma14="http://schemas.microsoft.com/office/mac/drawingml/2011/main" val="1"/>
+              <ma14:wrappingTextBoxFlag xmlns:ma14="http://schemas.microsoft.com/office/mac/drawingml/2011/main" xmlns:a14="http://schemas.microsoft.com/office/drawing/2010/main" xmlns:m="http://schemas.openxmlformats.org/officeDocument/2006/math" xmlns="" val="1"/>
             </a:ext>
           </a:extLst>
         </p:spPr>
@@ -28795,8 +28795,8 @@
           </p:sp>
         </mc:Fallback>
       </mc:AlternateContent>
-      <mc:AlternateContent xmlns:mc="http://schemas.openxmlformats.org/markup-compatibility/2006">
-        <mc:Choice xmlns:a14="http://schemas.microsoft.com/office/drawing/2010/main" Requires="a14">
+      <mc:AlternateContent xmlns:mc="http://schemas.openxmlformats.org/markup-compatibility/2006" xmlns:a14="http://schemas.microsoft.com/office/drawing/2010/main">
+        <mc:Choice Requires="a14">
           <p:sp>
             <p:nvSpPr>
               <p:cNvPr id="2" name="Vergelijking">
@@ -28977,7 +28977,7 @@
             </p:txBody>
           </p:sp>
         </mc:Choice>
-        <mc:Fallback>
+        <mc:Fallback xmlns="">
           <p:sp>
             <p:nvSpPr>
               <p:cNvPr id="2" name="Vergelijking">
@@ -29233,7 +29233,7 @@
           </a:ln>
           <a:extLst>
             <a:ext uri="{C572A759-6A51-4108-AA02-DFA0A04FC94B}">
-              <ma14:wrappingTextBoxFlag xmlns="" xmlns:m="http://schemas.openxmlformats.org/officeDocument/2006/math" xmlns:a14="http://schemas.microsoft.com/office/drawing/2010/main" xmlns:ma14="http://schemas.microsoft.com/office/mac/drawingml/2011/main" val="1"/>
+              <ma14:wrappingTextBoxFlag xmlns:ma14="http://schemas.microsoft.com/office/mac/drawingml/2011/main" xmlns:a14="http://schemas.microsoft.com/office/drawing/2010/main" xmlns:m="http://schemas.openxmlformats.org/officeDocument/2006/math" xmlns="" val="1"/>
             </a:ext>
           </a:extLst>
         </p:spPr>
@@ -29338,7 +29338,7 @@
             <a:effectLst/>
             <a:extLst>
               <a:ext uri="{C572A759-6A51-4108-AA02-DFA0A04FC94B}">
-                <ma14:wrappingTextBoxFlag xmlns="" xmlns:m="http://schemas.openxmlformats.org/officeDocument/2006/math" xmlns:a14="http://schemas.microsoft.com/office/drawing/2010/main" xmlns:ma14="http://schemas.microsoft.com/office/mac/drawingml/2011/main" val="1"/>
+                <ma14:wrappingTextBoxFlag xmlns:ma14="http://schemas.microsoft.com/office/mac/drawingml/2011/main" xmlns:a14="http://schemas.microsoft.com/office/drawing/2010/main" xmlns:m="http://schemas.openxmlformats.org/officeDocument/2006/math" xmlns="" val="1"/>
               </a:ext>
             </a:extLst>
           </p:spPr>
@@ -29405,7 +29405,7 @@
             <a:effectLst/>
             <a:extLst>
               <a:ext uri="{C572A759-6A51-4108-AA02-DFA0A04FC94B}">
-                <ma14:wrappingTextBoxFlag xmlns="" xmlns:m="http://schemas.openxmlformats.org/officeDocument/2006/math" xmlns:a14="http://schemas.microsoft.com/office/drawing/2010/main" xmlns:ma14="http://schemas.microsoft.com/office/mac/drawingml/2011/main" val="1"/>
+                <ma14:wrappingTextBoxFlag xmlns:ma14="http://schemas.microsoft.com/office/mac/drawingml/2011/main" xmlns:a14="http://schemas.microsoft.com/office/drawing/2010/main" xmlns:m="http://schemas.openxmlformats.org/officeDocument/2006/math" xmlns="" val="1"/>
               </a:ext>
             </a:extLst>
           </p:spPr>
@@ -29473,7 +29473,7 @@
             <a:effectLst/>
             <a:extLst>
               <a:ext uri="{C572A759-6A51-4108-AA02-DFA0A04FC94B}">
-                <ma14:wrappingTextBoxFlag xmlns="" xmlns:m="http://schemas.openxmlformats.org/officeDocument/2006/math" xmlns:a14="http://schemas.microsoft.com/office/drawing/2010/main" xmlns:ma14="http://schemas.microsoft.com/office/mac/drawingml/2011/main" val="1"/>
+                <ma14:wrappingTextBoxFlag xmlns:ma14="http://schemas.microsoft.com/office/mac/drawingml/2011/main" xmlns:a14="http://schemas.microsoft.com/office/drawing/2010/main" xmlns:m="http://schemas.openxmlformats.org/officeDocument/2006/math" xmlns="" val="1"/>
               </a:ext>
             </a:extLst>
           </p:spPr>
@@ -34728,7 +34728,7 @@
           </a:ln>
           <a:extLst>
             <a:ext uri="{C572A759-6A51-4108-AA02-DFA0A04FC94B}">
-              <ma14:wrappingTextBoxFlag xmlns="" xmlns:m="http://schemas.openxmlformats.org/officeDocument/2006/math" xmlns:a14="http://schemas.microsoft.com/office/drawing/2010/main" xmlns:ma14="http://schemas.microsoft.com/office/mac/drawingml/2011/main" val="1"/>
+              <ma14:wrappingTextBoxFlag xmlns:ma14="http://schemas.microsoft.com/office/mac/drawingml/2011/main" xmlns:a14="http://schemas.microsoft.com/office/drawing/2010/main" xmlns:m="http://schemas.openxmlformats.org/officeDocument/2006/math" xmlns="" val="1"/>
             </a:ext>
           </a:extLst>
         </p:spPr>
@@ -34926,7 +34926,7 @@
             <a:effectLst/>
             <a:extLst>
               <a:ext uri="{C572A759-6A51-4108-AA02-DFA0A04FC94B}">
-                <ma14:wrappingTextBoxFlag xmlns="" xmlns:m="http://schemas.openxmlformats.org/officeDocument/2006/math" xmlns:a14="http://schemas.microsoft.com/office/drawing/2010/main" xmlns:ma14="http://schemas.microsoft.com/office/mac/drawingml/2011/main" val="1"/>
+                <ma14:wrappingTextBoxFlag xmlns:ma14="http://schemas.microsoft.com/office/mac/drawingml/2011/main" xmlns:a14="http://schemas.microsoft.com/office/drawing/2010/main" xmlns:m="http://schemas.openxmlformats.org/officeDocument/2006/math" xmlns="" val="1"/>
               </a:ext>
             </a:extLst>
           </p:spPr>
@@ -35213,7 +35213,7 @@
           <a:effectLst/>
           <a:extLst>
             <a:ext uri="{C572A759-6A51-4108-AA02-DFA0A04FC94B}">
-              <ma14:wrappingTextBoxFlag xmlns="" xmlns:m="http://schemas.openxmlformats.org/officeDocument/2006/math" xmlns:a14="http://schemas.microsoft.com/office/drawing/2010/main" xmlns:ma14="http://schemas.microsoft.com/office/mac/drawingml/2011/main" val="1"/>
+              <ma14:wrappingTextBoxFlag xmlns:ma14="http://schemas.microsoft.com/office/mac/drawingml/2011/main" xmlns:a14="http://schemas.microsoft.com/office/drawing/2010/main" xmlns:m="http://schemas.openxmlformats.org/officeDocument/2006/math" xmlns="" val="1"/>
             </a:ext>
           </a:extLst>
         </p:spPr>
@@ -35260,7 +35260,7 @@
           </a:ln>
           <a:extLst>
             <a:ext uri="{C572A759-6A51-4108-AA02-DFA0A04FC94B}">
-              <ma14:wrappingTextBoxFlag xmlns="" xmlns:m="http://schemas.openxmlformats.org/officeDocument/2006/math" xmlns:a14="http://schemas.microsoft.com/office/drawing/2010/main" xmlns:ma14="http://schemas.microsoft.com/office/mac/drawingml/2011/main" val="1"/>
+              <ma14:wrappingTextBoxFlag xmlns:ma14="http://schemas.microsoft.com/office/mac/drawingml/2011/main" xmlns:a14="http://schemas.microsoft.com/office/drawing/2010/main" xmlns:m="http://schemas.openxmlformats.org/officeDocument/2006/math" xmlns="" val="1"/>
             </a:ext>
           </a:extLst>
         </p:spPr>
@@ -36096,7 +36096,7 @@
                 <a:effectLst/>
                 <a:extLst>
                   <a:ext uri="{C572A759-6A51-4108-AA02-DFA0A04FC94B}">
-                    <ma14:wrappingTextBoxFlag xmlns="" xmlns:m="http://schemas.openxmlformats.org/officeDocument/2006/math" xmlns:ma14="http://schemas.microsoft.com/office/mac/drawingml/2011/main" val="1"/>
+                    <ma14:wrappingTextBoxFlag xmlns:ma14="http://schemas.microsoft.com/office/mac/drawingml/2011/main" xmlns:m="http://schemas.openxmlformats.org/officeDocument/2006/math" xmlns="" val="1"/>
                   </a:ext>
                 </a:extLst>
               </p:spPr>
@@ -37764,7 +37764,7 @@
             <a:effectLst/>
             <a:extLst>
               <a:ext uri="{C572A759-6A51-4108-AA02-DFA0A04FC94B}">
-                <ma14:wrappingTextBoxFlag xmlns="" xmlns:m="http://schemas.openxmlformats.org/officeDocument/2006/math" xmlns:a14="http://schemas.microsoft.com/office/drawing/2010/main" xmlns:ma14="http://schemas.microsoft.com/office/mac/drawingml/2011/main" val="1"/>
+                <ma14:wrappingTextBoxFlag xmlns:ma14="http://schemas.microsoft.com/office/mac/drawingml/2011/main" xmlns:a14="http://schemas.microsoft.com/office/drawing/2010/main" xmlns:m="http://schemas.openxmlformats.org/officeDocument/2006/math" xmlns="" val="1"/>
               </a:ext>
             </a:extLst>
           </p:spPr>
@@ -37811,7 +37811,7 @@
             <a:effectLst/>
             <a:extLst>
               <a:ext uri="{C572A759-6A51-4108-AA02-DFA0A04FC94B}">
-                <ma14:wrappingTextBoxFlag xmlns="" xmlns:m="http://schemas.openxmlformats.org/officeDocument/2006/math" xmlns:a14="http://schemas.microsoft.com/office/drawing/2010/main" xmlns:ma14="http://schemas.microsoft.com/office/mac/drawingml/2011/main" val="1"/>
+                <ma14:wrappingTextBoxFlag xmlns:ma14="http://schemas.microsoft.com/office/mac/drawingml/2011/main" xmlns:a14="http://schemas.microsoft.com/office/drawing/2010/main" xmlns:m="http://schemas.openxmlformats.org/officeDocument/2006/math" xmlns="" val="1"/>
               </a:ext>
             </a:extLst>
           </p:spPr>
@@ -39118,7 +39118,7 @@
             <a:effectLst/>
             <a:extLst>
               <a:ext uri="{C572A759-6A51-4108-AA02-DFA0A04FC94B}">
-                <ma14:wrappingTextBoxFlag xmlns="" xmlns:m="http://schemas.openxmlformats.org/officeDocument/2006/math" xmlns:a14="http://schemas.microsoft.com/office/drawing/2010/main" xmlns:ma14="http://schemas.microsoft.com/office/mac/drawingml/2011/main" val="1"/>
+                <ma14:wrappingTextBoxFlag xmlns:ma14="http://schemas.microsoft.com/office/mac/drawingml/2011/main" xmlns:a14="http://schemas.microsoft.com/office/drawing/2010/main" xmlns:m="http://schemas.openxmlformats.org/officeDocument/2006/math" xmlns="" val="1"/>
               </a:ext>
             </a:extLst>
           </p:spPr>
@@ -39184,7 +39184,7 @@
             <a:effectLst/>
             <a:extLst>
               <a:ext uri="{C572A759-6A51-4108-AA02-DFA0A04FC94B}">
-                <ma14:wrappingTextBoxFlag xmlns="" xmlns:m="http://schemas.openxmlformats.org/officeDocument/2006/math" xmlns:a14="http://schemas.microsoft.com/office/drawing/2010/main" xmlns:ma14="http://schemas.microsoft.com/office/mac/drawingml/2011/main" val="1"/>
+                <ma14:wrappingTextBoxFlag xmlns:ma14="http://schemas.microsoft.com/office/mac/drawingml/2011/main" xmlns:a14="http://schemas.microsoft.com/office/drawing/2010/main" xmlns:m="http://schemas.openxmlformats.org/officeDocument/2006/math" xmlns="" val="1"/>
               </a:ext>
             </a:extLst>
           </p:spPr>
@@ -39255,7 +39255,7 @@
             <a:effectLst/>
             <a:extLst>
               <a:ext uri="{C572A759-6A51-4108-AA02-DFA0A04FC94B}">
-                <ma14:wrappingTextBoxFlag xmlns="" xmlns:m="http://schemas.openxmlformats.org/officeDocument/2006/math" xmlns:a14="http://schemas.microsoft.com/office/drawing/2010/main" xmlns:ma14="http://schemas.microsoft.com/office/mac/drawingml/2011/main" val="1"/>
+                <ma14:wrappingTextBoxFlag xmlns:ma14="http://schemas.microsoft.com/office/mac/drawingml/2011/main" xmlns:a14="http://schemas.microsoft.com/office/drawing/2010/main" xmlns:m="http://schemas.openxmlformats.org/officeDocument/2006/math" xmlns="" val="1"/>
               </a:ext>
             </a:extLst>
           </p:spPr>
@@ -39323,7 +39323,7 @@
             <a:effectLst/>
             <a:extLst>
               <a:ext uri="{C572A759-6A51-4108-AA02-DFA0A04FC94B}">
-                <ma14:wrappingTextBoxFlag xmlns="" xmlns:m="http://schemas.openxmlformats.org/officeDocument/2006/math" xmlns:a14="http://schemas.microsoft.com/office/drawing/2010/main" xmlns:ma14="http://schemas.microsoft.com/office/mac/drawingml/2011/main" val="1"/>
+                <ma14:wrappingTextBoxFlag xmlns:ma14="http://schemas.microsoft.com/office/mac/drawingml/2011/main" xmlns:a14="http://schemas.microsoft.com/office/drawing/2010/main" xmlns:m="http://schemas.openxmlformats.org/officeDocument/2006/math" xmlns="" val="1"/>
               </a:ext>
             </a:extLst>
           </p:spPr>
@@ -39368,7 +39368,7 @@
           </a:ln>
           <a:extLst>
             <a:ext uri="{C572A759-6A51-4108-AA02-DFA0A04FC94B}">
-              <ma14:wrappingTextBoxFlag xmlns="" xmlns:m="http://schemas.openxmlformats.org/officeDocument/2006/math" xmlns:a14="http://schemas.microsoft.com/office/drawing/2010/main" xmlns:ma14="http://schemas.microsoft.com/office/mac/drawingml/2011/main" val="1"/>
+              <ma14:wrappingTextBoxFlag xmlns:ma14="http://schemas.microsoft.com/office/mac/drawingml/2011/main" xmlns:a14="http://schemas.microsoft.com/office/drawing/2010/main" xmlns:m="http://schemas.openxmlformats.org/officeDocument/2006/math" xmlns="" val="1"/>
             </a:ext>
           </a:extLst>
         </p:spPr>
@@ -39608,7 +39608,7 @@
               <a:effectLst/>
               <a:extLst>
                 <a:ext uri="{C572A759-6A51-4108-AA02-DFA0A04FC94B}">
-                  <ma14:wrappingTextBoxFlag xmlns="" xmlns:m="http://schemas.openxmlformats.org/officeDocument/2006/math" xmlns:a14="http://schemas.microsoft.com/office/drawing/2010/main" xmlns:ma14="http://schemas.microsoft.com/office/mac/drawingml/2011/main" val="1"/>
+                  <ma14:wrappingTextBoxFlag xmlns:ma14="http://schemas.microsoft.com/office/mac/drawingml/2011/main" xmlns:a14="http://schemas.microsoft.com/office/drawing/2010/main" xmlns:m="http://schemas.openxmlformats.org/officeDocument/2006/math" xmlns="" val="1"/>
                 </a:ext>
               </a:extLst>
             </p:spPr>
@@ -39721,7 +39721,7 @@
           </a:ln>
           <a:extLst>
             <a:ext uri="{C572A759-6A51-4108-AA02-DFA0A04FC94B}">
-              <ma14:wrappingTextBoxFlag xmlns="" xmlns:m="http://schemas.openxmlformats.org/officeDocument/2006/math" xmlns:a14="http://schemas.microsoft.com/office/drawing/2010/main" xmlns:ma14="http://schemas.microsoft.com/office/mac/drawingml/2011/main" val="1"/>
+              <ma14:wrappingTextBoxFlag xmlns:ma14="http://schemas.microsoft.com/office/mac/drawingml/2011/main" xmlns:a14="http://schemas.microsoft.com/office/drawing/2010/main" xmlns:m="http://schemas.openxmlformats.org/officeDocument/2006/math" xmlns="" val="1"/>
             </a:ext>
           </a:extLst>
         </p:spPr>
@@ -39765,7 +39765,7 @@
           </a:ln>
           <a:extLst>
             <a:ext uri="{C572A759-6A51-4108-AA02-DFA0A04FC94B}">
-              <ma14:wrappingTextBoxFlag xmlns="" xmlns:m="http://schemas.openxmlformats.org/officeDocument/2006/math" xmlns:a14="http://schemas.microsoft.com/office/drawing/2010/main" xmlns:ma14="http://schemas.microsoft.com/office/mac/drawingml/2011/main" val="1"/>
+              <ma14:wrappingTextBoxFlag xmlns:ma14="http://schemas.microsoft.com/office/mac/drawingml/2011/main" xmlns:a14="http://schemas.microsoft.com/office/drawing/2010/main" xmlns:m="http://schemas.openxmlformats.org/officeDocument/2006/math" xmlns="" val="1"/>
             </a:ext>
           </a:extLst>
         </p:spPr>
@@ -40004,6 +40004,304 @@
           </p:sp>
         </mc:Fallback>
       </mc:AlternateContent>
+      <mc:AlternateContent xmlns:mc="http://schemas.openxmlformats.org/markup-compatibility/2006">
+        <mc:Choice xmlns:a14="http://schemas.microsoft.com/office/drawing/2010/main" Requires="a14">
+          <p:sp>
+            <p:nvSpPr>
+              <p:cNvPr id="2" name="Tekstvak 1">
+                <a:extLst>
+                  <a:ext uri="{FF2B5EF4-FFF2-40B4-BE49-F238E27FC236}">
+                    <a16:creationId xmlns:a16="http://schemas.microsoft.com/office/drawing/2014/main" id="{5D36AB5C-E6A1-8E12-A120-56EF4E6D7648}"/>
+                  </a:ext>
+                </a:extLst>
+              </p:cNvPr>
+              <p:cNvSpPr txBox="1"/>
+              <p:nvPr/>
+            </p:nvSpPr>
+            <p:spPr>
+              <a:xfrm>
+                <a:off x="8184382" y="4058371"/>
+                <a:ext cx="4259692" cy="1636858"/>
+              </a:xfrm>
+              <a:prstGeom prst="rect">
+                <a:avLst/>
+              </a:prstGeom>
+              <a:noFill/>
+              <a:ln w="12700" cap="flat">
+                <a:noFill/>
+                <a:miter lim="400000"/>
+              </a:ln>
+              <a:effectLst/>
+              <a:sp3d/>
+            </p:spPr>
+            <p:style>
+              <a:lnRef idx="0">
+                <a:scrgbClr r="0" g="0" b="0"/>
+              </a:lnRef>
+              <a:fillRef idx="0">
+                <a:scrgbClr r="0" g="0" b="0"/>
+              </a:fillRef>
+              <a:effectRef idx="0">
+                <a:scrgbClr r="0" g="0" b="0"/>
+              </a:effectRef>
+              <a:fontRef idx="none"/>
+            </p:style>
+            <p:txBody>
+              <a:bodyPr rot="0" spcFirstLastPara="1" vertOverflow="overflow" horzOverflow="overflow" vert="horz" wrap="none" lIns="0" tIns="0" rIns="0" bIns="0" numCol="1" spcCol="38100" rtlCol="0" anchor="ctr">
+                <a:spAutoFit/>
+              </a:bodyPr>
+              <a:lstStyle/>
+              <a:p>
+                <a14:m>
+                  <m:oMathPara xmlns:m="http://schemas.openxmlformats.org/officeDocument/2006/math">
+                    <m:oMathParaPr>
+                      <m:jc m:val="centerGroup"/>
+                    </m:oMathParaPr>
+                    <m:oMath xmlns:m="http://schemas.openxmlformats.org/officeDocument/2006/math">
+                      <m:r>
+                        <a:rPr lang="nl-NL" i="1" smtClean="0">
+                          <a:latin typeface="Cambria Math" panose="02040503050406030204" pitchFamily="18" charset="0"/>
+                        </a:rPr>
+                        <m:t>𝜖</m:t>
+                      </m:r>
+                      <m:r>
+                        <a:rPr kumimoji="0" lang="nl-NL" sz="3600" b="0" i="1" u="none" strike="noStrike" cap="none" spc="0" normalizeH="0" baseline="0" smtClean="0">
+                          <a:ln>
+                            <a:noFill/>
+                          </a:ln>
+                          <a:solidFill>
+                            <a:srgbClr val="000000"/>
+                          </a:solidFill>
+                          <a:effectLst/>
+                          <a:uFillTx/>
+                          <a:latin typeface="Cambria Math" panose="02040503050406030204" pitchFamily="18" charset="0"/>
+                          <a:ea typeface="+mn-ea"/>
+                          <a:cs typeface="+mn-cs"/>
+                          <a:sym typeface="Helvetica Light"/>
+                        </a:rPr>
+                        <m:t>= </m:t>
+                      </m:r>
+                      <m:rad>
+                        <m:radPr>
+                          <m:degHide m:val="on"/>
+                          <m:ctrlPr>
+                            <a:rPr kumimoji="0" lang="nl-NL" sz="3600" b="0" i="1" u="none" strike="noStrike" cap="none" spc="0" normalizeH="0" baseline="0" smtClean="0">
+                              <a:ln>
+                                <a:noFill/>
+                              </a:ln>
+                              <a:solidFill>
+                                <a:srgbClr val="000000"/>
+                              </a:solidFill>
+                              <a:effectLst/>
+                              <a:uFillTx/>
+                              <a:latin typeface="Cambria Math" panose="02040503050406030204" pitchFamily="18" charset="0"/>
+                              <a:ea typeface="+mn-ea"/>
+                              <a:cs typeface="+mn-cs"/>
+                              <a:sym typeface="Helvetica Light"/>
+                            </a:rPr>
+                          </m:ctrlPr>
+                        </m:radPr>
+                        <m:deg/>
+                        <m:e>
+                          <m:f>
+                            <m:fPr>
+                              <m:ctrlPr>
+                                <a:rPr kumimoji="0" lang="nl-NL" sz="3600" b="0" i="1" u="none" strike="noStrike" cap="none" spc="0" normalizeH="0" baseline="0" smtClean="0">
+                                  <a:ln>
+                                    <a:noFill/>
+                                  </a:ln>
+                                  <a:solidFill>
+                                    <a:srgbClr val="000000"/>
+                                  </a:solidFill>
+                                  <a:effectLst/>
+                                  <a:uFillTx/>
+                                  <a:latin typeface="Cambria Math" panose="02040503050406030204" pitchFamily="18" charset="0"/>
+                                  <a:ea typeface="+mn-ea"/>
+                                  <a:cs typeface="+mn-cs"/>
+                                  <a:sym typeface="Helvetica Light"/>
+                                </a:rPr>
+                              </m:ctrlPr>
+                            </m:fPr>
+                            <m:num>
+                              <m:r>
+                                <a:rPr kumimoji="0" lang="nl-NL" sz="3600" b="0" i="1" u="none" strike="noStrike" cap="none" spc="0" normalizeH="0" baseline="0" smtClean="0">
+                                  <a:ln>
+                                    <a:noFill/>
+                                  </a:ln>
+                                  <a:solidFill>
+                                    <a:srgbClr val="000000"/>
+                                  </a:solidFill>
+                                  <a:effectLst/>
+                                  <a:uFillTx/>
+                                  <a:latin typeface="Cambria Math" panose="02040503050406030204" pitchFamily="18" charset="0"/>
+                                  <a:ea typeface="+mn-ea"/>
+                                  <a:cs typeface="+mn-cs"/>
+                                  <a:sym typeface="Helvetica Light"/>
+                                </a:rPr>
+                                <m:t>6</m:t>
+                              </m:r>
+                            </m:num>
+                            <m:den>
+                              <m:r>
+                                <a:rPr kumimoji="0" lang="nl-NL" sz="3600" b="0" i="1" u="none" strike="noStrike" cap="none" spc="0" normalizeH="0" baseline="0" smtClean="0">
+                                  <a:ln>
+                                    <a:noFill/>
+                                  </a:ln>
+                                  <a:solidFill>
+                                    <a:srgbClr val="000000"/>
+                                  </a:solidFill>
+                                  <a:effectLst/>
+                                  <a:uFillTx/>
+                                  <a:latin typeface="Cambria Math" panose="02040503050406030204" pitchFamily="18" charset="0"/>
+                                  <a:ea typeface="+mn-ea"/>
+                                  <a:cs typeface="+mn-cs"/>
+                                  <a:sym typeface="Helvetica Light"/>
+                                </a:rPr>
+                                <m:t>𝑓𝑎𝑛</m:t>
+                              </m:r>
+                              <m:r>
+                                <a:rPr kumimoji="0" lang="nl-NL" sz="3600" b="0" i="1" u="none" strike="noStrike" cap="none" spc="0" normalizeH="0" baseline="-25000" smtClean="0">
+                                  <a:ln>
+                                    <a:noFill/>
+                                  </a:ln>
+                                  <a:solidFill>
+                                    <a:srgbClr val="000000"/>
+                                  </a:solidFill>
+                                  <a:effectLst/>
+                                  <a:uFillTx/>
+                                  <a:latin typeface="Cambria Math" panose="02040503050406030204" pitchFamily="18" charset="0"/>
+                                  <a:ea typeface="+mn-ea"/>
+                                  <a:cs typeface="+mn-cs"/>
+                                  <a:sym typeface="Helvetica Light"/>
+                                </a:rPr>
+                                <m:t>𝑖𝑛</m:t>
+                              </m:r>
+                              <m:r>
+                                <a:rPr kumimoji="0" lang="nl-NL" sz="3600" b="0" i="1" u="none" strike="noStrike" cap="none" spc="0" normalizeH="0" baseline="0" smtClean="0">
+                                  <a:ln>
+                                    <a:noFill/>
+                                  </a:ln>
+                                  <a:solidFill>
+                                    <a:srgbClr val="000000"/>
+                                  </a:solidFill>
+                                  <a:effectLst/>
+                                  <a:uFillTx/>
+                                  <a:latin typeface="Cambria Math" panose="02040503050406030204" pitchFamily="18" charset="0"/>
+                                  <a:ea typeface="+mn-ea"/>
+                                  <a:cs typeface="+mn-cs"/>
+                                  <a:sym typeface="Helvetica Light"/>
+                                </a:rPr>
+                                <m:t>−</m:t>
+                              </m:r>
+                              <m:r>
+                                <a:rPr kumimoji="0" lang="nl-NL" sz="3600" b="0" i="1" u="none" strike="noStrike" cap="none" spc="0" normalizeH="0" baseline="0" smtClean="0">
+                                  <a:ln>
+                                    <a:noFill/>
+                                  </a:ln>
+                                  <a:solidFill>
+                                    <a:srgbClr val="000000"/>
+                                  </a:solidFill>
+                                  <a:effectLst/>
+                                  <a:uFillTx/>
+                                  <a:latin typeface="Cambria Math" panose="02040503050406030204" pitchFamily="18" charset="0"/>
+                                  <a:ea typeface="+mn-ea"/>
+                                  <a:cs typeface="+mn-cs"/>
+                                  <a:sym typeface="Helvetica Light"/>
+                                </a:rPr>
+                                <m:t>𝑓𝑎𝑛𝑜</m:t>
+                              </m:r>
+                              <m:r>
+                                <a:rPr kumimoji="0" lang="nl-NL" sz="3600" b="0" i="1" u="none" strike="noStrike" cap="none" spc="0" normalizeH="0" baseline="-25000" smtClean="0">
+                                  <a:ln>
+                                    <a:noFill/>
+                                  </a:ln>
+                                  <a:solidFill>
+                                    <a:srgbClr val="000000"/>
+                                  </a:solidFill>
+                                  <a:effectLst/>
+                                  <a:uFillTx/>
+                                  <a:latin typeface="Cambria Math" panose="02040503050406030204" pitchFamily="18" charset="0"/>
+                                  <a:ea typeface="+mn-ea"/>
+                                  <a:cs typeface="+mn-cs"/>
+                                  <a:sym typeface="Helvetica Light"/>
+                                </a:rPr>
+                                <m:t>𝑢𝑡</m:t>
+                              </m:r>
+                            </m:den>
+                          </m:f>
+                        </m:e>
+                      </m:rad>
+                    </m:oMath>
+                  </m:oMathPara>
+                </a14:m>
+                <a:endParaRPr kumimoji="0" lang="nl-NL" sz="3600" b="0" i="0" u="none" strike="noStrike" cap="none" spc="0" normalizeH="0" baseline="0">
+                  <a:ln>
+                    <a:noFill/>
+                  </a:ln>
+                  <a:solidFill>
+                    <a:srgbClr val="000000"/>
+                  </a:solidFill>
+                  <a:effectLst/>
+                  <a:uFillTx/>
+                  <a:latin typeface="+mn-lt"/>
+                  <a:ea typeface="+mn-ea"/>
+                  <a:cs typeface="+mn-cs"/>
+                  <a:sym typeface="Helvetica Light"/>
+                </a:endParaRPr>
+              </a:p>
+            </p:txBody>
+          </p:sp>
+        </mc:Choice>
+        <mc:Fallback>
+          <p:sp>
+            <p:nvSpPr>
+              <p:cNvPr id="2" name="Tekstvak 1">
+                <a:extLst>
+                  <a:ext uri="{FF2B5EF4-FFF2-40B4-BE49-F238E27FC236}">
+                    <a16:creationId xmlns:a16="http://schemas.microsoft.com/office/drawing/2014/main" id="{5D36AB5C-E6A1-8E12-A120-56EF4E6D7648}"/>
+                  </a:ext>
+                </a:extLst>
+              </p:cNvPr>
+              <p:cNvSpPr txBox="1">
+                <a:spLocks noRot="1" noChangeAspect="1" noMove="1" noResize="1" noEditPoints="1" noAdjustHandles="1" noChangeArrowheads="1" noChangeShapeType="1" noTextEdit="1"/>
+              </p:cNvSpPr>
+              <p:nvPr/>
+            </p:nvSpPr>
+            <p:spPr>
+              <a:xfrm>
+                <a:off x="8184382" y="4058371"/>
+                <a:ext cx="4259692" cy="1636858"/>
+              </a:xfrm>
+              <a:prstGeom prst="rect">
+                <a:avLst/>
+              </a:prstGeom>
+              <a:blipFill>
+                <a:blip r:embed="rId3"/>
+                <a:stretch>
+                  <a:fillRect/>
+                </a:stretch>
+              </a:blipFill>
+              <a:ln w="12700" cap="flat">
+                <a:noFill/>
+                <a:miter lim="400000"/>
+              </a:ln>
+              <a:effectLst/>
+            </p:spPr>
+            <p:txBody>
+              <a:bodyPr/>
+              <a:lstStyle/>
+              <a:p>
+                <a:r>
+                  <a:rPr lang="nl-NL">
+                    <a:noFill/>
+                  </a:rPr>
+                  <a:t> </a:t>
+                </a:r>
+              </a:p>
+            </p:txBody>
+          </p:sp>
+        </mc:Fallback>
+      </mc:AlternateContent>
     </p:spTree>
   </p:cSld>
   <p:clrMapOvr>
@@ -40038,7 +40336,7 @@
         </p:nvSpPr>
         <p:spPr>
           <a:xfrm>
-            <a:off x="390718" y="260637"/>
+            <a:off x="389582" y="2822326"/>
             <a:ext cx="3985990" cy="559495"/>
           </a:xfrm>
           <a:prstGeom prst="rect">
@@ -40049,7 +40347,7 @@
           </a:ln>
           <a:extLst>
             <a:ext uri="{C572A759-6A51-4108-AA02-DFA0A04FC94B}">
-              <ma14:wrappingTextBoxFlag xmlns="" xmlns:m="http://schemas.openxmlformats.org/officeDocument/2006/math" xmlns:a14="http://schemas.microsoft.com/office/drawing/2010/main" xmlns:ma14="http://schemas.microsoft.com/office/mac/drawingml/2011/main" val="1"/>
+              <ma14:wrappingTextBoxFlag xmlns:ma14="http://schemas.microsoft.com/office/mac/drawingml/2011/main" xmlns:a14="http://schemas.microsoft.com/office/drawing/2010/main" xmlns:m="http://schemas.openxmlformats.org/officeDocument/2006/math" xmlns="" val="1"/>
             </a:ext>
           </a:extLst>
         </p:spPr>
@@ -40082,7 +40380,7 @@
         </p:nvSpPr>
         <p:spPr>
           <a:xfrm>
-            <a:off x="389582" y="5468375"/>
+            <a:off x="389582" y="3780979"/>
             <a:ext cx="12042131" cy="2590801"/>
           </a:xfrm>
           <a:prstGeom prst="rect">
@@ -40093,7 +40391,7 @@
           </a:ln>
           <a:extLst>
             <a:ext uri="{C572A759-6A51-4108-AA02-DFA0A04FC94B}">
-              <ma14:wrappingTextBoxFlag xmlns="" xmlns:m="http://schemas.openxmlformats.org/officeDocument/2006/math" xmlns:a14="http://schemas.microsoft.com/office/drawing/2010/main" xmlns:ma14="http://schemas.microsoft.com/office/mac/drawingml/2011/main" val="1"/>
+              <ma14:wrappingTextBoxFlag xmlns:ma14="http://schemas.microsoft.com/office/mac/drawingml/2011/main" xmlns:a14="http://schemas.microsoft.com/office/drawing/2010/main" xmlns:m="http://schemas.openxmlformats.org/officeDocument/2006/math" xmlns="" val="1"/>
             </a:ext>
           </a:extLst>
         </p:spPr>
@@ -40197,45 +40495,119 @@
       </p:sp>
       <p:sp>
         <p:nvSpPr>
-          <p:cNvPr id="1028" name="scipy.optimize.minimize()"/>
+          <p:cNvPr id="2" name="Tekstvak 1">
+            <a:extLst>
+              <a:ext uri="{FF2B5EF4-FFF2-40B4-BE49-F238E27FC236}">
+                <a16:creationId xmlns:a16="http://schemas.microsoft.com/office/drawing/2014/main" id="{A607E5E7-4429-E1E7-74F1-A9EEA2C34125}"/>
+              </a:ext>
+            </a:extLst>
+          </p:cNvPr>
           <p:cNvSpPr txBox="1"/>
           <p:nvPr/>
         </p:nvSpPr>
         <p:spPr>
           <a:xfrm>
-            <a:off x="694488" y="1771474"/>
-            <a:ext cx="6995742" cy="622301"/>
+            <a:off x="498764" y="506975"/>
+            <a:ext cx="11932949" cy="1549142"/>
           </a:xfrm>
           <a:prstGeom prst="rect">
             <a:avLst/>
           </a:prstGeom>
-          <a:ln w="12700">
+          <a:noFill/>
+          <a:ln w="12700" cap="flat">
+            <a:noFill/>
             <a:miter lim="400000"/>
           </a:ln>
-          <a:extLst>
-            <a:ext uri="{C572A759-6A51-4108-AA02-DFA0A04FC94B}">
-              <ma14:wrappingTextBoxFlag xmlns="" xmlns:m="http://schemas.openxmlformats.org/officeDocument/2006/math" xmlns:a14="http://schemas.microsoft.com/office/drawing/2010/main" xmlns:ma14="http://schemas.microsoft.com/office/mac/drawingml/2011/main" val="1"/>
-            </a:ext>
-          </a:extLst>
+          <a:effectLst/>
+          <a:sp3d/>
         </p:spPr>
+        <p:style>
+          <a:lnRef idx="0">
+            <a:scrgbClr r="0" g="0" b="0"/>
+          </a:lnRef>
+          <a:fillRef idx="0">
+            <a:scrgbClr r="0" g="0" b="0"/>
+          </a:fillRef>
+          <a:effectRef idx="0">
+            <a:scrgbClr r="0" g="0" b="0"/>
+          </a:effectRef>
+          <a:fontRef idx="none"/>
+        </p:style>
         <p:txBody>
-          <a:bodyPr wrap="none" lIns="50800" tIns="50800" rIns="50800" bIns="50800" anchor="ctr">
+          <a:bodyPr rot="0" spcFirstLastPara="1" vertOverflow="overflow" horzOverflow="overflow" vert="horz" wrap="square" lIns="50800" tIns="50800" rIns="50800" bIns="50800" numCol="1" spcCol="38100" rtlCol="0" anchor="ctr">
             <a:spAutoFit/>
           </a:bodyPr>
-          <a:lstStyle>
-            <a:lvl1pPr algn="l">
-              <a:defRPr>
-                <a:latin typeface="Menlo Regular"/>
-                <a:ea typeface="Menlo Regular"/>
-                <a:cs typeface="Menlo Regular"/>
-                <a:sym typeface="Menlo Regular"/>
-              </a:defRPr>
-            </a:lvl1pPr>
-          </a:lstStyle>
+          <a:lstStyle/>
           <a:p>
+            <a:pPr marL="0" marR="0" indent="0" algn="ctr" defTabSz="584200" rtl="0" fontAlgn="auto" latinLnBrk="0" hangingPunct="0">
+              <a:lnSpc>
+                <a:spcPct val="100000"/>
+              </a:lnSpc>
+              <a:spcBef>
+                <a:spcPts val="0"/>
+              </a:spcBef>
+              <a:spcAft>
+                <a:spcPts val="0"/>
+              </a:spcAft>
+              <a:buClrTx/>
+              <a:buSzTx/>
+              <a:buFontTx/>
+              <a:buNone/>
+              <a:tabLst/>
+            </a:pPr>
             <a:r>
-              <a:t>scipy.optimize.minimize()</a:t>
+              <a:rPr kumimoji="0" lang="nl-NL" sz="5400" b="0" i="0" u="none" strike="noStrike" cap="none" spc="0" normalizeH="0" baseline="0">
+                <a:ln>
+                  <a:noFill/>
+                </a:ln>
+                <a:solidFill>
+                  <a:srgbClr val="000000"/>
+                </a:solidFill>
+                <a:effectLst/>
+                <a:uFillTx/>
+                <a:latin typeface="+mn-lt"/>
+                <a:ea typeface="+mn-ea"/>
+                <a:cs typeface="+mn-cs"/>
+                <a:sym typeface="Helvetica Light"/>
+              </a:rPr>
+              <a:t>Extra uitleg bij deel 2 – opgaveset 2</a:t>
             </a:r>
+          </a:p>
+          <a:p>
+            <a:pPr marL="0" marR="0" indent="0" algn="ctr" defTabSz="584200" rtl="0" fontAlgn="auto" latinLnBrk="0" hangingPunct="0">
+              <a:lnSpc>
+                <a:spcPct val="100000"/>
+              </a:lnSpc>
+              <a:spcBef>
+                <a:spcPts val="0"/>
+              </a:spcBef>
+              <a:spcAft>
+                <a:spcPts val="0"/>
+              </a:spcAft>
+              <a:buClrTx/>
+              <a:buSzTx/>
+              <a:buFontTx/>
+              <a:buNone/>
+              <a:tabLst/>
+            </a:pPr>
+            <a:r>
+              <a:rPr lang="nl-NL" sz="4000" i="1"/>
+              <a:t>zelf een Neuraal Netwerk trainen op de MNIST-set</a:t>
+            </a:r>
+            <a:endParaRPr kumimoji="0" lang="nl-NL" sz="4000" b="0" i="1" u="none" strike="noStrike" cap="none" spc="0" normalizeH="0" baseline="0">
+              <a:ln>
+                <a:noFill/>
+              </a:ln>
+              <a:solidFill>
+                <a:srgbClr val="000000"/>
+              </a:solidFill>
+              <a:effectLst/>
+              <a:uFillTx/>
+              <a:latin typeface="+mn-lt"/>
+              <a:ea typeface="+mn-ea"/>
+              <a:cs typeface="+mn-cs"/>
+              <a:sym typeface="Helvetica Light"/>
+            </a:endParaRPr>
           </a:p>
         </p:txBody>
       </p:sp>
@@ -40273,8 +40645,8 @@
         </p:nvSpPr>
         <p:spPr>
           <a:xfrm>
-            <a:off x="76996" y="355472"/>
-            <a:ext cx="12409141" cy="4978401"/>
+            <a:off x="446087" y="2569278"/>
+            <a:ext cx="7625485" cy="4042132"/>
           </a:xfrm>
           <a:prstGeom prst="rect">
             <a:avLst/>
@@ -40284,7 +40656,7 @@
           </a:ln>
           <a:extLst>
             <a:ext uri="{C572A759-6A51-4108-AA02-DFA0A04FC94B}">
-              <ma14:wrappingTextBoxFlag xmlns="" xmlns:m="http://schemas.openxmlformats.org/officeDocument/2006/math" xmlns:a14="http://schemas.microsoft.com/office/drawing/2010/main" xmlns:ma14="http://schemas.microsoft.com/office/mac/drawingml/2011/main" val="1"/>
+              <ma14:wrappingTextBoxFlag xmlns:ma14="http://schemas.microsoft.com/office/mac/drawingml/2011/main" xmlns:a14="http://schemas.microsoft.com/office/drawing/2010/main" xmlns:m="http://schemas.openxmlformats.org/officeDocument/2006/math" xmlns="" val="1"/>
             </a:ext>
           </a:extLst>
         </p:spPr>
@@ -40303,6 +40675,7 @@
               </a:defRPr>
             </a:pPr>
             <a:r>
+              <a:rPr sz="3200"/>
               <a:t>def nnCostFunction(Thetas, X, y):</a:t>
             </a:r>
           </a:p>
@@ -40315,7 +40688,7 @@
                 <a:sym typeface="Menlo Regular"/>
               </a:defRPr>
             </a:pPr>
-            <a:endParaRPr/>
+            <a:endParaRPr sz="3200"/>
           </a:p>
           <a:p>
             <a:pPr algn="l">
@@ -40327,6 +40700,7 @@
               </a:defRPr>
             </a:pPr>
             <a:r>
+              <a:rPr sz="3200"/>
               <a:t>    global input_size, hidden_size, num_labels</a:t>
             </a:r>
           </a:p>
@@ -40340,6 +40714,7 @@
               </a:defRPr>
             </a:pPr>
             <a:r>
+              <a:rPr sz="3200"/>
               <a:t>    size = hidden_size * (1+input_size)</a:t>
             </a:r>
           </a:p>
@@ -40352,7 +40727,7 @@
                 <a:sym typeface="Menlo Regular"/>
               </a:defRPr>
             </a:pPr>
-            <a:endParaRPr/>
+            <a:endParaRPr sz="3200"/>
           </a:p>
           <a:p>
             <a:pPr algn="l">
@@ -40364,6 +40739,7 @@
               </a:defRPr>
             </a:pPr>
             <a:r>
+              <a:rPr sz="3200"/>
               <a:t>    Theta1 = Thetas[:size].reshape(hidden_size, input_size+1)</a:t>
             </a:r>
           </a:p>
@@ -40377,6 +40753,7 @@
               </a:defRPr>
             </a:pPr>
             <a:r>
+              <a:rPr sz="3200"/>
               <a:t>    Theta2 = Thetas[size:].reshape(num_labels, hidden_layer_size+1)</a:t>
             </a:r>
           </a:p>
@@ -40389,7 +40766,7 @@
                 <a:sym typeface="Menlo Regular"/>
               </a:defRPr>
             </a:pPr>
-            <a:endParaRPr/>
+            <a:endParaRPr sz="3200"/>
           </a:p>
           <a:p>
             <a:pPr algn="l">
@@ -40401,6 +40778,7 @@
               </a:defRPr>
             </a:pPr>
             <a:r>
+              <a:rPr sz="3200"/>
               <a:t>    J = computeCost(Theta1, Theta2, X, y)</a:t>
             </a:r>
           </a:p>
@@ -40414,6 +40792,7 @@
               </a:defRPr>
             </a:pPr>
             <a:r>
+              <a:rPr sz="3200"/>
               <a:t>    grad1, grad2 = nnCheckGradients(Theta1, Theta2, X, y)</a:t>
             </a:r>
           </a:p>
@@ -40426,7 +40805,7 @@
                 <a:sym typeface="Menlo Regular"/>
               </a:defRPr>
             </a:pPr>
-            <a:endParaRPr/>
+            <a:endParaRPr sz="3200"/>
           </a:p>
           <a:p>
             <a:pPr algn="l">
@@ -40438,6 +40817,7 @@
               </a:defRPr>
             </a:pPr>
             <a:r>
+              <a:rPr sz="3200"/>
               <a:t>    return J, np.concatenate( (grad1.flatten(), grad2.flatten()) )</a:t>
             </a:r>
           </a:p>
@@ -40451,8 +40831,8 @@
         </p:nvSpPr>
         <p:spPr>
           <a:xfrm>
-            <a:off x="149572" y="6720271"/>
-            <a:ext cx="10207080" cy="1320801"/>
+            <a:off x="446087" y="7419868"/>
+            <a:ext cx="6330259" cy="1087477"/>
           </a:xfrm>
           <a:prstGeom prst="rect">
             <a:avLst/>
@@ -40462,7 +40842,7 @@
           </a:ln>
           <a:extLst>
             <a:ext uri="{C572A759-6A51-4108-AA02-DFA0A04FC94B}">
-              <ma14:wrappingTextBoxFlag xmlns="" xmlns:m="http://schemas.openxmlformats.org/officeDocument/2006/math" xmlns:a14="http://schemas.microsoft.com/office/drawing/2010/main" xmlns:ma14="http://schemas.microsoft.com/office/mac/drawingml/2011/main" val="1"/>
+              <ma14:wrappingTextBoxFlag xmlns:ma14="http://schemas.microsoft.com/office/mac/drawingml/2011/main" xmlns:a14="http://schemas.microsoft.com/office/drawing/2010/main" xmlns:m="http://schemas.openxmlformats.org/officeDocument/2006/math" xmlns="" val="1"/>
             </a:ext>
           </a:extLst>
         </p:spPr>
@@ -40481,6 +40861,7 @@
               </a:defRPr>
             </a:pPr>
             <a:r>
+              <a:rPr sz="3200"/>
               <a:t>res = minimize(nnCostFunction, init_params, args=args, </a:t>
             </a:r>
           </a:p>
@@ -40494,6 +40875,7 @@
               </a:defRPr>
             </a:pPr>
             <a:r>
+              <a:rPr sz="3200"/>
               <a:t>	method='CG', callback=callbackF, 	</a:t>
             </a:r>
           </a:p>
@@ -40507,7 +40889,52 @@
               </a:defRPr>
             </a:pPr>
             <a:r>
+              <a:rPr sz="3200"/>
               <a:t>	options={'maxiter':30,'disp':True})</a:t>
+            </a:r>
+          </a:p>
+        </p:txBody>
+      </p:sp>
+      <p:sp>
+        <p:nvSpPr>
+          <p:cNvPr id="1028" name="scipy.optimize.minimize()"/>
+          <p:cNvSpPr txBox="1"/>
+          <p:nvPr/>
+        </p:nvSpPr>
+        <p:spPr>
+          <a:xfrm>
+            <a:off x="446087" y="1247548"/>
+            <a:ext cx="6995742" cy="622301"/>
+          </a:xfrm>
+          <a:prstGeom prst="rect">
+            <a:avLst/>
+          </a:prstGeom>
+          <a:ln w="12700">
+            <a:miter lim="400000"/>
+          </a:ln>
+          <a:extLst>
+            <a:ext uri="{C572A759-6A51-4108-AA02-DFA0A04FC94B}">
+              <ma14:wrappingTextBoxFlag xmlns:ma14="http://schemas.microsoft.com/office/mac/drawingml/2011/main" xmlns:a14="http://schemas.microsoft.com/office/drawing/2010/main" xmlns:m="http://schemas.openxmlformats.org/officeDocument/2006/math" xmlns="" val="1"/>
+            </a:ext>
+          </a:extLst>
+        </p:spPr>
+        <p:txBody>
+          <a:bodyPr wrap="none" lIns="50800" tIns="50800" rIns="50800" bIns="50800" anchor="ctr">
+            <a:spAutoFit/>
+          </a:bodyPr>
+          <a:lstStyle>
+            <a:lvl1pPr algn="l">
+              <a:defRPr>
+                <a:latin typeface="Menlo Regular"/>
+                <a:ea typeface="Menlo Regular"/>
+                <a:cs typeface="Menlo Regular"/>
+                <a:sym typeface="Menlo Regular"/>
+              </a:defRPr>
+            </a:lvl1pPr>
+          </a:lstStyle>
+          <a:p>
+            <a:r>
+              <a:t>scipy.optimize.minimize()</a:t>
             </a:r>
           </a:p>
         </p:txBody>
@@ -41633,7 +42060,7 @@
           </a:ln>
           <a:extLst>
             <a:ext uri="{C572A759-6A51-4108-AA02-DFA0A04FC94B}">
-              <ma14:wrappingTextBoxFlag xmlns="" xmlns:m="http://schemas.openxmlformats.org/officeDocument/2006/math" xmlns:a14="http://schemas.microsoft.com/office/drawing/2010/main" xmlns:ma14="http://schemas.microsoft.com/office/mac/drawingml/2011/main" val="1"/>
+              <ma14:wrappingTextBoxFlag xmlns:ma14="http://schemas.microsoft.com/office/mac/drawingml/2011/main" xmlns:a14="http://schemas.microsoft.com/office/drawing/2010/main" xmlns:m="http://schemas.openxmlformats.org/officeDocument/2006/math" xmlns="" val="1"/>
             </a:ext>
           </a:extLst>
         </p:spPr>
@@ -41677,7 +42104,7 @@
           </a:ln>
           <a:extLst>
             <a:ext uri="{C572A759-6A51-4108-AA02-DFA0A04FC94B}">
-              <ma14:wrappingTextBoxFlag xmlns="" xmlns:m="http://schemas.openxmlformats.org/officeDocument/2006/math" xmlns:a14="http://schemas.microsoft.com/office/drawing/2010/main" xmlns:ma14="http://schemas.microsoft.com/office/mac/drawingml/2011/main" val="1"/>
+              <ma14:wrappingTextBoxFlag xmlns:ma14="http://schemas.microsoft.com/office/mac/drawingml/2011/main" xmlns:a14="http://schemas.microsoft.com/office/drawing/2010/main" xmlns:m="http://schemas.openxmlformats.org/officeDocument/2006/math" xmlns="" val="1"/>
             </a:ext>
           </a:extLst>
         </p:spPr>
@@ -41747,7 +42174,7 @@
           </a:ln>
           <a:extLst>
             <a:ext uri="{C572A759-6A51-4108-AA02-DFA0A04FC94B}">
-              <ma14:wrappingTextBoxFlag xmlns="" xmlns:m="http://schemas.openxmlformats.org/officeDocument/2006/math" xmlns:a14="http://schemas.microsoft.com/office/drawing/2010/main" xmlns:ma14="http://schemas.microsoft.com/office/mac/drawingml/2011/main" val="1"/>
+              <ma14:wrappingTextBoxFlag xmlns:ma14="http://schemas.microsoft.com/office/mac/drawingml/2011/main" xmlns:a14="http://schemas.microsoft.com/office/drawing/2010/main" xmlns:m="http://schemas.openxmlformats.org/officeDocument/2006/math" xmlns="" val="1"/>
             </a:ext>
           </a:extLst>
         </p:spPr>
@@ -42090,7 +42517,7 @@
           </a:ln>
           <a:extLst>
             <a:ext uri="{C572A759-6A51-4108-AA02-DFA0A04FC94B}">
-              <ma14:wrappingTextBoxFlag xmlns="" xmlns:m="http://schemas.openxmlformats.org/officeDocument/2006/math" xmlns:a14="http://schemas.microsoft.com/office/drawing/2010/main" xmlns:ma14="http://schemas.microsoft.com/office/mac/drawingml/2011/main" val="1"/>
+              <ma14:wrappingTextBoxFlag xmlns:ma14="http://schemas.microsoft.com/office/mac/drawingml/2011/main" xmlns:a14="http://schemas.microsoft.com/office/drawing/2010/main" xmlns:m="http://schemas.openxmlformats.org/officeDocument/2006/math" xmlns="" val="1"/>
             </a:ext>
           </a:extLst>
         </p:spPr>
@@ -42134,7 +42561,7 @@
           </a:ln>
           <a:extLst>
             <a:ext uri="{C572A759-6A51-4108-AA02-DFA0A04FC94B}">
-              <ma14:wrappingTextBoxFlag xmlns="" xmlns:m="http://schemas.openxmlformats.org/officeDocument/2006/math" xmlns:a14="http://schemas.microsoft.com/office/drawing/2010/main" xmlns:ma14="http://schemas.microsoft.com/office/mac/drawingml/2011/main" val="1"/>
+              <ma14:wrappingTextBoxFlag xmlns:ma14="http://schemas.microsoft.com/office/mac/drawingml/2011/main" xmlns:a14="http://schemas.microsoft.com/office/drawing/2010/main" xmlns:m="http://schemas.openxmlformats.org/officeDocument/2006/math" xmlns="" val="1"/>
             </a:ext>
           </a:extLst>
         </p:spPr>
@@ -42237,7 +42664,7 @@
             <a:effectLst/>
             <a:extLst>
               <a:ext uri="{C572A759-6A51-4108-AA02-DFA0A04FC94B}">
-                <ma14:wrappingTextBoxFlag xmlns="" xmlns:m="http://schemas.openxmlformats.org/officeDocument/2006/math" xmlns:a14="http://schemas.microsoft.com/office/drawing/2010/main" xmlns:ma14="http://schemas.microsoft.com/office/mac/drawingml/2011/main" val="1"/>
+                <ma14:wrappingTextBoxFlag xmlns:ma14="http://schemas.microsoft.com/office/mac/drawingml/2011/main" xmlns:a14="http://schemas.microsoft.com/office/drawing/2010/main" xmlns:m="http://schemas.openxmlformats.org/officeDocument/2006/math" xmlns="" val="1"/>
               </a:ext>
             </a:extLst>
           </p:spPr>
@@ -42640,7 +43067,7 @@
             <a:effectLst/>
             <a:extLst>
               <a:ext uri="{C572A759-6A51-4108-AA02-DFA0A04FC94B}">
-                <ma14:wrappingTextBoxFlag xmlns="" xmlns:m="http://schemas.openxmlformats.org/officeDocument/2006/math" xmlns:a14="http://schemas.microsoft.com/office/drawing/2010/main" xmlns:ma14="http://schemas.microsoft.com/office/mac/drawingml/2011/main" val="1"/>
+                <ma14:wrappingTextBoxFlag xmlns:ma14="http://schemas.microsoft.com/office/mac/drawingml/2011/main" xmlns:a14="http://schemas.microsoft.com/office/drawing/2010/main" xmlns:m="http://schemas.openxmlformats.org/officeDocument/2006/math" xmlns="" val="1"/>
               </a:ext>
             </a:extLst>
           </p:spPr>
@@ -44788,7 +45215,7 @@
             <a:effectLst/>
             <a:extLst>
               <a:ext uri="{C572A759-6A51-4108-AA02-DFA0A04FC94B}">
-                <ma14:wrappingTextBoxFlag xmlns="" xmlns:m="http://schemas.openxmlformats.org/officeDocument/2006/math" xmlns:a14="http://schemas.microsoft.com/office/drawing/2010/main" xmlns:ma14="http://schemas.microsoft.com/office/mac/drawingml/2011/main" val="1"/>
+                <ma14:wrappingTextBoxFlag xmlns:ma14="http://schemas.microsoft.com/office/mac/drawingml/2011/main" xmlns:a14="http://schemas.microsoft.com/office/drawing/2010/main" xmlns:m="http://schemas.openxmlformats.org/officeDocument/2006/math" xmlns="" val="1"/>
               </a:ext>
             </a:extLst>
           </p:spPr>
@@ -44835,7 +45262,7 @@
             <a:effectLst/>
             <a:extLst>
               <a:ext uri="{C572A759-6A51-4108-AA02-DFA0A04FC94B}">
-                <ma14:wrappingTextBoxFlag xmlns="" xmlns:m="http://schemas.openxmlformats.org/officeDocument/2006/math" xmlns:a14="http://schemas.microsoft.com/office/drawing/2010/main" xmlns:ma14="http://schemas.microsoft.com/office/mac/drawingml/2011/main" val="1"/>
+                <ma14:wrappingTextBoxFlag xmlns:ma14="http://schemas.microsoft.com/office/mac/drawingml/2011/main" xmlns:a14="http://schemas.microsoft.com/office/drawing/2010/main" xmlns:m="http://schemas.openxmlformats.org/officeDocument/2006/math" xmlns="" val="1"/>
               </a:ext>
             </a:extLst>
           </p:spPr>
@@ -44882,7 +45309,7 @@
             <a:effectLst/>
             <a:extLst>
               <a:ext uri="{C572A759-6A51-4108-AA02-DFA0A04FC94B}">
-                <ma14:wrappingTextBoxFlag xmlns="" xmlns:m="http://schemas.openxmlformats.org/officeDocument/2006/math" xmlns:a14="http://schemas.microsoft.com/office/drawing/2010/main" xmlns:ma14="http://schemas.microsoft.com/office/mac/drawingml/2011/main" val="1"/>
+                <ma14:wrappingTextBoxFlag xmlns:ma14="http://schemas.microsoft.com/office/mac/drawingml/2011/main" xmlns:a14="http://schemas.microsoft.com/office/drawing/2010/main" xmlns:m="http://schemas.openxmlformats.org/officeDocument/2006/math" xmlns="" val="1"/>
               </a:ext>
             </a:extLst>
           </p:spPr>
@@ -45332,7 +45759,7 @@
           </a:ln>
           <a:extLst>
             <a:ext uri="{C572A759-6A51-4108-AA02-DFA0A04FC94B}">
-              <ma14:wrappingTextBoxFlag xmlns="" xmlns:m="http://schemas.openxmlformats.org/officeDocument/2006/math" xmlns:a14="http://schemas.microsoft.com/office/drawing/2010/main" xmlns:ma14="http://schemas.microsoft.com/office/mac/drawingml/2011/main" val="1"/>
+              <ma14:wrappingTextBoxFlag xmlns:ma14="http://schemas.microsoft.com/office/mac/drawingml/2011/main" xmlns:a14="http://schemas.microsoft.com/office/drawing/2010/main" xmlns:m="http://schemas.openxmlformats.org/officeDocument/2006/math" xmlns="" val="1"/>
             </a:ext>
           </a:extLst>
         </p:spPr>
@@ -45398,7 +45825,7 @@
           </a:ln>
           <a:extLst>
             <a:ext uri="{C572A759-6A51-4108-AA02-DFA0A04FC94B}">
-              <ma14:wrappingTextBoxFlag xmlns="" xmlns:m="http://schemas.openxmlformats.org/officeDocument/2006/math" xmlns:a14="http://schemas.microsoft.com/office/drawing/2010/main" xmlns:ma14="http://schemas.microsoft.com/office/mac/drawingml/2011/main" val="1"/>
+              <ma14:wrappingTextBoxFlag xmlns:ma14="http://schemas.microsoft.com/office/mac/drawingml/2011/main" xmlns:a14="http://schemas.microsoft.com/office/drawing/2010/main" xmlns:m="http://schemas.openxmlformats.org/officeDocument/2006/math" xmlns="" val="1"/>
             </a:ext>
           </a:extLst>
         </p:spPr>
@@ -45538,7 +45965,7 @@
           </a:ln>
           <a:extLst>
             <a:ext uri="{C572A759-6A51-4108-AA02-DFA0A04FC94B}">
-              <ma14:wrappingTextBoxFlag xmlns="" xmlns:m="http://schemas.openxmlformats.org/officeDocument/2006/math" xmlns:a14="http://schemas.microsoft.com/office/drawing/2010/main" xmlns:ma14="http://schemas.microsoft.com/office/mac/drawingml/2011/main" val="1"/>
+              <ma14:wrappingTextBoxFlag xmlns:ma14="http://schemas.microsoft.com/office/mac/drawingml/2011/main" xmlns:a14="http://schemas.microsoft.com/office/drawing/2010/main" xmlns:m="http://schemas.openxmlformats.org/officeDocument/2006/math" xmlns="" val="1"/>
             </a:ext>
           </a:extLst>
         </p:spPr>
@@ -45582,7 +46009,7 @@
           </a:ln>
           <a:extLst>
             <a:ext uri="{C572A759-6A51-4108-AA02-DFA0A04FC94B}">
-              <ma14:wrappingTextBoxFlag xmlns="" xmlns:m="http://schemas.openxmlformats.org/officeDocument/2006/math" xmlns:a14="http://schemas.microsoft.com/office/drawing/2010/main" xmlns:ma14="http://schemas.microsoft.com/office/mac/drawingml/2011/main" val="1"/>
+              <ma14:wrappingTextBoxFlag xmlns:ma14="http://schemas.microsoft.com/office/mac/drawingml/2011/main" xmlns:a14="http://schemas.microsoft.com/office/drawing/2010/main" xmlns:m="http://schemas.openxmlformats.org/officeDocument/2006/math" xmlns="" val="1"/>
             </a:ext>
           </a:extLst>
         </p:spPr>
@@ -46149,7 +46576,7 @@
           </a:ln>
           <a:extLst>
             <a:ext uri="{C572A759-6A51-4108-AA02-DFA0A04FC94B}">
-              <ma14:wrappingTextBoxFlag xmlns="" xmlns:m="http://schemas.openxmlformats.org/officeDocument/2006/math" xmlns:a14="http://schemas.microsoft.com/office/drawing/2010/main" xmlns:ma14="http://schemas.microsoft.com/office/mac/drawingml/2011/main" val="1"/>
+              <ma14:wrappingTextBoxFlag xmlns:ma14="http://schemas.microsoft.com/office/mac/drawingml/2011/main" xmlns:a14="http://schemas.microsoft.com/office/drawing/2010/main" xmlns:m="http://schemas.openxmlformats.org/officeDocument/2006/math" xmlns="" val="1"/>
             </a:ext>
           </a:extLst>
         </p:spPr>
@@ -46215,7 +46642,7 @@
           </a:ln>
           <a:extLst>
             <a:ext uri="{C572A759-6A51-4108-AA02-DFA0A04FC94B}">
-              <ma14:wrappingTextBoxFlag xmlns="" xmlns:m="http://schemas.openxmlformats.org/officeDocument/2006/math" xmlns:a14="http://schemas.microsoft.com/office/drawing/2010/main" xmlns:ma14="http://schemas.microsoft.com/office/mac/drawingml/2011/main" val="1"/>
+              <ma14:wrappingTextBoxFlag xmlns:ma14="http://schemas.microsoft.com/office/mac/drawingml/2011/main" xmlns:a14="http://schemas.microsoft.com/office/drawing/2010/main" xmlns:m="http://schemas.openxmlformats.org/officeDocument/2006/math" xmlns="" val="1"/>
             </a:ext>
           </a:extLst>
         </p:spPr>
@@ -46355,7 +46782,7 @@
           </a:ln>
           <a:extLst>
             <a:ext uri="{C572A759-6A51-4108-AA02-DFA0A04FC94B}">
-              <ma14:wrappingTextBoxFlag xmlns="" xmlns:m="http://schemas.openxmlformats.org/officeDocument/2006/math" xmlns:a14="http://schemas.microsoft.com/office/drawing/2010/main" xmlns:ma14="http://schemas.microsoft.com/office/mac/drawingml/2011/main" val="1"/>
+              <ma14:wrappingTextBoxFlag xmlns:ma14="http://schemas.microsoft.com/office/mac/drawingml/2011/main" xmlns:a14="http://schemas.microsoft.com/office/drawing/2010/main" xmlns:m="http://schemas.openxmlformats.org/officeDocument/2006/math" xmlns="" val="1"/>
             </a:ext>
           </a:extLst>
         </p:spPr>
@@ -46399,7 +46826,7 @@
           </a:ln>
           <a:extLst>
             <a:ext uri="{C572A759-6A51-4108-AA02-DFA0A04FC94B}">
-              <ma14:wrappingTextBoxFlag xmlns="" xmlns:m="http://schemas.openxmlformats.org/officeDocument/2006/math" xmlns:a14="http://schemas.microsoft.com/office/drawing/2010/main" xmlns:ma14="http://schemas.microsoft.com/office/mac/drawingml/2011/main" val="1"/>
+              <ma14:wrappingTextBoxFlag xmlns:ma14="http://schemas.microsoft.com/office/mac/drawingml/2011/main" xmlns:a14="http://schemas.microsoft.com/office/drawing/2010/main" xmlns:m="http://schemas.openxmlformats.org/officeDocument/2006/math" xmlns="" val="1"/>
             </a:ext>
           </a:extLst>
         </p:spPr>
@@ -46890,7 +47317,7 @@
           </a:ln>
           <a:extLst>
             <a:ext uri="{C572A759-6A51-4108-AA02-DFA0A04FC94B}">
-              <ma14:wrappingTextBoxFlag xmlns="" xmlns:m="http://schemas.openxmlformats.org/officeDocument/2006/math" xmlns:a14="http://schemas.microsoft.com/office/drawing/2010/main" xmlns:ma14="http://schemas.microsoft.com/office/mac/drawingml/2011/main" val="1"/>
+              <ma14:wrappingTextBoxFlag xmlns:ma14="http://schemas.microsoft.com/office/mac/drawingml/2011/main" xmlns:a14="http://schemas.microsoft.com/office/drawing/2010/main" xmlns:m="http://schemas.openxmlformats.org/officeDocument/2006/math" xmlns="" val="1"/>
             </a:ext>
           </a:extLst>
         </p:spPr>
@@ -46941,8 +47368,8 @@
           <a:chExt cx="0" cy="0"/>
         </a:xfrm>
       </p:grpSpPr>
-      <mc:AlternateContent xmlns:mc="http://schemas.openxmlformats.org/markup-compatibility/2006" xmlns:a14="http://schemas.microsoft.com/office/drawing/2010/main">
-        <mc:Choice Requires="a14">
+      <mc:AlternateContent xmlns:mc="http://schemas.openxmlformats.org/markup-compatibility/2006">
+        <mc:Choice xmlns:a14="http://schemas.microsoft.com/office/drawing/2010/main" Requires="a14">
           <p:sp>
             <p:nvSpPr>
               <p:cNvPr id="308" name="Vergelijking"/>
@@ -46951,8 +47378,8 @@
             </p:nvSpPr>
             <p:spPr>
               <a:xfrm>
-                <a:off x="5620845" y="377943"/>
-                <a:ext cx="6340961" cy="785172"/>
+                <a:off x="5281947" y="358667"/>
+                <a:ext cx="7547323" cy="923073"/>
               </a:xfrm>
               <a:prstGeom prst="rect">
                 <a:avLst/>
@@ -46971,287 +47398,286 @@
                   <a:defRPr sz="1800"/>
                 </a:pPr>
                 <a14:m>
-                  <m:oMathPara xmlns:m="http://schemas.openxmlformats.org/officeDocument/2006/math">
-                    <m:oMathParaPr>
-                      <m:jc m:val="centerGroup"/>
-                    </m:oMathParaPr>
-                    <m:oMath xmlns:m="http://schemas.openxmlformats.org/officeDocument/2006/math">
-                      <m:sSubSup>
-                        <m:sSubSupPr>
-                          <m:ctrlPr>
-                            <a:rPr sz="4800" i="1">
-                              <a:solidFill>
-                                <a:srgbClr val="000000"/>
-                              </a:solidFill>
-                              <a:latin typeface="Cambria Math" panose="02040503050406030204" pitchFamily="18" charset="0"/>
-                            </a:rPr>
-                          </m:ctrlPr>
-                        </m:sSubSupPr>
-                        <m:e>
-                          <m:r>
-                            <a:rPr sz="4800" i="1">
-                              <a:solidFill>
-                                <a:srgbClr val="000000"/>
-                              </a:solidFill>
-                              <a:latin typeface="Cambria Math" panose="02040503050406030204" pitchFamily="18" charset="0"/>
-                            </a:rPr>
-                            <m:t>𝑎</m:t>
-                          </m:r>
-                        </m:e>
-                        <m:sub>
-                          <m:r>
-                            <a:rPr sz="4800" i="1">
-                              <a:solidFill>
-                                <a:srgbClr val="000000"/>
-                              </a:solidFill>
-                              <a:latin typeface="Cambria Math" panose="02040503050406030204" pitchFamily="18" charset="0"/>
-                            </a:rPr>
-                            <m:t>1</m:t>
-                          </m:r>
-                        </m:sub>
-                        <m:sup>
-                          <m:r>
-                            <a:rPr sz="4800" i="1">
-                              <a:solidFill>
-                                <a:srgbClr val="000000"/>
-                              </a:solidFill>
-                              <a:latin typeface="Cambria Math" panose="02040503050406030204" pitchFamily="18" charset="0"/>
-                            </a:rPr>
-                            <m:t>(2)</m:t>
-                          </m:r>
-                        </m:sup>
-                      </m:sSubSup>
-                      <m:r>
-                        <a:rPr sz="4800" i="1">
-                          <a:solidFill>
-                            <a:srgbClr val="000000"/>
-                          </a:solidFill>
-                          <a:latin typeface="Cambria Math" panose="02040503050406030204" pitchFamily="18" charset="0"/>
-                        </a:rPr>
-                        <m:t>=</m:t>
-                      </m:r>
-                      <m:r>
-                        <a:rPr sz="4800" i="1">
-                          <a:solidFill>
-                            <a:srgbClr val="000000"/>
-                          </a:solidFill>
-                          <a:latin typeface="Cambria Math" panose="02040503050406030204" pitchFamily="18" charset="0"/>
-                        </a:rPr>
-                        <m:t>𝑔</m:t>
-                      </m:r>
-                      <m:r>
-                        <a:rPr sz="4800" i="1">
-                          <a:solidFill>
-                            <a:srgbClr val="000000"/>
-                          </a:solidFill>
-                          <a:latin typeface="Cambria Math" panose="02040503050406030204" pitchFamily="18" charset="0"/>
-                        </a:rPr>
-                        <m:t>(</m:t>
-                      </m:r>
-                      <m:sSubSup>
-                        <m:sSubSupPr>
-                          <m:ctrlPr>
-                            <a:rPr sz="4800" i="1">
-                              <a:solidFill>
-                                <a:srgbClr val="000000"/>
-                              </a:solidFill>
-                              <a:latin typeface="Cambria Math" panose="02040503050406030204" pitchFamily="18" charset="0"/>
-                            </a:rPr>
-                          </m:ctrlPr>
-                        </m:sSubSupPr>
-                        <m:e>
-                          <m:r>
-                            <m:rPr>
-                              <m:sty m:val="p"/>
-                            </m:rPr>
-                            <a:rPr sz="4800" i="1">
-                              <a:solidFill>
-                                <a:srgbClr val="000000"/>
-                              </a:solidFill>
-                              <a:latin typeface="Cambria Math" panose="02040503050406030204" pitchFamily="18" charset="0"/>
-                            </a:rPr>
-                            <m:t>Θ</m:t>
-                          </m:r>
-                        </m:e>
-                        <m:sub>
-                          <m:r>
-                            <a:rPr sz="4800" i="1">
-                              <a:solidFill>
-                                <a:srgbClr val="000000"/>
-                              </a:solidFill>
-                              <a:latin typeface="Cambria Math" panose="02040503050406030204" pitchFamily="18" charset="0"/>
-                            </a:rPr>
-                            <m:t>11</m:t>
-                          </m:r>
-                        </m:sub>
-                        <m:sup>
-                          <m:r>
-                            <a:rPr sz="4800" i="1">
-                              <a:solidFill>
-                                <a:srgbClr val="000000"/>
-                              </a:solidFill>
-                              <a:latin typeface="Cambria Math" panose="02040503050406030204" pitchFamily="18" charset="0"/>
-                            </a:rPr>
-                            <m:t>(1)</m:t>
-                          </m:r>
-                        </m:sup>
-                      </m:sSubSup>
-                      <m:sSubSup>
-                        <m:sSubSupPr>
-                          <m:ctrlPr>
-                            <a:rPr sz="4800" i="1">
-                              <a:solidFill>
-                                <a:srgbClr val="000000"/>
-                              </a:solidFill>
-                              <a:latin typeface="Cambria Math" panose="02040503050406030204" pitchFamily="18" charset="0"/>
-                            </a:rPr>
-                          </m:ctrlPr>
-                        </m:sSubSupPr>
-                        <m:e>
-                          <m:r>
-                            <a:rPr sz="4800" i="1">
-                              <a:solidFill>
-                                <a:srgbClr val="000000"/>
-                              </a:solidFill>
-                              <a:latin typeface="Cambria Math" panose="02040503050406030204" pitchFamily="18" charset="0"/>
-                            </a:rPr>
-                            <m:t>𝑎</m:t>
-                          </m:r>
-                        </m:e>
-                        <m:sub>
-                          <m:r>
-                            <a:rPr sz="4800" i="1">
-                              <a:solidFill>
-                                <a:srgbClr val="000000"/>
-                              </a:solidFill>
-                              <a:latin typeface="Cambria Math" panose="02040503050406030204" pitchFamily="18" charset="0"/>
-                            </a:rPr>
-                            <m:t>1</m:t>
-                          </m:r>
-                        </m:sub>
-                        <m:sup>
-                          <m:r>
-                            <a:rPr sz="4800" i="1">
-                              <a:solidFill>
-                                <a:srgbClr val="000000"/>
-                              </a:solidFill>
-                              <a:latin typeface="Cambria Math" panose="02040503050406030204" pitchFamily="18" charset="0"/>
-                            </a:rPr>
-                            <m:t>(1)</m:t>
-                          </m:r>
-                        </m:sup>
-                      </m:sSubSup>
-                      <m:r>
-                        <a:rPr sz="4800" i="1">
-                          <a:solidFill>
-                            <a:srgbClr val="000000"/>
-                          </a:solidFill>
-                          <a:latin typeface="Cambria Math" panose="02040503050406030204" pitchFamily="18" charset="0"/>
-                        </a:rPr>
-                        <m:t>+</m:t>
-                      </m:r>
-                      <m:sSubSup>
-                        <m:sSubSupPr>
-                          <m:ctrlPr>
-                            <a:rPr sz="4800" i="1">
-                              <a:solidFill>
-                                <a:srgbClr val="000000"/>
-                              </a:solidFill>
-                              <a:latin typeface="Cambria Math" panose="02040503050406030204" pitchFamily="18" charset="0"/>
-                            </a:rPr>
-                          </m:ctrlPr>
-                        </m:sSubSupPr>
-                        <m:e>
-                          <m:r>
-                            <m:rPr>
-                              <m:sty m:val="p"/>
-                            </m:rPr>
-                            <a:rPr sz="4800" i="1">
-                              <a:solidFill>
-                                <a:srgbClr val="000000"/>
-                              </a:solidFill>
-                              <a:latin typeface="Cambria Math" panose="02040503050406030204" pitchFamily="18" charset="0"/>
-                            </a:rPr>
-                            <m:t>Θ</m:t>
-                          </m:r>
-                        </m:e>
-                        <m:sub>
-                          <m:r>
-                            <a:rPr sz="4800" i="1">
-                              <a:solidFill>
-                                <a:srgbClr val="000000"/>
-                              </a:solidFill>
-                              <a:latin typeface="Cambria Math" panose="02040503050406030204" pitchFamily="18" charset="0"/>
-                            </a:rPr>
-                            <m:t>12</m:t>
-                          </m:r>
-                        </m:sub>
-                        <m:sup>
-                          <m:r>
-                            <a:rPr sz="4800" i="1">
-                              <a:solidFill>
-                                <a:srgbClr val="000000"/>
-                              </a:solidFill>
-                              <a:latin typeface="Cambria Math" panose="02040503050406030204" pitchFamily="18" charset="0"/>
-                            </a:rPr>
-                            <m:t>(1)</m:t>
-                          </m:r>
-                        </m:sup>
-                      </m:sSubSup>
-                      <m:sSubSup>
-                        <m:sSubSupPr>
-                          <m:ctrlPr>
-                            <a:rPr sz="4800" i="1">
-                              <a:solidFill>
-                                <a:srgbClr val="000000"/>
-                              </a:solidFill>
-                              <a:latin typeface="Cambria Math" panose="02040503050406030204" pitchFamily="18" charset="0"/>
-                            </a:rPr>
-                          </m:ctrlPr>
-                        </m:sSubSupPr>
-                        <m:e>
-                          <m:r>
-                            <a:rPr sz="4800" i="1">
-                              <a:solidFill>
-                                <a:srgbClr val="000000"/>
-                              </a:solidFill>
-                              <a:latin typeface="Cambria Math" panose="02040503050406030204" pitchFamily="18" charset="0"/>
-                            </a:rPr>
-                            <m:t>𝑎</m:t>
-                          </m:r>
-                        </m:e>
-                        <m:sub>
-                          <m:r>
-                            <a:rPr sz="4800" i="1">
-                              <a:solidFill>
-                                <a:srgbClr val="000000"/>
-                              </a:solidFill>
-                              <a:latin typeface="Cambria Math" panose="02040503050406030204" pitchFamily="18" charset="0"/>
-                            </a:rPr>
-                            <m:t>2</m:t>
-                          </m:r>
-                        </m:sub>
-                        <m:sup>
-                          <m:r>
-                            <a:rPr sz="4800" i="1">
-                              <a:solidFill>
-                                <a:srgbClr val="000000"/>
-                              </a:solidFill>
-                              <a:latin typeface="Cambria Math" panose="02040503050406030204" pitchFamily="18" charset="0"/>
-                            </a:rPr>
-                            <m:t>(1)</m:t>
-                          </m:r>
-                        </m:sup>
-                      </m:sSubSup>
-                    </m:oMath>
-                  </m:oMathPara>
+                  <m:oMath xmlns:m="http://schemas.openxmlformats.org/officeDocument/2006/math">
+                    <m:sSubSup>
+                      <m:sSubSupPr>
+                        <m:ctrlPr>
+                          <a:rPr sz="4800" i="1">
+                            <a:solidFill>
+                              <a:srgbClr val="000000"/>
+                            </a:solidFill>
+                            <a:latin typeface="Cambria Math" panose="02040503050406030204" pitchFamily="18" charset="0"/>
+                          </a:rPr>
+                        </m:ctrlPr>
+                      </m:sSubSupPr>
+                      <m:e>
+                        <m:r>
+                          <a:rPr sz="4800" i="1">
+                            <a:solidFill>
+                              <a:srgbClr val="000000"/>
+                            </a:solidFill>
+                            <a:latin typeface="Cambria Math" panose="02040503050406030204" pitchFamily="18" charset="0"/>
+                          </a:rPr>
+                          <m:t>𝑎</m:t>
+                        </m:r>
+                      </m:e>
+                      <m:sub>
+                        <m:r>
+                          <a:rPr sz="4800" i="1">
+                            <a:solidFill>
+                              <a:srgbClr val="000000"/>
+                            </a:solidFill>
+                            <a:latin typeface="Cambria Math" panose="02040503050406030204" pitchFamily="18" charset="0"/>
+                          </a:rPr>
+                          <m:t>1</m:t>
+                        </m:r>
+                      </m:sub>
+                      <m:sup>
+                        <m:r>
+                          <a:rPr sz="4800" i="1">
+                            <a:solidFill>
+                              <a:srgbClr val="000000"/>
+                            </a:solidFill>
+                            <a:latin typeface="Cambria Math" panose="02040503050406030204" pitchFamily="18" charset="0"/>
+                          </a:rPr>
+                          <m:t>(2)</m:t>
+                        </m:r>
+                      </m:sup>
+                    </m:sSubSup>
+                    <m:r>
+                      <a:rPr sz="4800" i="1">
+                        <a:solidFill>
+                          <a:srgbClr val="000000"/>
+                        </a:solidFill>
+                        <a:latin typeface="Cambria Math" panose="02040503050406030204" pitchFamily="18" charset="0"/>
+                      </a:rPr>
+                      <m:t>=</m:t>
+                    </m:r>
+                    <m:r>
+                      <a:rPr sz="4800" i="1">
+                        <a:solidFill>
+                          <a:srgbClr val="000000"/>
+                        </a:solidFill>
+                        <a:latin typeface="Cambria Math" panose="02040503050406030204" pitchFamily="18" charset="0"/>
+                      </a:rPr>
+                      <m:t>𝑔</m:t>
+                    </m:r>
+                    <m:r>
+                      <a:rPr sz="4800" i="1">
+                        <a:solidFill>
+                          <a:srgbClr val="000000"/>
+                        </a:solidFill>
+                        <a:latin typeface="Cambria Math" panose="02040503050406030204" pitchFamily="18" charset="0"/>
+                      </a:rPr>
+                      <m:t>(</m:t>
+                    </m:r>
+                    <m:sSubSup>
+                      <m:sSubSupPr>
+                        <m:ctrlPr>
+                          <a:rPr sz="4800" i="1">
+                            <a:solidFill>
+                              <a:srgbClr val="000000"/>
+                            </a:solidFill>
+                            <a:latin typeface="Cambria Math" panose="02040503050406030204" pitchFamily="18" charset="0"/>
+                          </a:rPr>
+                        </m:ctrlPr>
+                      </m:sSubSupPr>
+                      <m:e>
+                        <m:r>
+                          <m:rPr>
+                            <m:sty m:val="p"/>
+                          </m:rPr>
+                          <a:rPr sz="4800" i="1">
+                            <a:solidFill>
+                              <a:srgbClr val="000000"/>
+                            </a:solidFill>
+                            <a:latin typeface="Cambria Math" panose="02040503050406030204" pitchFamily="18" charset="0"/>
+                          </a:rPr>
+                          <m:t>Θ</m:t>
+                        </m:r>
+                      </m:e>
+                      <m:sub>
+                        <m:r>
+                          <a:rPr sz="4800" i="1">
+                            <a:solidFill>
+                              <a:srgbClr val="000000"/>
+                            </a:solidFill>
+                            <a:latin typeface="Cambria Math" panose="02040503050406030204" pitchFamily="18" charset="0"/>
+                          </a:rPr>
+                          <m:t>11</m:t>
+                        </m:r>
+                      </m:sub>
+                      <m:sup>
+                        <m:r>
+                          <a:rPr sz="4800" i="1">
+                            <a:solidFill>
+                              <a:srgbClr val="000000"/>
+                            </a:solidFill>
+                            <a:latin typeface="Cambria Math" panose="02040503050406030204" pitchFamily="18" charset="0"/>
+                          </a:rPr>
+                          <m:t>(1)</m:t>
+                        </m:r>
+                      </m:sup>
+                    </m:sSubSup>
+                    <m:sSubSup>
+                      <m:sSubSupPr>
+                        <m:ctrlPr>
+                          <a:rPr sz="4800" i="1">
+                            <a:solidFill>
+                              <a:srgbClr val="000000"/>
+                            </a:solidFill>
+                            <a:latin typeface="Cambria Math" panose="02040503050406030204" pitchFamily="18" charset="0"/>
+                          </a:rPr>
+                        </m:ctrlPr>
+                      </m:sSubSupPr>
+                      <m:e>
+                        <m:r>
+                          <a:rPr sz="4800" i="1">
+                            <a:solidFill>
+                              <a:srgbClr val="000000"/>
+                            </a:solidFill>
+                            <a:latin typeface="Cambria Math" panose="02040503050406030204" pitchFamily="18" charset="0"/>
+                          </a:rPr>
+                          <m:t>𝑎</m:t>
+                        </m:r>
+                      </m:e>
+                      <m:sub>
+                        <m:r>
+                          <a:rPr sz="4800" i="1">
+                            <a:solidFill>
+                              <a:srgbClr val="000000"/>
+                            </a:solidFill>
+                            <a:latin typeface="Cambria Math" panose="02040503050406030204" pitchFamily="18" charset="0"/>
+                          </a:rPr>
+                          <m:t>1</m:t>
+                        </m:r>
+                      </m:sub>
+                      <m:sup>
+                        <m:r>
+                          <a:rPr sz="4800" i="1">
+                            <a:solidFill>
+                              <a:srgbClr val="000000"/>
+                            </a:solidFill>
+                            <a:latin typeface="Cambria Math" panose="02040503050406030204" pitchFamily="18" charset="0"/>
+                          </a:rPr>
+                          <m:t>(1)</m:t>
+                        </m:r>
+                      </m:sup>
+                    </m:sSubSup>
+                    <m:r>
+                      <a:rPr sz="4800" i="1">
+                        <a:solidFill>
+                          <a:srgbClr val="000000"/>
+                        </a:solidFill>
+                        <a:latin typeface="Cambria Math" panose="02040503050406030204" pitchFamily="18" charset="0"/>
+                      </a:rPr>
+                      <m:t>+</m:t>
+                    </m:r>
+                    <m:sSubSup>
+                      <m:sSubSupPr>
+                        <m:ctrlPr>
+                          <a:rPr sz="4800" i="1">
+                            <a:solidFill>
+                              <a:srgbClr val="000000"/>
+                            </a:solidFill>
+                            <a:latin typeface="Cambria Math" panose="02040503050406030204" pitchFamily="18" charset="0"/>
+                          </a:rPr>
+                        </m:ctrlPr>
+                      </m:sSubSupPr>
+                      <m:e>
+                        <m:r>
+                          <m:rPr>
+                            <m:sty m:val="p"/>
+                          </m:rPr>
+                          <a:rPr sz="4800" i="1">
+                            <a:solidFill>
+                              <a:srgbClr val="000000"/>
+                            </a:solidFill>
+                            <a:latin typeface="Cambria Math" panose="02040503050406030204" pitchFamily="18" charset="0"/>
+                          </a:rPr>
+                          <m:t>Θ</m:t>
+                        </m:r>
+                      </m:e>
+                      <m:sub>
+                        <m:r>
+                          <a:rPr sz="4800" i="1">
+                            <a:solidFill>
+                              <a:srgbClr val="000000"/>
+                            </a:solidFill>
+                            <a:latin typeface="Cambria Math" panose="02040503050406030204" pitchFamily="18" charset="0"/>
+                          </a:rPr>
+                          <m:t>12</m:t>
+                        </m:r>
+                      </m:sub>
+                      <m:sup>
+                        <m:r>
+                          <a:rPr sz="4800" i="1">
+                            <a:solidFill>
+                              <a:srgbClr val="000000"/>
+                            </a:solidFill>
+                            <a:latin typeface="Cambria Math" panose="02040503050406030204" pitchFamily="18" charset="0"/>
+                          </a:rPr>
+                          <m:t>(1)</m:t>
+                        </m:r>
+                      </m:sup>
+                    </m:sSubSup>
+                    <m:sSubSup>
+                      <m:sSubSupPr>
+                        <m:ctrlPr>
+                          <a:rPr sz="4800" i="1">
+                            <a:solidFill>
+                              <a:srgbClr val="000000"/>
+                            </a:solidFill>
+                            <a:latin typeface="Cambria Math" panose="02040503050406030204" pitchFamily="18" charset="0"/>
+                          </a:rPr>
+                        </m:ctrlPr>
+                      </m:sSubSupPr>
+                      <m:e>
+                        <m:r>
+                          <a:rPr sz="4800" i="1">
+                            <a:solidFill>
+                              <a:srgbClr val="000000"/>
+                            </a:solidFill>
+                            <a:latin typeface="Cambria Math" panose="02040503050406030204" pitchFamily="18" charset="0"/>
+                          </a:rPr>
+                          <m:t>𝑎</m:t>
+                        </m:r>
+                      </m:e>
+                      <m:sub>
+                        <m:r>
+                          <a:rPr sz="4800" i="1">
+                            <a:solidFill>
+                              <a:srgbClr val="000000"/>
+                            </a:solidFill>
+                            <a:latin typeface="Cambria Math" panose="02040503050406030204" pitchFamily="18" charset="0"/>
+                          </a:rPr>
+                          <m:t>2</m:t>
+                        </m:r>
+                      </m:sub>
+                      <m:sup>
+                        <m:r>
+                          <a:rPr sz="4800" i="1">
+                            <a:solidFill>
+                              <a:srgbClr val="000000"/>
+                            </a:solidFill>
+                            <a:latin typeface="Cambria Math" panose="02040503050406030204" pitchFamily="18" charset="0"/>
+                          </a:rPr>
+                          <m:t>(1)</m:t>
+                        </m:r>
+                      </m:sup>
+                    </m:sSubSup>
+                  </m:oMath>
                 </a14:m>
+                <a:r>
+                  <a:rPr lang="nl-NL" sz="4800"/>
+                  <a:t>)</a:t>
+                </a:r>
                 <a:endParaRPr sz="4800"/>
               </a:p>
             </p:txBody>
           </p:sp>
         </mc:Choice>
-        <mc:Fallback xmlns="">
+        <mc:Fallback>
           <p:sp>
             <p:nvSpPr>
               <p:cNvPr id="308" name="Vergelijking"/>
@@ -47262,8 +47688,8 @@
             </p:nvSpPr>
             <p:spPr>
               <a:xfrm>
-                <a:off x="5620845" y="377943"/>
-                <a:ext cx="6340961" cy="785172"/>
+                <a:off x="5281947" y="358667"/>
+                <a:ext cx="7547323" cy="923073"/>
               </a:xfrm>
               <a:prstGeom prst="rect">
                 <a:avLst/>
@@ -47271,7 +47697,7 @@
               <a:blipFill>
                 <a:blip r:embed="rId2"/>
                 <a:stretch>
-                  <a:fillRect r="-13654" b="-16279"/>
+                  <a:fillRect t="-5298" r="-3874" b="-34437"/>
                 </a:stretch>
               </a:blipFill>
               <a:ln w="12700">
@@ -47637,7 +48063,7 @@
             <a:effectLst/>
             <a:extLst>
               <a:ext uri="{C572A759-6A51-4108-AA02-DFA0A04FC94B}">
-                <ma14:wrappingTextBoxFlag xmlns="" xmlns:m="http://schemas.openxmlformats.org/officeDocument/2006/math" xmlns:a14="http://schemas.microsoft.com/office/drawing/2010/main" xmlns:ma14="http://schemas.microsoft.com/office/mac/drawingml/2011/main" val="1"/>
+                <ma14:wrappingTextBoxFlag xmlns:ma14="http://schemas.microsoft.com/office/mac/drawingml/2011/main" xmlns:a14="http://schemas.microsoft.com/office/drawing/2010/main" xmlns:m="http://schemas.openxmlformats.org/officeDocument/2006/math" xmlns="" val="1"/>
               </a:ext>
             </a:extLst>
           </p:spPr>
@@ -47707,7 +48133,7 @@
             <a:effectLst/>
             <a:extLst>
               <a:ext uri="{C572A759-6A51-4108-AA02-DFA0A04FC94B}">
-                <ma14:wrappingTextBoxFlag xmlns="" xmlns:m="http://schemas.openxmlformats.org/officeDocument/2006/math" xmlns:a14="http://schemas.microsoft.com/office/drawing/2010/main" xmlns:ma14="http://schemas.microsoft.com/office/mac/drawingml/2011/main" val="1"/>
+                <ma14:wrappingTextBoxFlag xmlns:ma14="http://schemas.microsoft.com/office/mac/drawingml/2011/main" xmlns:a14="http://schemas.microsoft.com/office/drawing/2010/main" xmlns:m="http://schemas.openxmlformats.org/officeDocument/2006/math" xmlns="" val="1"/>
               </a:ext>
             </a:extLst>
           </p:spPr>
@@ -47830,7 +48256,7 @@
             <a:effectLst/>
             <a:extLst>
               <a:ext uri="{C572A759-6A51-4108-AA02-DFA0A04FC94B}">
-                <ma14:wrappingTextBoxFlag xmlns="" xmlns:m="http://schemas.openxmlformats.org/officeDocument/2006/math" xmlns:a14="http://schemas.microsoft.com/office/drawing/2010/main" xmlns:ma14="http://schemas.microsoft.com/office/mac/drawingml/2011/main" val="1"/>
+                <ma14:wrappingTextBoxFlag xmlns:ma14="http://schemas.microsoft.com/office/mac/drawingml/2011/main" xmlns:a14="http://schemas.microsoft.com/office/drawing/2010/main" xmlns:m="http://schemas.openxmlformats.org/officeDocument/2006/math" xmlns="" val="1"/>
               </a:ext>
             </a:extLst>
           </p:spPr>
@@ -47877,7 +48303,7 @@
             <a:effectLst/>
             <a:extLst>
               <a:ext uri="{C572A759-6A51-4108-AA02-DFA0A04FC94B}">
-                <ma14:wrappingTextBoxFlag xmlns="" xmlns:m="http://schemas.openxmlformats.org/officeDocument/2006/math" xmlns:a14="http://schemas.microsoft.com/office/drawing/2010/main" xmlns:ma14="http://schemas.microsoft.com/office/mac/drawingml/2011/main" val="1"/>
+                <ma14:wrappingTextBoxFlag xmlns:ma14="http://schemas.microsoft.com/office/mac/drawingml/2011/main" xmlns:a14="http://schemas.microsoft.com/office/drawing/2010/main" xmlns:m="http://schemas.openxmlformats.org/officeDocument/2006/math" xmlns="" val="1"/>
               </a:ext>
             </a:extLst>
           </p:spPr>
@@ -48096,7 +48522,7 @@
             <a:effectLst/>
             <a:extLst>
               <a:ext uri="{C572A759-6A51-4108-AA02-DFA0A04FC94B}">
-                <ma14:wrappingTextBoxFlag xmlns="" xmlns:m="http://schemas.openxmlformats.org/officeDocument/2006/math" xmlns:a14="http://schemas.microsoft.com/office/drawing/2010/main" xmlns:ma14="http://schemas.microsoft.com/office/mac/drawingml/2011/main" val="1"/>
+                <ma14:wrappingTextBoxFlag xmlns:ma14="http://schemas.microsoft.com/office/mac/drawingml/2011/main" xmlns:a14="http://schemas.microsoft.com/office/drawing/2010/main" xmlns:m="http://schemas.openxmlformats.org/officeDocument/2006/math" xmlns="" val="1"/>
               </a:ext>
             </a:extLst>
           </p:spPr>
@@ -48159,7 +48585,7 @@
             <a:effectLst/>
             <a:extLst>
               <a:ext uri="{C572A759-6A51-4108-AA02-DFA0A04FC94B}">
-                <ma14:wrappingTextBoxFlag xmlns="" xmlns:m="http://schemas.openxmlformats.org/officeDocument/2006/math" xmlns:a14="http://schemas.microsoft.com/office/drawing/2010/main" xmlns:ma14="http://schemas.microsoft.com/office/mac/drawingml/2011/main" val="1"/>
+                <ma14:wrappingTextBoxFlag xmlns:ma14="http://schemas.microsoft.com/office/mac/drawingml/2011/main" xmlns:a14="http://schemas.microsoft.com/office/drawing/2010/main" xmlns:m="http://schemas.openxmlformats.org/officeDocument/2006/math" xmlns="" val="1"/>
               </a:ext>
             </a:extLst>
           </p:spPr>
@@ -49280,6 +49706,53 @@
           </mc:Fallback>
         </mc:AlternateContent>
       </p:grpSp>
+      <p:cxnSp>
+        <p:nvCxnSpPr>
+          <p:cNvPr id="3" name="Rechte verbindingslijn 2">
+            <a:extLst>
+              <a:ext uri="{FF2B5EF4-FFF2-40B4-BE49-F238E27FC236}">
+                <a16:creationId xmlns:a16="http://schemas.microsoft.com/office/drawing/2014/main" id="{2A5CEA34-021E-D167-031F-C12911476867}"/>
+              </a:ext>
+            </a:extLst>
+          </p:cNvPr>
+          <p:cNvCxnSpPr/>
+          <p:nvPr/>
+        </p:nvCxnSpPr>
+        <p:spPr>
+          <a:xfrm flipH="1" flipV="1">
+            <a:off x="6028153" y="1080655"/>
+            <a:ext cx="1896647" cy="1105369"/>
+          </a:xfrm>
+          <a:prstGeom prst="line">
+            <a:avLst/>
+          </a:prstGeom>
+          <a:noFill/>
+          <a:ln w="25400" cap="flat">
+            <a:solidFill>
+              <a:schemeClr val="accent6">
+                <a:lumMod val="60000"/>
+                <a:lumOff val="40000"/>
+              </a:schemeClr>
+            </a:solidFill>
+            <a:prstDash val="solid"/>
+            <a:miter lim="400000"/>
+          </a:ln>
+          <a:effectLst/>
+          <a:sp3d/>
+        </p:spPr>
+        <p:style>
+          <a:lnRef idx="0">
+            <a:scrgbClr r="0" g="0" b="0"/>
+          </a:lnRef>
+          <a:fillRef idx="0">
+            <a:scrgbClr r="0" g="0" b="0"/>
+          </a:fillRef>
+          <a:effectRef idx="0">
+            <a:scrgbClr r="0" g="0" b="0"/>
+          </a:effectRef>
+          <a:fontRef idx="none"/>
+        </p:style>
+      </p:cxnSp>
     </p:spTree>
   </p:cSld>
   <p:clrMapOvr>

</xml_diff>

<commit_message>
Consistent numbering of Theta and Delta vectors
</commit_message>
<xml_diff>
--- a/docs/lectures/wk4/ML_wk4_Neurale_netwerken.pptx
+++ b/docs/lectures/wk4/ML_wk4_Neurale_netwerken.pptx
@@ -2535,7 +2535,7 @@
           </a:ln>
           <a:extLst>
             <a:ext uri="{C572A759-6A51-4108-AA02-DFA0A04FC94B}">
-              <ma14:wrappingTextBoxFlag xmlns="" xmlns:m="http://schemas.openxmlformats.org/officeDocument/2006/math" xmlns:a14="http://schemas.microsoft.com/office/drawing/2010/main" xmlns:ma14="http://schemas.microsoft.com/office/mac/drawingml/2011/main" val="1"/>
+              <ma14:wrappingTextBoxFlag xmlns:ma14="http://schemas.microsoft.com/office/mac/drawingml/2011/main" xmlns:a14="http://schemas.microsoft.com/office/drawing/2010/main" xmlns:m="http://schemas.openxmlformats.org/officeDocument/2006/math" xmlns="" val="1"/>
             </a:ext>
           </a:extLst>
         </p:spPr>
@@ -2574,7 +2574,7 @@
           </a:ln>
           <a:extLst>
             <a:ext uri="{C572A759-6A51-4108-AA02-DFA0A04FC94B}">
-              <ma14:wrappingTextBoxFlag xmlns="" xmlns:m="http://schemas.openxmlformats.org/officeDocument/2006/math" xmlns:a14="http://schemas.microsoft.com/office/drawing/2010/main" xmlns:ma14="http://schemas.microsoft.com/office/mac/drawingml/2011/main" val="1"/>
+              <ma14:wrappingTextBoxFlag xmlns:ma14="http://schemas.microsoft.com/office/mac/drawingml/2011/main" xmlns:a14="http://schemas.microsoft.com/office/drawing/2010/main" xmlns:m="http://schemas.openxmlformats.org/officeDocument/2006/math" xmlns="" val="1"/>
             </a:ext>
           </a:extLst>
         </p:spPr>
@@ -3448,7 +3448,7 @@
           </a:ln>
           <a:extLst>
             <a:ext uri="{C572A759-6A51-4108-AA02-DFA0A04FC94B}">
-              <ma14:wrappingTextBoxFlag xmlns="" xmlns:m="http://schemas.openxmlformats.org/officeDocument/2006/math" xmlns:a14="http://schemas.microsoft.com/office/drawing/2010/main" xmlns:ma14="http://schemas.microsoft.com/office/mac/drawingml/2011/main" val="1"/>
+              <ma14:wrappingTextBoxFlag xmlns:ma14="http://schemas.microsoft.com/office/mac/drawingml/2011/main" xmlns:a14="http://schemas.microsoft.com/office/drawing/2010/main" xmlns:m="http://schemas.openxmlformats.org/officeDocument/2006/math" xmlns="" val="1"/>
             </a:ext>
           </a:extLst>
         </p:spPr>
@@ -3530,7 +3530,7 @@
           </a:ln>
           <a:extLst>
             <a:ext uri="{C572A759-6A51-4108-AA02-DFA0A04FC94B}">
-              <ma14:wrappingTextBoxFlag xmlns="" xmlns:m="http://schemas.openxmlformats.org/officeDocument/2006/math" xmlns:a14="http://schemas.microsoft.com/office/drawing/2010/main" xmlns:ma14="http://schemas.microsoft.com/office/mac/drawingml/2011/main" val="1"/>
+              <ma14:wrappingTextBoxFlag xmlns:ma14="http://schemas.microsoft.com/office/mac/drawingml/2011/main" xmlns:a14="http://schemas.microsoft.com/office/drawing/2010/main" xmlns:m="http://schemas.openxmlformats.org/officeDocument/2006/math" xmlns="" val="1"/>
             </a:ext>
           </a:extLst>
         </p:spPr>
@@ -3633,7 +3633,7 @@
             <a:effectLst/>
             <a:extLst>
               <a:ext uri="{C572A759-6A51-4108-AA02-DFA0A04FC94B}">
-                <ma14:wrappingTextBoxFlag xmlns="" xmlns:m="http://schemas.openxmlformats.org/officeDocument/2006/math" xmlns:a14="http://schemas.microsoft.com/office/drawing/2010/main" xmlns:ma14="http://schemas.microsoft.com/office/mac/drawingml/2011/main" val="1"/>
+                <ma14:wrappingTextBoxFlag xmlns:ma14="http://schemas.microsoft.com/office/mac/drawingml/2011/main" xmlns:a14="http://schemas.microsoft.com/office/drawing/2010/main" xmlns:m="http://schemas.openxmlformats.org/officeDocument/2006/math" xmlns="" val="1"/>
               </a:ext>
             </a:extLst>
           </p:spPr>
@@ -4036,7 +4036,7 @@
             <a:effectLst/>
             <a:extLst>
               <a:ext uri="{C572A759-6A51-4108-AA02-DFA0A04FC94B}">
-                <ma14:wrappingTextBoxFlag xmlns="" xmlns:m="http://schemas.openxmlformats.org/officeDocument/2006/math" xmlns:a14="http://schemas.microsoft.com/office/drawing/2010/main" xmlns:ma14="http://schemas.microsoft.com/office/mac/drawingml/2011/main" val="1"/>
+                <ma14:wrappingTextBoxFlag xmlns:ma14="http://schemas.microsoft.com/office/mac/drawingml/2011/main" xmlns:a14="http://schemas.microsoft.com/office/drawing/2010/main" xmlns:m="http://schemas.openxmlformats.org/officeDocument/2006/math" xmlns="" val="1"/>
               </a:ext>
             </a:extLst>
           </p:spPr>
@@ -6214,7 +6214,7 @@
             <a:effectLst/>
             <a:extLst>
               <a:ext uri="{C572A759-6A51-4108-AA02-DFA0A04FC94B}">
-                <ma14:wrappingTextBoxFlag xmlns="" xmlns:m="http://schemas.openxmlformats.org/officeDocument/2006/math" xmlns:a14="http://schemas.microsoft.com/office/drawing/2010/main" xmlns:ma14="http://schemas.microsoft.com/office/mac/drawingml/2011/main" val="1"/>
+                <ma14:wrappingTextBoxFlag xmlns:ma14="http://schemas.microsoft.com/office/mac/drawingml/2011/main" xmlns:a14="http://schemas.microsoft.com/office/drawing/2010/main" xmlns:m="http://schemas.openxmlformats.org/officeDocument/2006/math" xmlns="" val="1"/>
               </a:ext>
             </a:extLst>
           </p:spPr>
@@ -6261,7 +6261,7 @@
             <a:effectLst/>
             <a:extLst>
               <a:ext uri="{C572A759-6A51-4108-AA02-DFA0A04FC94B}">
-                <ma14:wrappingTextBoxFlag xmlns="" xmlns:m="http://schemas.openxmlformats.org/officeDocument/2006/math" xmlns:a14="http://schemas.microsoft.com/office/drawing/2010/main" xmlns:ma14="http://schemas.microsoft.com/office/mac/drawingml/2011/main" val="1"/>
+                <ma14:wrappingTextBoxFlag xmlns:ma14="http://schemas.microsoft.com/office/mac/drawingml/2011/main" xmlns:a14="http://schemas.microsoft.com/office/drawing/2010/main" xmlns:m="http://schemas.openxmlformats.org/officeDocument/2006/math" xmlns="" val="1"/>
               </a:ext>
             </a:extLst>
           </p:spPr>
@@ -6308,7 +6308,7 @@
             <a:effectLst/>
             <a:extLst>
               <a:ext uri="{C572A759-6A51-4108-AA02-DFA0A04FC94B}">
-                <ma14:wrappingTextBoxFlag xmlns="" xmlns:m="http://schemas.openxmlformats.org/officeDocument/2006/math" xmlns:a14="http://schemas.microsoft.com/office/drawing/2010/main" xmlns:ma14="http://schemas.microsoft.com/office/mac/drawingml/2011/main" val="1"/>
+                <ma14:wrappingTextBoxFlag xmlns:ma14="http://schemas.microsoft.com/office/mac/drawingml/2011/main" xmlns:a14="http://schemas.microsoft.com/office/drawing/2010/main" xmlns:m="http://schemas.openxmlformats.org/officeDocument/2006/math" xmlns="" val="1"/>
               </a:ext>
             </a:extLst>
           </p:spPr>
@@ -6553,7 +6553,7 @@
             <a:effectLst/>
             <a:extLst>
               <a:ext uri="{C572A759-6A51-4108-AA02-DFA0A04FC94B}">
-                <ma14:wrappingTextBoxFlag xmlns="" xmlns:m="http://schemas.openxmlformats.org/officeDocument/2006/math" xmlns:a14="http://schemas.microsoft.com/office/drawing/2010/main" xmlns:ma14="http://schemas.microsoft.com/office/mac/drawingml/2011/main" val="1"/>
+                <ma14:wrappingTextBoxFlag xmlns:ma14="http://schemas.microsoft.com/office/mac/drawingml/2011/main" xmlns:a14="http://schemas.microsoft.com/office/drawing/2010/main" xmlns:m="http://schemas.openxmlformats.org/officeDocument/2006/math" xmlns="" val="1"/>
               </a:ext>
             </a:extLst>
           </p:spPr>
@@ -6729,7 +6729,7 @@
             <a:effectLst/>
             <a:extLst>
               <a:ext uri="{C572A759-6A51-4108-AA02-DFA0A04FC94B}">
-                <ma14:wrappingTextBoxFlag xmlns="" xmlns:m="http://schemas.openxmlformats.org/officeDocument/2006/math" xmlns:a14="http://schemas.microsoft.com/office/drawing/2010/main" xmlns:ma14="http://schemas.microsoft.com/office/mac/drawingml/2011/main" val="1"/>
+                <ma14:wrappingTextBoxFlag xmlns:ma14="http://schemas.microsoft.com/office/mac/drawingml/2011/main" xmlns:a14="http://schemas.microsoft.com/office/drawing/2010/main" xmlns:m="http://schemas.openxmlformats.org/officeDocument/2006/math" xmlns="" val="1"/>
               </a:ext>
             </a:extLst>
           </p:spPr>
@@ -7821,6 +7821,334 @@
           </p:sp>
         </mc:Fallback>
       </mc:AlternateContent>
+      <p:sp>
+        <p:nvSpPr>
+          <p:cNvPr id="2" name="Tekstvak 1">
+            <a:extLst>
+              <a:ext uri="{FF2B5EF4-FFF2-40B4-BE49-F238E27FC236}">
+                <a16:creationId xmlns:a16="http://schemas.microsoft.com/office/drawing/2014/main" id="{A10584E0-395A-02E7-2029-39AFC9A903C8}"/>
+              </a:ext>
+            </a:extLst>
+          </p:cNvPr>
+          <p:cNvSpPr txBox="1"/>
+          <p:nvPr/>
+        </p:nvSpPr>
+        <p:spPr>
+          <a:xfrm>
+            <a:off x="1400492" y="7351215"/>
+            <a:ext cx="1460837" cy="533479"/>
+          </a:xfrm>
+          <a:prstGeom prst="rect">
+            <a:avLst/>
+          </a:prstGeom>
+          <a:noFill/>
+          <a:ln w="12700" cap="flat">
+            <a:noFill/>
+            <a:miter lim="400000"/>
+          </a:ln>
+          <a:effectLst/>
+          <a:sp3d/>
+        </p:spPr>
+        <p:style>
+          <a:lnRef idx="0">
+            <a:scrgbClr r="0" g="0" b="0"/>
+          </a:lnRef>
+          <a:fillRef idx="0">
+            <a:scrgbClr r="0" g="0" b="0"/>
+          </a:fillRef>
+          <a:effectRef idx="0">
+            <a:scrgbClr r="0" g="0" b="0"/>
+          </a:effectRef>
+          <a:fontRef idx="none"/>
+        </p:style>
+        <p:txBody>
+          <a:bodyPr rot="0" spcFirstLastPara="1" vertOverflow="overflow" horzOverflow="overflow" vert="horz" wrap="square" lIns="50800" tIns="50800" rIns="50800" bIns="50800" numCol="1" spcCol="38100" rtlCol="0" anchor="ctr">
+            <a:spAutoFit/>
+          </a:bodyPr>
+          <a:lstStyle/>
+          <a:p>
+            <a:pPr marL="0" marR="0" indent="0" algn="ctr" defTabSz="584200" rtl="0" fontAlgn="auto" latinLnBrk="0" hangingPunct="0">
+              <a:lnSpc>
+                <a:spcPct val="100000"/>
+              </a:lnSpc>
+              <a:spcBef>
+                <a:spcPts val="0"/>
+              </a:spcBef>
+              <a:spcAft>
+                <a:spcPts val="0"/>
+              </a:spcAft>
+              <a:buClrTx/>
+              <a:buSzTx/>
+              <a:buFontTx/>
+              <a:buNone/>
+              <a:tabLst/>
+            </a:pPr>
+            <a:r>
+              <a:rPr kumimoji="0" lang="nl-NL" sz="2800" b="0" i="0" u="none" strike="noStrike" cap="none" spc="0" normalizeH="0" baseline="0">
+                <a:ln>
+                  <a:noFill/>
+                </a:ln>
+                <a:solidFill>
+                  <a:srgbClr val="000000"/>
+                </a:solidFill>
+                <a:effectLst/>
+                <a:uFillTx/>
+                <a:latin typeface="+mn-lt"/>
+                <a:ea typeface="+mn-ea"/>
+                <a:cs typeface="+mn-cs"/>
+                <a:sym typeface="Helvetica Light"/>
+              </a:rPr>
+              <a:t>Laag 1</a:t>
+            </a:r>
+          </a:p>
+        </p:txBody>
+      </p:sp>
+      <p:sp>
+        <p:nvSpPr>
+          <p:cNvPr id="3" name="Tekstvak 2">
+            <a:extLst>
+              <a:ext uri="{FF2B5EF4-FFF2-40B4-BE49-F238E27FC236}">
+                <a16:creationId xmlns:a16="http://schemas.microsoft.com/office/drawing/2014/main" id="{7B6988C6-23F1-B401-F1B5-575117FBA1EB}"/>
+              </a:ext>
+            </a:extLst>
+          </p:cNvPr>
+          <p:cNvSpPr txBox="1"/>
+          <p:nvPr/>
+        </p:nvSpPr>
+        <p:spPr>
+          <a:xfrm>
+            <a:off x="4051585" y="7351215"/>
+            <a:ext cx="1460837" cy="533479"/>
+          </a:xfrm>
+          <a:prstGeom prst="rect">
+            <a:avLst/>
+          </a:prstGeom>
+          <a:noFill/>
+          <a:ln w="12700" cap="flat">
+            <a:noFill/>
+            <a:miter lim="400000"/>
+          </a:ln>
+          <a:effectLst/>
+          <a:sp3d/>
+        </p:spPr>
+        <p:style>
+          <a:lnRef idx="0">
+            <a:scrgbClr r="0" g="0" b="0"/>
+          </a:lnRef>
+          <a:fillRef idx="0">
+            <a:scrgbClr r="0" g="0" b="0"/>
+          </a:fillRef>
+          <a:effectRef idx="0">
+            <a:scrgbClr r="0" g="0" b="0"/>
+          </a:effectRef>
+          <a:fontRef idx="none"/>
+        </p:style>
+        <p:txBody>
+          <a:bodyPr rot="0" spcFirstLastPara="1" vertOverflow="overflow" horzOverflow="overflow" vert="horz" wrap="square" lIns="50800" tIns="50800" rIns="50800" bIns="50800" numCol="1" spcCol="38100" rtlCol="0" anchor="ctr">
+            <a:spAutoFit/>
+          </a:bodyPr>
+          <a:lstStyle/>
+          <a:p>
+            <a:pPr marL="0" marR="0" indent="0" algn="ctr" defTabSz="584200" rtl="0" fontAlgn="auto" latinLnBrk="0" hangingPunct="0">
+              <a:lnSpc>
+                <a:spcPct val="100000"/>
+              </a:lnSpc>
+              <a:spcBef>
+                <a:spcPts val="0"/>
+              </a:spcBef>
+              <a:spcAft>
+                <a:spcPts val="0"/>
+              </a:spcAft>
+              <a:buClrTx/>
+              <a:buSzTx/>
+              <a:buFontTx/>
+              <a:buNone/>
+              <a:tabLst/>
+            </a:pPr>
+            <a:r>
+              <a:rPr kumimoji="0" lang="nl-NL" sz="2800" b="0" i="0" u="none" strike="noStrike" cap="none" spc="0" normalizeH="0" baseline="0">
+                <a:ln>
+                  <a:noFill/>
+                </a:ln>
+                <a:solidFill>
+                  <a:srgbClr val="000000"/>
+                </a:solidFill>
+                <a:effectLst/>
+                <a:uFillTx/>
+                <a:latin typeface="+mn-lt"/>
+                <a:ea typeface="+mn-ea"/>
+                <a:cs typeface="+mn-cs"/>
+                <a:sym typeface="Helvetica Light"/>
+              </a:rPr>
+              <a:t>Laag 2</a:t>
+            </a:r>
+          </a:p>
+        </p:txBody>
+      </p:sp>
+      <p:sp>
+        <p:nvSpPr>
+          <p:cNvPr id="4" name="Tekstvak 3">
+            <a:extLst>
+              <a:ext uri="{FF2B5EF4-FFF2-40B4-BE49-F238E27FC236}">
+                <a16:creationId xmlns:a16="http://schemas.microsoft.com/office/drawing/2014/main" id="{F95D5D24-39A8-86B0-0F3E-D9D4DAFBD6E4}"/>
+              </a:ext>
+            </a:extLst>
+          </p:cNvPr>
+          <p:cNvSpPr txBox="1"/>
+          <p:nvPr/>
+        </p:nvSpPr>
+        <p:spPr>
+          <a:xfrm>
+            <a:off x="6702678" y="7351215"/>
+            <a:ext cx="1460837" cy="533479"/>
+          </a:xfrm>
+          <a:prstGeom prst="rect">
+            <a:avLst/>
+          </a:prstGeom>
+          <a:noFill/>
+          <a:ln w="12700" cap="flat">
+            <a:noFill/>
+            <a:miter lim="400000"/>
+          </a:ln>
+          <a:effectLst/>
+          <a:sp3d/>
+        </p:spPr>
+        <p:style>
+          <a:lnRef idx="0">
+            <a:scrgbClr r="0" g="0" b="0"/>
+          </a:lnRef>
+          <a:fillRef idx="0">
+            <a:scrgbClr r="0" g="0" b="0"/>
+          </a:fillRef>
+          <a:effectRef idx="0">
+            <a:scrgbClr r="0" g="0" b="0"/>
+          </a:effectRef>
+          <a:fontRef idx="none"/>
+        </p:style>
+        <p:txBody>
+          <a:bodyPr rot="0" spcFirstLastPara="1" vertOverflow="overflow" horzOverflow="overflow" vert="horz" wrap="square" lIns="50800" tIns="50800" rIns="50800" bIns="50800" numCol="1" spcCol="38100" rtlCol="0" anchor="ctr">
+            <a:spAutoFit/>
+          </a:bodyPr>
+          <a:lstStyle/>
+          <a:p>
+            <a:pPr marL="0" marR="0" indent="0" algn="ctr" defTabSz="584200" rtl="0" fontAlgn="auto" latinLnBrk="0" hangingPunct="0">
+              <a:lnSpc>
+                <a:spcPct val="100000"/>
+              </a:lnSpc>
+              <a:spcBef>
+                <a:spcPts val="0"/>
+              </a:spcBef>
+              <a:spcAft>
+                <a:spcPts val="0"/>
+              </a:spcAft>
+              <a:buClrTx/>
+              <a:buSzTx/>
+              <a:buFontTx/>
+              <a:buNone/>
+              <a:tabLst/>
+            </a:pPr>
+            <a:r>
+              <a:rPr kumimoji="0" lang="nl-NL" sz="2800" b="0" i="0" u="none" strike="noStrike" cap="none" spc="0" normalizeH="0" baseline="0">
+                <a:ln>
+                  <a:noFill/>
+                </a:ln>
+                <a:solidFill>
+                  <a:srgbClr val="000000"/>
+                </a:solidFill>
+                <a:effectLst/>
+                <a:uFillTx/>
+                <a:latin typeface="+mn-lt"/>
+                <a:ea typeface="+mn-ea"/>
+                <a:cs typeface="+mn-cs"/>
+                <a:sym typeface="Helvetica Light"/>
+              </a:rPr>
+              <a:t>Laag 3</a:t>
+            </a:r>
+          </a:p>
+        </p:txBody>
+      </p:sp>
+      <p:sp>
+        <p:nvSpPr>
+          <p:cNvPr id="5" name="Tekstvak 4">
+            <a:extLst>
+              <a:ext uri="{FF2B5EF4-FFF2-40B4-BE49-F238E27FC236}">
+                <a16:creationId xmlns:a16="http://schemas.microsoft.com/office/drawing/2014/main" id="{F64130B7-BA9B-B1EE-76C0-A9E955F78480}"/>
+              </a:ext>
+            </a:extLst>
+          </p:cNvPr>
+          <p:cNvSpPr txBox="1"/>
+          <p:nvPr/>
+        </p:nvSpPr>
+        <p:spPr>
+          <a:xfrm>
+            <a:off x="9288344" y="7351214"/>
+            <a:ext cx="1460837" cy="533479"/>
+          </a:xfrm>
+          <a:prstGeom prst="rect">
+            <a:avLst/>
+          </a:prstGeom>
+          <a:noFill/>
+          <a:ln w="12700" cap="flat">
+            <a:noFill/>
+            <a:miter lim="400000"/>
+          </a:ln>
+          <a:effectLst/>
+          <a:sp3d/>
+        </p:spPr>
+        <p:style>
+          <a:lnRef idx="0">
+            <a:scrgbClr r="0" g="0" b="0"/>
+          </a:lnRef>
+          <a:fillRef idx="0">
+            <a:scrgbClr r="0" g="0" b="0"/>
+          </a:fillRef>
+          <a:effectRef idx="0">
+            <a:scrgbClr r="0" g="0" b="0"/>
+          </a:effectRef>
+          <a:fontRef idx="none"/>
+        </p:style>
+        <p:txBody>
+          <a:bodyPr rot="0" spcFirstLastPara="1" vertOverflow="overflow" horzOverflow="overflow" vert="horz" wrap="square" lIns="50800" tIns="50800" rIns="50800" bIns="50800" numCol="1" spcCol="38100" rtlCol="0" anchor="ctr">
+            <a:spAutoFit/>
+          </a:bodyPr>
+          <a:lstStyle/>
+          <a:p>
+            <a:pPr marL="0" marR="0" indent="0" algn="ctr" defTabSz="584200" rtl="0" fontAlgn="auto" latinLnBrk="0" hangingPunct="0">
+              <a:lnSpc>
+                <a:spcPct val="100000"/>
+              </a:lnSpc>
+              <a:spcBef>
+                <a:spcPts val="0"/>
+              </a:spcBef>
+              <a:spcAft>
+                <a:spcPts val="0"/>
+              </a:spcAft>
+              <a:buClrTx/>
+              <a:buSzTx/>
+              <a:buFontTx/>
+              <a:buNone/>
+              <a:tabLst/>
+            </a:pPr>
+            <a:r>
+              <a:rPr kumimoji="0" lang="nl-NL" sz="2800" b="0" i="0" u="none" strike="noStrike" cap="none" spc="0" normalizeH="0" baseline="0">
+                <a:ln>
+                  <a:noFill/>
+                </a:ln>
+                <a:solidFill>
+                  <a:srgbClr val="000000"/>
+                </a:solidFill>
+                <a:effectLst/>
+                <a:uFillTx/>
+                <a:latin typeface="+mn-lt"/>
+                <a:ea typeface="+mn-ea"/>
+                <a:cs typeface="+mn-cs"/>
+                <a:sym typeface="Helvetica Light"/>
+              </a:rPr>
+              <a:t>Laag 4</a:t>
+            </a:r>
+          </a:p>
+        </p:txBody>
+      </p:sp>
     </p:spTree>
   </p:cSld>
   <p:clrMapOvr>
@@ -7949,7 +8277,7 @@
           </a:ln>
           <a:extLst>
             <a:ext uri="{C572A759-6A51-4108-AA02-DFA0A04FC94B}">
-              <ma14:wrappingTextBoxFlag xmlns="" xmlns:m="http://schemas.openxmlformats.org/officeDocument/2006/math" xmlns:a14="http://schemas.microsoft.com/office/drawing/2010/main" xmlns:ma14="http://schemas.microsoft.com/office/mac/drawingml/2011/main" val="1"/>
+              <ma14:wrappingTextBoxFlag xmlns:ma14="http://schemas.microsoft.com/office/mac/drawingml/2011/main" xmlns:a14="http://schemas.microsoft.com/office/drawing/2010/main" xmlns:m="http://schemas.openxmlformats.org/officeDocument/2006/math" xmlns="" val="1"/>
             </a:ext>
           </a:extLst>
         </p:spPr>
@@ -8016,7 +8344,7 @@
           </a:ln>
           <a:extLst>
             <a:ext uri="{C572A759-6A51-4108-AA02-DFA0A04FC94B}">
-              <ma14:wrappingTextBoxFlag xmlns="" xmlns:m="http://schemas.openxmlformats.org/officeDocument/2006/math" xmlns:a14="http://schemas.microsoft.com/office/drawing/2010/main" xmlns:ma14="http://schemas.microsoft.com/office/mac/drawingml/2011/main" val="1"/>
+              <ma14:wrappingTextBoxFlag xmlns:ma14="http://schemas.microsoft.com/office/mac/drawingml/2011/main" xmlns:a14="http://schemas.microsoft.com/office/drawing/2010/main" xmlns:m="http://schemas.openxmlformats.org/officeDocument/2006/math" xmlns="" val="1"/>
             </a:ext>
           </a:extLst>
         </p:spPr>
@@ -8124,7 +8452,7 @@
           </a:ln>
           <a:extLst>
             <a:ext uri="{C572A759-6A51-4108-AA02-DFA0A04FC94B}">
-              <ma14:wrappingTextBoxFlag xmlns="" xmlns:m="http://schemas.openxmlformats.org/officeDocument/2006/math" xmlns:a14="http://schemas.microsoft.com/office/drawing/2010/main" xmlns:ma14="http://schemas.microsoft.com/office/mac/drawingml/2011/main" val="1"/>
+              <ma14:wrappingTextBoxFlag xmlns:ma14="http://schemas.microsoft.com/office/mac/drawingml/2011/main" xmlns:a14="http://schemas.microsoft.com/office/drawing/2010/main" xmlns:m="http://schemas.openxmlformats.org/officeDocument/2006/math" xmlns="" val="1"/>
             </a:ext>
           </a:extLst>
         </p:spPr>
@@ -8180,7 +8508,7 @@
           </a:ln>
           <a:extLst>
             <a:ext uri="{C572A759-6A51-4108-AA02-DFA0A04FC94B}">
-              <ma14:wrappingTextBoxFlag xmlns="" xmlns:m="http://schemas.openxmlformats.org/officeDocument/2006/math" xmlns:a14="http://schemas.microsoft.com/office/drawing/2010/main" xmlns:ma14="http://schemas.microsoft.com/office/mac/drawingml/2011/main" val="1"/>
+              <ma14:wrappingTextBoxFlag xmlns:ma14="http://schemas.microsoft.com/office/mac/drawingml/2011/main" xmlns:a14="http://schemas.microsoft.com/office/drawing/2010/main" xmlns:m="http://schemas.openxmlformats.org/officeDocument/2006/math" xmlns="" val="1"/>
             </a:ext>
           </a:extLst>
         </p:spPr>
@@ -8378,7 +8706,7 @@
           </a:ln>
           <a:extLst>
             <a:ext uri="{C572A759-6A51-4108-AA02-DFA0A04FC94B}">
-              <ma14:wrappingTextBoxFlag xmlns="" xmlns:m="http://schemas.openxmlformats.org/officeDocument/2006/math" xmlns:a14="http://schemas.microsoft.com/office/drawing/2010/main" xmlns:ma14="http://schemas.microsoft.com/office/mac/drawingml/2011/main" val="1"/>
+              <ma14:wrappingTextBoxFlag xmlns:ma14="http://schemas.microsoft.com/office/mac/drawingml/2011/main" xmlns:a14="http://schemas.microsoft.com/office/drawing/2010/main" xmlns:m="http://schemas.openxmlformats.org/officeDocument/2006/math" xmlns="" val="1"/>
             </a:ext>
           </a:extLst>
         </p:spPr>
@@ -8437,7 +8765,7 @@
           </a:ln>
           <a:extLst>
             <a:ext uri="{C572A759-6A51-4108-AA02-DFA0A04FC94B}">
-              <ma14:wrappingTextBoxFlag xmlns="" xmlns:m="http://schemas.openxmlformats.org/officeDocument/2006/math" xmlns:a14="http://schemas.microsoft.com/office/drawing/2010/main" xmlns:ma14="http://schemas.microsoft.com/office/mac/drawingml/2011/main" val="1"/>
+              <ma14:wrappingTextBoxFlag xmlns:ma14="http://schemas.microsoft.com/office/mac/drawingml/2011/main" xmlns:a14="http://schemas.microsoft.com/office/drawing/2010/main" xmlns:m="http://schemas.openxmlformats.org/officeDocument/2006/math" xmlns="" val="1"/>
             </a:ext>
           </a:extLst>
         </p:spPr>
@@ -8482,7 +8810,7 @@
           </a:ln>
           <a:extLst>
             <a:ext uri="{C572A759-6A51-4108-AA02-DFA0A04FC94B}">
-              <ma14:wrappingTextBoxFlag xmlns="" xmlns:m="http://schemas.openxmlformats.org/officeDocument/2006/math" xmlns:a14="http://schemas.microsoft.com/office/drawing/2010/main" xmlns:ma14="http://schemas.microsoft.com/office/mac/drawingml/2011/main" val="1"/>
+              <ma14:wrappingTextBoxFlag xmlns:ma14="http://schemas.microsoft.com/office/mac/drawingml/2011/main" xmlns:a14="http://schemas.microsoft.com/office/drawing/2010/main" xmlns:m="http://schemas.openxmlformats.org/officeDocument/2006/math" xmlns="" val="1"/>
             </a:ext>
           </a:extLst>
         </p:spPr>
@@ -8526,7 +8854,7 @@
           </a:ln>
           <a:extLst>
             <a:ext uri="{C572A759-6A51-4108-AA02-DFA0A04FC94B}">
-              <ma14:wrappingTextBoxFlag xmlns="" xmlns:m="http://schemas.openxmlformats.org/officeDocument/2006/math" xmlns:a14="http://schemas.microsoft.com/office/drawing/2010/main" xmlns:ma14="http://schemas.microsoft.com/office/mac/drawingml/2011/main" val="1"/>
+              <ma14:wrappingTextBoxFlag xmlns:ma14="http://schemas.microsoft.com/office/mac/drawingml/2011/main" xmlns:a14="http://schemas.microsoft.com/office/drawing/2010/main" xmlns:m="http://schemas.openxmlformats.org/officeDocument/2006/math" xmlns="" val="1"/>
             </a:ext>
           </a:extLst>
         </p:spPr>
@@ -8570,7 +8898,7 @@
           </a:ln>
           <a:extLst>
             <a:ext uri="{C572A759-6A51-4108-AA02-DFA0A04FC94B}">
-              <ma14:wrappingTextBoxFlag xmlns="" xmlns:m="http://schemas.openxmlformats.org/officeDocument/2006/math" xmlns:a14="http://schemas.microsoft.com/office/drawing/2010/main" xmlns:ma14="http://schemas.microsoft.com/office/mac/drawingml/2011/main" val="1"/>
+              <ma14:wrappingTextBoxFlag xmlns:ma14="http://schemas.microsoft.com/office/mac/drawingml/2011/main" xmlns:a14="http://schemas.microsoft.com/office/drawing/2010/main" xmlns:m="http://schemas.openxmlformats.org/officeDocument/2006/math" xmlns="" val="1"/>
             </a:ext>
           </a:extLst>
         </p:spPr>
@@ -8614,7 +8942,7 @@
           </a:ln>
           <a:extLst>
             <a:ext uri="{C572A759-6A51-4108-AA02-DFA0A04FC94B}">
-              <ma14:wrappingTextBoxFlag xmlns="" xmlns:m="http://schemas.openxmlformats.org/officeDocument/2006/math" xmlns:a14="http://schemas.microsoft.com/office/drawing/2010/main" xmlns:ma14="http://schemas.microsoft.com/office/mac/drawingml/2011/main" val="1"/>
+              <ma14:wrappingTextBoxFlag xmlns:ma14="http://schemas.microsoft.com/office/mac/drawingml/2011/main" xmlns:a14="http://schemas.microsoft.com/office/drawing/2010/main" xmlns:m="http://schemas.openxmlformats.org/officeDocument/2006/math" xmlns="" val="1"/>
             </a:ext>
           </a:extLst>
         </p:spPr>
@@ -8658,7 +8986,7 @@
           </a:ln>
           <a:extLst>
             <a:ext uri="{C572A759-6A51-4108-AA02-DFA0A04FC94B}">
-              <ma14:wrappingTextBoxFlag xmlns="" xmlns:m="http://schemas.openxmlformats.org/officeDocument/2006/math" xmlns:a14="http://schemas.microsoft.com/office/drawing/2010/main" xmlns:ma14="http://schemas.microsoft.com/office/mac/drawingml/2011/main" val="1"/>
+              <ma14:wrappingTextBoxFlag xmlns:ma14="http://schemas.microsoft.com/office/mac/drawingml/2011/main" xmlns:a14="http://schemas.microsoft.com/office/drawing/2010/main" xmlns:m="http://schemas.openxmlformats.org/officeDocument/2006/math" xmlns="" val="1"/>
             </a:ext>
           </a:extLst>
         </p:spPr>
@@ -8702,7 +9030,7 @@
           </a:ln>
           <a:extLst>
             <a:ext uri="{C572A759-6A51-4108-AA02-DFA0A04FC94B}">
-              <ma14:wrappingTextBoxFlag xmlns="" xmlns:m="http://schemas.openxmlformats.org/officeDocument/2006/math" xmlns:a14="http://schemas.microsoft.com/office/drawing/2010/main" xmlns:ma14="http://schemas.microsoft.com/office/mac/drawingml/2011/main" val="1"/>
+              <ma14:wrappingTextBoxFlag xmlns:ma14="http://schemas.microsoft.com/office/mac/drawingml/2011/main" xmlns:a14="http://schemas.microsoft.com/office/drawing/2010/main" xmlns:m="http://schemas.openxmlformats.org/officeDocument/2006/math" xmlns="" val="1"/>
             </a:ext>
           </a:extLst>
         </p:spPr>
@@ -8746,7 +9074,7 @@
           </a:ln>
           <a:extLst>
             <a:ext uri="{C572A759-6A51-4108-AA02-DFA0A04FC94B}">
-              <ma14:wrappingTextBoxFlag xmlns="" xmlns:m="http://schemas.openxmlformats.org/officeDocument/2006/math" xmlns:a14="http://schemas.microsoft.com/office/drawing/2010/main" xmlns:ma14="http://schemas.microsoft.com/office/mac/drawingml/2011/main" val="1"/>
+              <ma14:wrappingTextBoxFlag xmlns:ma14="http://schemas.microsoft.com/office/mac/drawingml/2011/main" xmlns:a14="http://schemas.microsoft.com/office/drawing/2010/main" xmlns:m="http://schemas.openxmlformats.org/officeDocument/2006/math" xmlns="" val="1"/>
             </a:ext>
           </a:extLst>
         </p:spPr>
@@ -8790,7 +9118,7 @@
           </a:ln>
           <a:extLst>
             <a:ext uri="{C572A759-6A51-4108-AA02-DFA0A04FC94B}">
-              <ma14:wrappingTextBoxFlag xmlns="" xmlns:m="http://schemas.openxmlformats.org/officeDocument/2006/math" xmlns:a14="http://schemas.microsoft.com/office/drawing/2010/main" xmlns:ma14="http://schemas.microsoft.com/office/mac/drawingml/2011/main" val="1"/>
+              <ma14:wrappingTextBoxFlag xmlns:ma14="http://schemas.microsoft.com/office/mac/drawingml/2011/main" xmlns:a14="http://schemas.microsoft.com/office/drawing/2010/main" xmlns:m="http://schemas.openxmlformats.org/officeDocument/2006/math" xmlns="" val="1"/>
             </a:ext>
           </a:extLst>
         </p:spPr>
@@ -8834,7 +9162,7 @@
           </a:ln>
           <a:extLst>
             <a:ext uri="{C572A759-6A51-4108-AA02-DFA0A04FC94B}">
-              <ma14:wrappingTextBoxFlag xmlns="" xmlns:m="http://schemas.openxmlformats.org/officeDocument/2006/math" xmlns:a14="http://schemas.microsoft.com/office/drawing/2010/main" xmlns:ma14="http://schemas.microsoft.com/office/mac/drawingml/2011/main" val="1"/>
+              <ma14:wrappingTextBoxFlag xmlns:ma14="http://schemas.microsoft.com/office/mac/drawingml/2011/main" xmlns:a14="http://schemas.microsoft.com/office/drawing/2010/main" xmlns:m="http://schemas.openxmlformats.org/officeDocument/2006/math" xmlns="" val="1"/>
             </a:ext>
           </a:extLst>
         </p:spPr>
@@ -8878,7 +9206,7 @@
           </a:ln>
           <a:extLst>
             <a:ext uri="{C572A759-6A51-4108-AA02-DFA0A04FC94B}">
-              <ma14:wrappingTextBoxFlag xmlns="" xmlns:m="http://schemas.openxmlformats.org/officeDocument/2006/math" xmlns:a14="http://schemas.microsoft.com/office/drawing/2010/main" xmlns:ma14="http://schemas.microsoft.com/office/mac/drawingml/2011/main" val="1"/>
+              <ma14:wrappingTextBoxFlag xmlns:ma14="http://schemas.microsoft.com/office/mac/drawingml/2011/main" xmlns:a14="http://schemas.microsoft.com/office/drawing/2010/main" xmlns:m="http://schemas.openxmlformats.org/officeDocument/2006/math" xmlns="" val="1"/>
             </a:ext>
           </a:extLst>
         </p:spPr>
@@ -8968,7 +9296,25 @@
                               </a:solidFill>
                               <a:latin typeface="Cambria Math" panose="02040503050406030204" pitchFamily="18" charset="0"/>
                             </a:rPr>
-                            <m:t>(1)</m:t>
+                            <m:t>(</m:t>
+                          </m:r>
+                          <m:r>
+                            <a:rPr sz="3600" i="1">
+                              <a:solidFill>
+                                <a:srgbClr val="000000"/>
+                              </a:solidFill>
+                              <a:latin typeface="Cambria Math" panose="02040503050406030204" pitchFamily="18" charset="0"/>
+                            </a:rPr>
+                            <m:t>1</m:t>
+                          </m:r>
+                          <m:r>
+                            <a:rPr sz="3600" i="1">
+                              <a:solidFill>
+                                <a:srgbClr val="000000"/>
+                              </a:solidFill>
+                              <a:latin typeface="Cambria Math" panose="02040503050406030204" pitchFamily="18" charset="0"/>
+                            </a:rPr>
+                            <m:t>)</m:t>
                           </m:r>
                         </m:sup>
                       </m:sSup>
@@ -9014,7 +9360,25 @@
                                   </a:solidFill>
                                   <a:latin typeface="Cambria Math" panose="02040503050406030204" pitchFamily="18" charset="0"/>
                                 </a:rPr>
-                                <m:t>0.5</m:t>
+                                <m:t>0</m:t>
+                              </m:r>
+                              <m:r>
+                                <a:rPr sz="3600" i="1">
+                                  <a:solidFill>
+                                    <a:srgbClr val="000000"/>
+                                  </a:solidFill>
+                                  <a:latin typeface="Cambria Math" panose="02040503050406030204" pitchFamily="18" charset="0"/>
+                                </a:rPr>
+                                <m:t>.</m:t>
+                              </m:r>
+                              <m:r>
+                                <a:rPr sz="3600" i="1">
+                                  <a:solidFill>
+                                    <a:srgbClr val="000000"/>
+                                  </a:solidFill>
+                                  <a:latin typeface="Cambria Math" panose="02040503050406030204" pitchFamily="18" charset="0"/>
+                                </a:rPr>
+                                <m:t>5</m:t>
                               </m:r>
                             </m:e>
                             <m:e>
@@ -9025,7 +9389,25 @@
                                   </a:solidFill>
                                   <a:latin typeface="Cambria Math" panose="02040503050406030204" pitchFamily="18" charset="0"/>
                                 </a:rPr>
-                                <m:t>0.7</m:t>
+                                <m:t>0</m:t>
+                              </m:r>
+                              <m:r>
+                                <a:rPr sz="3600" i="1">
+                                  <a:solidFill>
+                                    <a:srgbClr val="000000"/>
+                                  </a:solidFill>
+                                  <a:latin typeface="Cambria Math" panose="02040503050406030204" pitchFamily="18" charset="0"/>
+                                </a:rPr>
+                                <m:t>.</m:t>
+                              </m:r>
+                              <m:r>
+                                <a:rPr sz="3600" i="1">
+                                  <a:solidFill>
+                                    <a:srgbClr val="000000"/>
+                                  </a:solidFill>
+                                  <a:latin typeface="Cambria Math" panose="02040503050406030204" pitchFamily="18" charset="0"/>
+                                </a:rPr>
+                                <m:t>7</m:t>
                               </m:r>
                             </m:e>
                           </m:eqArr>
@@ -9149,7 +9531,25 @@
                               </a:solidFill>
                               <a:latin typeface="Cambria Math" panose="02040503050406030204" pitchFamily="18" charset="0"/>
                             </a:rPr>
-                            <m:t>(1)</m:t>
+                            <m:t>(</m:t>
+                          </m:r>
+                          <m:r>
+                            <a:rPr sz="3600" i="1">
+                              <a:solidFill>
+                                <a:srgbClr val="000000"/>
+                              </a:solidFill>
+                              <a:latin typeface="Cambria Math" panose="02040503050406030204" pitchFamily="18" charset="0"/>
+                            </a:rPr>
+                            <m:t>1</m:t>
+                          </m:r>
+                          <m:r>
+                            <a:rPr sz="3600" i="1">
+                              <a:solidFill>
+                                <a:srgbClr val="000000"/>
+                              </a:solidFill>
+                              <a:latin typeface="Cambria Math" panose="02040503050406030204" pitchFamily="18" charset="0"/>
+                            </a:rPr>
+                            <m:t>)</m:t>
                           </m:r>
                         </m:sup>
                       </m:sSup>
@@ -9205,7 +9605,25 @@
                                     </a:solidFill>
                                     <a:latin typeface="Cambria Math" panose="02040503050406030204" pitchFamily="18" charset="0"/>
                                   </a:rPr>
-                                  <m:t>0.3</m:t>
+                                  <m:t>0</m:t>
+                                </m:r>
+                                <m:r>
+                                  <a:rPr sz="3600" i="1">
+                                    <a:solidFill>
+                                      <a:srgbClr val="000000"/>
+                                    </a:solidFill>
+                                    <a:latin typeface="Cambria Math" panose="02040503050406030204" pitchFamily="18" charset="0"/>
+                                  </a:rPr>
+                                  <m:t>.</m:t>
+                                </m:r>
+                                <m:r>
+                                  <a:rPr sz="3600" i="1">
+                                    <a:solidFill>
+                                      <a:srgbClr val="000000"/>
+                                    </a:solidFill>
+                                    <a:latin typeface="Cambria Math" panose="02040503050406030204" pitchFamily="18" charset="0"/>
+                                  </a:rPr>
+                                  <m:t>3</m:t>
                                 </m:r>
                               </m:e>
                               <m:e>
@@ -9216,7 +9634,25 @@
                                     </a:solidFill>
                                     <a:latin typeface="Cambria Math" panose="02040503050406030204" pitchFamily="18" charset="0"/>
                                   </a:rPr>
-                                  <m:t>0.4</m:t>
+                                  <m:t>0</m:t>
+                                </m:r>
+                                <m:r>
+                                  <a:rPr sz="3600" i="1">
+                                    <a:solidFill>
+                                      <a:srgbClr val="000000"/>
+                                    </a:solidFill>
+                                    <a:latin typeface="Cambria Math" panose="02040503050406030204" pitchFamily="18" charset="0"/>
+                                  </a:rPr>
+                                  <m:t>.</m:t>
+                                </m:r>
+                                <m:r>
+                                  <a:rPr sz="3600" i="1">
+                                    <a:solidFill>
+                                      <a:srgbClr val="000000"/>
+                                    </a:solidFill>
+                                    <a:latin typeface="Cambria Math" panose="02040503050406030204" pitchFamily="18" charset="0"/>
+                                  </a:rPr>
+                                  <m:t>4</m:t>
                                 </m:r>
                               </m:e>
                             </m:mr>
@@ -9229,7 +9665,25 @@
                                     </a:solidFill>
                                     <a:latin typeface="Cambria Math" panose="02040503050406030204" pitchFamily="18" charset="0"/>
                                   </a:rPr>
-                                  <m:t>0.6</m:t>
+                                  <m:t>0</m:t>
+                                </m:r>
+                                <m:r>
+                                  <a:rPr sz="3600" i="1">
+                                    <a:solidFill>
+                                      <a:srgbClr val="000000"/>
+                                    </a:solidFill>
+                                    <a:latin typeface="Cambria Math" panose="02040503050406030204" pitchFamily="18" charset="0"/>
+                                  </a:rPr>
+                                  <m:t>.</m:t>
+                                </m:r>
+                                <m:r>
+                                  <a:rPr sz="3600" i="1">
+                                    <a:solidFill>
+                                      <a:srgbClr val="000000"/>
+                                    </a:solidFill>
+                                    <a:latin typeface="Cambria Math" panose="02040503050406030204" pitchFamily="18" charset="0"/>
+                                  </a:rPr>
+                                  <m:t>6</m:t>
                                 </m:r>
                               </m:e>
                               <m:e>
@@ -9240,7 +9694,25 @@
                                     </a:solidFill>
                                     <a:latin typeface="Cambria Math" panose="02040503050406030204" pitchFamily="18" charset="0"/>
                                   </a:rPr>
-                                  <m:t>0.2</m:t>
+                                  <m:t>0</m:t>
+                                </m:r>
+                                <m:r>
+                                  <a:rPr sz="3600" i="1">
+                                    <a:solidFill>
+                                      <a:srgbClr val="000000"/>
+                                    </a:solidFill>
+                                    <a:latin typeface="Cambria Math" panose="02040503050406030204" pitchFamily="18" charset="0"/>
+                                  </a:rPr>
+                                  <m:t>.</m:t>
+                                </m:r>
+                                <m:r>
+                                  <a:rPr sz="3600" i="1">
+                                    <a:solidFill>
+                                      <a:srgbClr val="000000"/>
+                                    </a:solidFill>
+                                    <a:latin typeface="Cambria Math" panose="02040503050406030204" pitchFamily="18" charset="0"/>
+                                  </a:rPr>
+                                  <m:t>2</m:t>
                                 </m:r>
                               </m:e>
                             </m:mr>
@@ -9373,7 +9845,25 @@
                               </a:solidFill>
                               <a:latin typeface="Cambria Math" panose="02040503050406030204" pitchFamily="18" charset="0"/>
                             </a:rPr>
-                            <m:t>(2)</m:t>
+                            <m:t>(</m:t>
+                          </m:r>
+                          <m:r>
+                            <a:rPr sz="2800" i="1">
+                              <a:solidFill>
+                                <a:srgbClr val="000000"/>
+                              </a:solidFill>
+                              <a:latin typeface="Cambria Math" panose="02040503050406030204" pitchFamily="18" charset="0"/>
+                            </a:rPr>
+                            <m:t>2</m:t>
+                          </m:r>
+                          <m:r>
+                            <a:rPr sz="2800" i="1">
+                              <a:solidFill>
+                                <a:srgbClr val="000000"/>
+                              </a:solidFill>
+                              <a:latin typeface="Cambria Math" panose="02040503050406030204" pitchFamily="18" charset="0"/>
+                            </a:rPr>
+                            <m:t>)</m:t>
                           </m:r>
                         </m:sup>
                       </m:sSubSup>
@@ -9402,7 +9892,151 @@
                           </a:solidFill>
                           <a:latin typeface="Cambria Math" panose="02040503050406030204" pitchFamily="18" charset="0"/>
                         </a:rPr>
-                        <m:t>(0.5×0.3+0.7×0.4)</m:t>
+                        <m:t>(</m:t>
+                      </m:r>
+                      <m:r>
+                        <a:rPr sz="2800" i="1">
+                          <a:solidFill>
+                            <a:srgbClr val="000000"/>
+                          </a:solidFill>
+                          <a:latin typeface="Cambria Math" panose="02040503050406030204" pitchFamily="18" charset="0"/>
+                        </a:rPr>
+                        <m:t>0</m:t>
+                      </m:r>
+                      <m:r>
+                        <a:rPr sz="2800" i="1">
+                          <a:solidFill>
+                            <a:srgbClr val="000000"/>
+                          </a:solidFill>
+                          <a:latin typeface="Cambria Math" panose="02040503050406030204" pitchFamily="18" charset="0"/>
+                        </a:rPr>
+                        <m:t>.</m:t>
+                      </m:r>
+                      <m:r>
+                        <a:rPr sz="2800" i="1">
+                          <a:solidFill>
+                            <a:srgbClr val="000000"/>
+                          </a:solidFill>
+                          <a:latin typeface="Cambria Math" panose="02040503050406030204" pitchFamily="18" charset="0"/>
+                        </a:rPr>
+                        <m:t>5</m:t>
+                      </m:r>
+                      <m:r>
+                        <a:rPr sz="2800" i="1">
+                          <a:solidFill>
+                            <a:srgbClr val="000000"/>
+                          </a:solidFill>
+                          <a:latin typeface="Cambria Math" panose="02040503050406030204" pitchFamily="18" charset="0"/>
+                        </a:rPr>
+                        <m:t>×</m:t>
+                      </m:r>
+                      <m:r>
+                        <a:rPr sz="2800" i="1">
+                          <a:solidFill>
+                            <a:srgbClr val="000000"/>
+                          </a:solidFill>
+                          <a:latin typeface="Cambria Math" panose="02040503050406030204" pitchFamily="18" charset="0"/>
+                        </a:rPr>
+                        <m:t>0</m:t>
+                      </m:r>
+                      <m:r>
+                        <a:rPr sz="2800" i="1">
+                          <a:solidFill>
+                            <a:srgbClr val="000000"/>
+                          </a:solidFill>
+                          <a:latin typeface="Cambria Math" panose="02040503050406030204" pitchFamily="18" charset="0"/>
+                        </a:rPr>
+                        <m:t>.</m:t>
+                      </m:r>
+                      <m:r>
+                        <a:rPr sz="2800" i="1">
+                          <a:solidFill>
+                            <a:srgbClr val="000000"/>
+                          </a:solidFill>
+                          <a:latin typeface="Cambria Math" panose="02040503050406030204" pitchFamily="18" charset="0"/>
+                        </a:rPr>
+                        <m:t>3</m:t>
+                      </m:r>
+                      <m:r>
+                        <a:rPr sz="2800" i="1">
+                          <a:solidFill>
+                            <a:srgbClr val="000000"/>
+                          </a:solidFill>
+                          <a:latin typeface="Cambria Math" panose="02040503050406030204" pitchFamily="18" charset="0"/>
+                        </a:rPr>
+                        <m:t>+</m:t>
+                      </m:r>
+                      <m:r>
+                        <a:rPr sz="2800" i="1">
+                          <a:solidFill>
+                            <a:srgbClr val="000000"/>
+                          </a:solidFill>
+                          <a:latin typeface="Cambria Math" panose="02040503050406030204" pitchFamily="18" charset="0"/>
+                        </a:rPr>
+                        <m:t>0</m:t>
+                      </m:r>
+                      <m:r>
+                        <a:rPr sz="2800" i="1">
+                          <a:solidFill>
+                            <a:srgbClr val="000000"/>
+                          </a:solidFill>
+                          <a:latin typeface="Cambria Math" panose="02040503050406030204" pitchFamily="18" charset="0"/>
+                        </a:rPr>
+                        <m:t>.</m:t>
+                      </m:r>
+                      <m:r>
+                        <a:rPr sz="2800" i="1">
+                          <a:solidFill>
+                            <a:srgbClr val="000000"/>
+                          </a:solidFill>
+                          <a:latin typeface="Cambria Math" panose="02040503050406030204" pitchFamily="18" charset="0"/>
+                        </a:rPr>
+                        <m:t>7</m:t>
+                      </m:r>
+                      <m:r>
+                        <a:rPr sz="2800" i="1">
+                          <a:solidFill>
+                            <a:srgbClr val="000000"/>
+                          </a:solidFill>
+                          <a:latin typeface="Cambria Math" panose="02040503050406030204" pitchFamily="18" charset="0"/>
+                        </a:rPr>
+                        <m:t>×</m:t>
+                      </m:r>
+                      <m:r>
+                        <a:rPr sz="2800" i="1">
+                          <a:solidFill>
+                            <a:srgbClr val="000000"/>
+                          </a:solidFill>
+                          <a:latin typeface="Cambria Math" panose="02040503050406030204" pitchFamily="18" charset="0"/>
+                        </a:rPr>
+                        <m:t>0</m:t>
+                      </m:r>
+                      <m:r>
+                        <a:rPr sz="2800" i="1">
+                          <a:solidFill>
+                            <a:srgbClr val="000000"/>
+                          </a:solidFill>
+                          <a:latin typeface="Cambria Math" panose="02040503050406030204" pitchFamily="18" charset="0"/>
+                        </a:rPr>
+                        <m:t>.</m:t>
+                      </m:r>
+                      <m:r>
+                        <a:rPr sz="2800" i="1">
+                          <a:solidFill>
+                            <a:srgbClr val="000000"/>
+                          </a:solidFill>
+                          <a:latin typeface="Cambria Math" panose="02040503050406030204" pitchFamily="18" charset="0"/>
+                        </a:rPr>
+                        <m:t>4</m:t>
+                      </m:r>
+                      <m:r>
+                        <a:rPr sz="2800" i="1">
+                          <a:solidFill>
+                            <a:srgbClr val="000000"/>
+                          </a:solidFill>
+                          <a:latin typeface="Cambria Math" panose="02040503050406030204" pitchFamily="18" charset="0"/>
+                        </a:rPr>
+                        <m:t>)</m:t>
                       </m:r>
                     </m:oMath>
                   </m:oMathPara>
@@ -9530,7 +10164,25 @@
                               </a:solidFill>
                               <a:latin typeface="Cambria Math" panose="02040503050406030204" pitchFamily="18" charset="0"/>
                             </a:rPr>
-                            <m:t>(2)</m:t>
+                            <m:t>(</m:t>
+                          </m:r>
+                          <m:r>
+                            <a:rPr sz="2800" i="1">
+                              <a:solidFill>
+                                <a:srgbClr val="000000"/>
+                              </a:solidFill>
+                              <a:latin typeface="Cambria Math" panose="02040503050406030204" pitchFamily="18" charset="0"/>
+                            </a:rPr>
+                            <m:t>2</m:t>
+                          </m:r>
+                          <m:r>
+                            <a:rPr sz="2800" i="1">
+                              <a:solidFill>
+                                <a:srgbClr val="000000"/>
+                              </a:solidFill>
+                              <a:latin typeface="Cambria Math" panose="02040503050406030204" pitchFamily="18" charset="0"/>
+                            </a:rPr>
+                            <m:t>)</m:t>
                           </m:r>
                         </m:sup>
                       </m:sSubSup>
@@ -9559,7 +10211,151 @@
                           </a:solidFill>
                           <a:latin typeface="Cambria Math" panose="02040503050406030204" pitchFamily="18" charset="0"/>
                         </a:rPr>
-                        <m:t>(0.5×0.6+0.7×0.2)</m:t>
+                        <m:t>(</m:t>
+                      </m:r>
+                      <m:r>
+                        <a:rPr sz="2800" i="1">
+                          <a:solidFill>
+                            <a:srgbClr val="000000"/>
+                          </a:solidFill>
+                          <a:latin typeface="Cambria Math" panose="02040503050406030204" pitchFamily="18" charset="0"/>
+                        </a:rPr>
+                        <m:t>0</m:t>
+                      </m:r>
+                      <m:r>
+                        <a:rPr sz="2800" i="1">
+                          <a:solidFill>
+                            <a:srgbClr val="000000"/>
+                          </a:solidFill>
+                          <a:latin typeface="Cambria Math" panose="02040503050406030204" pitchFamily="18" charset="0"/>
+                        </a:rPr>
+                        <m:t>.</m:t>
+                      </m:r>
+                      <m:r>
+                        <a:rPr sz="2800" i="1">
+                          <a:solidFill>
+                            <a:srgbClr val="000000"/>
+                          </a:solidFill>
+                          <a:latin typeface="Cambria Math" panose="02040503050406030204" pitchFamily="18" charset="0"/>
+                        </a:rPr>
+                        <m:t>5</m:t>
+                      </m:r>
+                      <m:r>
+                        <a:rPr sz="2800" i="1">
+                          <a:solidFill>
+                            <a:srgbClr val="000000"/>
+                          </a:solidFill>
+                          <a:latin typeface="Cambria Math" panose="02040503050406030204" pitchFamily="18" charset="0"/>
+                        </a:rPr>
+                        <m:t>×</m:t>
+                      </m:r>
+                      <m:r>
+                        <a:rPr sz="2800" i="1">
+                          <a:solidFill>
+                            <a:srgbClr val="000000"/>
+                          </a:solidFill>
+                          <a:latin typeface="Cambria Math" panose="02040503050406030204" pitchFamily="18" charset="0"/>
+                        </a:rPr>
+                        <m:t>0</m:t>
+                      </m:r>
+                      <m:r>
+                        <a:rPr sz="2800" i="1">
+                          <a:solidFill>
+                            <a:srgbClr val="000000"/>
+                          </a:solidFill>
+                          <a:latin typeface="Cambria Math" panose="02040503050406030204" pitchFamily="18" charset="0"/>
+                        </a:rPr>
+                        <m:t>.</m:t>
+                      </m:r>
+                      <m:r>
+                        <a:rPr sz="2800" i="1">
+                          <a:solidFill>
+                            <a:srgbClr val="000000"/>
+                          </a:solidFill>
+                          <a:latin typeface="Cambria Math" panose="02040503050406030204" pitchFamily="18" charset="0"/>
+                        </a:rPr>
+                        <m:t>6</m:t>
+                      </m:r>
+                      <m:r>
+                        <a:rPr sz="2800" i="1">
+                          <a:solidFill>
+                            <a:srgbClr val="000000"/>
+                          </a:solidFill>
+                          <a:latin typeface="Cambria Math" panose="02040503050406030204" pitchFamily="18" charset="0"/>
+                        </a:rPr>
+                        <m:t>+</m:t>
+                      </m:r>
+                      <m:r>
+                        <a:rPr sz="2800" i="1">
+                          <a:solidFill>
+                            <a:srgbClr val="000000"/>
+                          </a:solidFill>
+                          <a:latin typeface="Cambria Math" panose="02040503050406030204" pitchFamily="18" charset="0"/>
+                        </a:rPr>
+                        <m:t>0</m:t>
+                      </m:r>
+                      <m:r>
+                        <a:rPr sz="2800" i="1">
+                          <a:solidFill>
+                            <a:srgbClr val="000000"/>
+                          </a:solidFill>
+                          <a:latin typeface="Cambria Math" panose="02040503050406030204" pitchFamily="18" charset="0"/>
+                        </a:rPr>
+                        <m:t>.</m:t>
+                      </m:r>
+                      <m:r>
+                        <a:rPr sz="2800" i="1">
+                          <a:solidFill>
+                            <a:srgbClr val="000000"/>
+                          </a:solidFill>
+                          <a:latin typeface="Cambria Math" panose="02040503050406030204" pitchFamily="18" charset="0"/>
+                        </a:rPr>
+                        <m:t>7</m:t>
+                      </m:r>
+                      <m:r>
+                        <a:rPr sz="2800" i="1">
+                          <a:solidFill>
+                            <a:srgbClr val="000000"/>
+                          </a:solidFill>
+                          <a:latin typeface="Cambria Math" panose="02040503050406030204" pitchFamily="18" charset="0"/>
+                        </a:rPr>
+                        <m:t>×</m:t>
+                      </m:r>
+                      <m:r>
+                        <a:rPr sz="2800" i="1">
+                          <a:solidFill>
+                            <a:srgbClr val="000000"/>
+                          </a:solidFill>
+                          <a:latin typeface="Cambria Math" panose="02040503050406030204" pitchFamily="18" charset="0"/>
+                        </a:rPr>
+                        <m:t>0</m:t>
+                      </m:r>
+                      <m:r>
+                        <a:rPr sz="2800" i="1">
+                          <a:solidFill>
+                            <a:srgbClr val="000000"/>
+                          </a:solidFill>
+                          <a:latin typeface="Cambria Math" panose="02040503050406030204" pitchFamily="18" charset="0"/>
+                        </a:rPr>
+                        <m:t>.</m:t>
+                      </m:r>
+                      <m:r>
+                        <a:rPr sz="2800" i="1">
+                          <a:solidFill>
+                            <a:srgbClr val="000000"/>
+                          </a:solidFill>
+                          <a:latin typeface="Cambria Math" panose="02040503050406030204" pitchFamily="18" charset="0"/>
+                        </a:rPr>
+                        <m:t>2</m:t>
+                      </m:r>
+                      <m:r>
+                        <a:rPr sz="2800" i="1">
+                          <a:solidFill>
+                            <a:srgbClr val="000000"/>
+                          </a:solidFill>
+                          <a:latin typeface="Cambria Math" panose="02040503050406030204" pitchFamily="18" charset="0"/>
+                        </a:rPr>
+                        <m:t>)</m:t>
                       </m:r>
                     </m:oMath>
                   </m:oMathPara>
@@ -9713,7 +10509,25 @@
                               </a:solidFill>
                               <a:latin typeface="Cambria Math" panose="02040503050406030204" pitchFamily="18" charset="0"/>
                             </a:rPr>
-                            <m:t>(2)</m:t>
+                            <m:t>(</m:t>
+                          </m:r>
+                          <m:r>
+                            <a:rPr sz="4800" i="1">
+                              <a:solidFill>
+                                <a:srgbClr val="000000"/>
+                              </a:solidFill>
+                              <a:latin typeface="Cambria Math" panose="02040503050406030204" pitchFamily="18" charset="0"/>
+                            </a:rPr>
+                            <m:t>2</m:t>
+                          </m:r>
+                          <m:r>
+                            <a:rPr sz="4800" i="1">
+                              <a:solidFill>
+                                <a:srgbClr val="000000"/>
+                              </a:solidFill>
+                              <a:latin typeface="Cambria Math" panose="02040503050406030204" pitchFamily="18" charset="0"/>
+                            </a:rPr>
+                            <m:t>)</m:t>
                           </m:r>
                         </m:sup>
                       </m:sSubSup>
@@ -9788,7 +10602,25 @@
                               </a:solidFill>
                               <a:latin typeface="Cambria Math" panose="02040503050406030204" pitchFamily="18" charset="0"/>
                             </a:rPr>
-                            <m:t>(1)</m:t>
+                            <m:t>(</m:t>
+                          </m:r>
+                          <m:r>
+                            <a:rPr sz="4800" i="1">
+                              <a:solidFill>
+                                <a:srgbClr val="000000"/>
+                              </a:solidFill>
+                              <a:latin typeface="Cambria Math" panose="02040503050406030204" pitchFamily="18" charset="0"/>
+                            </a:rPr>
+                            <m:t>1</m:t>
+                          </m:r>
+                          <m:r>
+                            <a:rPr sz="4800" i="1">
+                              <a:solidFill>
+                                <a:srgbClr val="000000"/>
+                              </a:solidFill>
+                              <a:latin typeface="Cambria Math" panose="02040503050406030204" pitchFamily="18" charset="0"/>
+                            </a:rPr>
+                            <m:t>)</m:t>
                           </m:r>
                         </m:sup>
                       </m:sSubSup>
@@ -9833,7 +10665,25 @@
                               </a:solidFill>
                               <a:latin typeface="Cambria Math" panose="02040503050406030204" pitchFamily="18" charset="0"/>
                             </a:rPr>
-                            <m:t>(1)</m:t>
+                            <m:t>(</m:t>
+                          </m:r>
+                          <m:r>
+                            <a:rPr sz="4800" i="1">
+                              <a:solidFill>
+                                <a:srgbClr val="000000"/>
+                              </a:solidFill>
+                              <a:latin typeface="Cambria Math" panose="02040503050406030204" pitchFamily="18" charset="0"/>
+                            </a:rPr>
+                            <m:t>1</m:t>
+                          </m:r>
+                          <m:r>
+                            <a:rPr sz="4800" i="1">
+                              <a:solidFill>
+                                <a:srgbClr val="000000"/>
+                              </a:solidFill>
+                              <a:latin typeface="Cambria Math" panose="02040503050406030204" pitchFamily="18" charset="0"/>
+                            </a:rPr>
+                            <m:t>)</m:t>
                           </m:r>
                         </m:sup>
                       </m:sSubSup>
@@ -9890,7 +10740,25 @@
                               </a:solidFill>
                               <a:latin typeface="Cambria Math" panose="02040503050406030204" pitchFamily="18" charset="0"/>
                             </a:rPr>
-                            <m:t>(1)</m:t>
+                            <m:t>(</m:t>
+                          </m:r>
+                          <m:r>
+                            <a:rPr sz="4800" i="1">
+                              <a:solidFill>
+                                <a:srgbClr val="000000"/>
+                              </a:solidFill>
+                              <a:latin typeface="Cambria Math" panose="02040503050406030204" pitchFamily="18" charset="0"/>
+                            </a:rPr>
+                            <m:t>1</m:t>
+                          </m:r>
+                          <m:r>
+                            <a:rPr sz="4800" i="1">
+                              <a:solidFill>
+                                <a:srgbClr val="000000"/>
+                              </a:solidFill>
+                              <a:latin typeface="Cambria Math" panose="02040503050406030204" pitchFamily="18" charset="0"/>
+                            </a:rPr>
+                            <m:t>)</m:t>
                           </m:r>
                         </m:sup>
                       </m:sSubSup>
@@ -9935,7 +10803,25 @@
                               </a:solidFill>
                               <a:latin typeface="Cambria Math" panose="02040503050406030204" pitchFamily="18" charset="0"/>
                             </a:rPr>
-                            <m:t>(1)</m:t>
+                            <m:t>(</m:t>
+                          </m:r>
+                          <m:r>
+                            <a:rPr sz="4800" i="1">
+                              <a:solidFill>
+                                <a:srgbClr val="000000"/>
+                              </a:solidFill>
+                              <a:latin typeface="Cambria Math" panose="02040503050406030204" pitchFamily="18" charset="0"/>
+                            </a:rPr>
+                            <m:t>1</m:t>
+                          </m:r>
+                          <m:r>
+                            <a:rPr sz="4800" i="1">
+                              <a:solidFill>
+                                <a:srgbClr val="000000"/>
+                              </a:solidFill>
+                              <a:latin typeface="Cambria Math" panose="02040503050406030204" pitchFamily="18" charset="0"/>
+                            </a:rPr>
+                            <m:t>)</m:t>
                           </m:r>
                         </m:sup>
                       </m:sSubSup>
@@ -10066,7 +10952,25 @@
                               </a:solidFill>
                               <a:latin typeface="Cambria Math" panose="02040503050406030204" pitchFamily="18" charset="0"/>
                             </a:rPr>
-                            <m:t>(1)</m:t>
+                            <m:t>(</m:t>
+                          </m:r>
+                          <m:r>
+                            <a:rPr sz="4800" i="1">
+                              <a:solidFill>
+                                <a:srgbClr val="000000"/>
+                              </a:solidFill>
+                              <a:latin typeface="Cambria Math" panose="02040503050406030204" pitchFamily="18" charset="0"/>
+                            </a:rPr>
+                            <m:t>1</m:t>
+                          </m:r>
+                          <m:r>
+                            <a:rPr sz="4800" i="1">
+                              <a:solidFill>
+                                <a:srgbClr val="000000"/>
+                              </a:solidFill>
+                              <a:latin typeface="Cambria Math" panose="02040503050406030204" pitchFamily="18" charset="0"/>
+                            </a:rPr>
+                            <m:t>)</m:t>
                           </m:r>
                         </m:sup>
                       </m:sSup>
@@ -10402,7 +11306,7 @@
             <a:effectLst/>
             <a:extLst>
               <a:ext uri="{C572A759-6A51-4108-AA02-DFA0A04FC94B}">
-                <ma14:wrappingTextBoxFlag xmlns="" xmlns:m="http://schemas.openxmlformats.org/officeDocument/2006/math" xmlns:a14="http://schemas.microsoft.com/office/drawing/2010/main" xmlns:ma14="http://schemas.microsoft.com/office/mac/drawingml/2011/main" val="1"/>
+                <ma14:wrappingTextBoxFlag xmlns:ma14="http://schemas.microsoft.com/office/mac/drawingml/2011/main" xmlns:a14="http://schemas.microsoft.com/office/drawing/2010/main" xmlns:m="http://schemas.openxmlformats.org/officeDocument/2006/math" xmlns="" val="1"/>
               </a:ext>
             </a:extLst>
           </p:spPr>
@@ -10449,7 +11353,7 @@
             <a:effectLst/>
             <a:extLst>
               <a:ext uri="{C572A759-6A51-4108-AA02-DFA0A04FC94B}">
-                <ma14:wrappingTextBoxFlag xmlns="" xmlns:m="http://schemas.openxmlformats.org/officeDocument/2006/math" xmlns:a14="http://schemas.microsoft.com/office/drawing/2010/main" xmlns:ma14="http://schemas.microsoft.com/office/mac/drawingml/2011/main" val="1"/>
+                <ma14:wrappingTextBoxFlag xmlns:ma14="http://schemas.microsoft.com/office/mac/drawingml/2011/main" xmlns:a14="http://schemas.microsoft.com/office/drawing/2010/main" xmlns:m="http://schemas.openxmlformats.org/officeDocument/2006/math" xmlns="" val="1"/>
               </a:ext>
             </a:extLst>
           </p:spPr>
@@ -10705,7 +11609,25 @@
                                 </a:solidFill>
                                 <a:latin typeface="Cambria Math" panose="02040503050406030204" pitchFamily="18" charset="0"/>
                               </a:rPr>
-                              <m:t>(1)</m:t>
+                              <m:t>(</m:t>
+                            </m:r>
+                            <m:r>
+                              <a:rPr sz="3600" i="1">
+                                <a:solidFill>
+                                  <a:srgbClr val="000000"/>
+                                </a:solidFill>
+                                <a:latin typeface="Cambria Math" panose="02040503050406030204" pitchFamily="18" charset="0"/>
+                              </a:rPr>
+                              <m:t>1</m:t>
+                            </m:r>
+                            <m:r>
+                              <a:rPr sz="3600" i="1">
+                                <a:solidFill>
+                                  <a:srgbClr val="000000"/>
+                                </a:solidFill>
+                                <a:latin typeface="Cambria Math" panose="02040503050406030204" pitchFamily="18" charset="0"/>
+                              </a:rPr>
+                              <m:t>)</m:t>
                             </m:r>
                           </m:sup>
                         </m:sSubSup>
@@ -10840,7 +11762,25 @@
                                 </a:solidFill>
                                 <a:latin typeface="Cambria Math" panose="02040503050406030204" pitchFamily="18" charset="0"/>
                               </a:rPr>
-                              <m:t>(1)</m:t>
+                              <m:t>(</m:t>
+                            </m:r>
+                            <m:r>
+                              <a:rPr sz="3600" i="1">
+                                <a:solidFill>
+                                  <a:srgbClr val="000000"/>
+                                </a:solidFill>
+                                <a:latin typeface="Cambria Math" panose="02040503050406030204" pitchFamily="18" charset="0"/>
+                              </a:rPr>
+                              <m:t>1</m:t>
+                            </m:r>
+                            <m:r>
+                              <a:rPr sz="3600" i="1">
+                                <a:solidFill>
+                                  <a:srgbClr val="000000"/>
+                                </a:solidFill>
+                                <a:latin typeface="Cambria Math" panose="02040503050406030204" pitchFamily="18" charset="0"/>
+                              </a:rPr>
+                              <m:t>)</m:t>
                             </m:r>
                           </m:sup>
                         </m:sSubSup>
@@ -10975,7 +11915,25 @@
                                 </a:solidFill>
                                 <a:latin typeface="Cambria Math" panose="02040503050406030204" pitchFamily="18" charset="0"/>
                               </a:rPr>
-                              <m:t>(2)</m:t>
+                              <m:t>(</m:t>
+                            </m:r>
+                            <m:r>
+                              <a:rPr sz="3600" i="1">
+                                <a:solidFill>
+                                  <a:srgbClr val="000000"/>
+                                </a:solidFill>
+                                <a:latin typeface="Cambria Math" panose="02040503050406030204" pitchFamily="18" charset="0"/>
+                              </a:rPr>
+                              <m:t>2</m:t>
+                            </m:r>
+                            <m:r>
+                              <a:rPr sz="3600" i="1">
+                                <a:solidFill>
+                                  <a:srgbClr val="000000"/>
+                                </a:solidFill>
+                                <a:latin typeface="Cambria Math" panose="02040503050406030204" pitchFamily="18" charset="0"/>
+                              </a:rPr>
+                              <m:t>)</m:t>
                             </m:r>
                           </m:sup>
                         </m:sSubSup>
@@ -11110,7 +12068,25 @@
                                 </a:solidFill>
                                 <a:latin typeface="Cambria Math" panose="02040503050406030204" pitchFamily="18" charset="0"/>
                               </a:rPr>
-                              <m:t>(2)</m:t>
+                              <m:t>(</m:t>
+                            </m:r>
+                            <m:r>
+                              <a:rPr sz="3600" i="1">
+                                <a:solidFill>
+                                  <a:srgbClr val="000000"/>
+                                </a:solidFill>
+                                <a:latin typeface="Cambria Math" panose="02040503050406030204" pitchFamily="18" charset="0"/>
+                              </a:rPr>
+                              <m:t>2</m:t>
+                            </m:r>
+                            <m:r>
+                              <a:rPr sz="3600" i="1">
+                                <a:solidFill>
+                                  <a:srgbClr val="000000"/>
+                                </a:solidFill>
+                                <a:latin typeface="Cambria Math" panose="02040503050406030204" pitchFamily="18" charset="0"/>
+                              </a:rPr>
+                              <m:t>)</m:t>
                             </m:r>
                           </m:sup>
                         </m:sSubSup>
@@ -11248,7 +12224,25 @@
                                 </a:solidFill>
                                 <a:latin typeface="Cambria Math" panose="02040503050406030204" pitchFamily="18" charset="0"/>
                               </a:rPr>
-                              <m:t>(1)</m:t>
+                              <m:t>(</m:t>
+                            </m:r>
+                            <m:r>
+                              <a:rPr sz="3600" i="1">
+                                <a:solidFill>
+                                  <a:srgbClr val="000000"/>
+                                </a:solidFill>
+                                <a:latin typeface="Cambria Math" panose="02040503050406030204" pitchFamily="18" charset="0"/>
+                              </a:rPr>
+                              <m:t>1</m:t>
+                            </m:r>
+                            <m:r>
+                              <a:rPr sz="3600" i="1">
+                                <a:solidFill>
+                                  <a:srgbClr val="000000"/>
+                                </a:solidFill>
+                                <a:latin typeface="Cambria Math" panose="02040503050406030204" pitchFamily="18" charset="0"/>
+                              </a:rPr>
+                              <m:t>)</m:t>
                             </m:r>
                           </m:sup>
                         </m:sSubSup>
@@ -11386,7 +12380,25 @@
                                 </a:solidFill>
                                 <a:latin typeface="Cambria Math" panose="02040503050406030204" pitchFamily="18" charset="0"/>
                               </a:rPr>
-                              <m:t>(1)</m:t>
+                              <m:t>(</m:t>
+                            </m:r>
+                            <m:r>
+                              <a:rPr sz="3600" i="1">
+                                <a:solidFill>
+                                  <a:srgbClr val="000000"/>
+                                </a:solidFill>
+                                <a:latin typeface="Cambria Math" panose="02040503050406030204" pitchFamily="18" charset="0"/>
+                              </a:rPr>
+                              <m:t>1</m:t>
+                            </m:r>
+                            <m:r>
+                              <a:rPr sz="3600" i="1">
+                                <a:solidFill>
+                                  <a:srgbClr val="000000"/>
+                                </a:solidFill>
+                                <a:latin typeface="Cambria Math" panose="02040503050406030204" pitchFamily="18" charset="0"/>
+                              </a:rPr>
+                              <m:t>)</m:t>
                             </m:r>
                           </m:sup>
                         </m:sSubSup>
@@ -11524,7 +12536,25 @@
                                 </a:solidFill>
                                 <a:latin typeface="Cambria Math" panose="02040503050406030204" pitchFamily="18" charset="0"/>
                               </a:rPr>
-                              <m:t>(1)</m:t>
+                              <m:t>(</m:t>
+                            </m:r>
+                            <m:r>
+                              <a:rPr sz="3600" i="1">
+                                <a:solidFill>
+                                  <a:srgbClr val="000000"/>
+                                </a:solidFill>
+                                <a:latin typeface="Cambria Math" panose="02040503050406030204" pitchFamily="18" charset="0"/>
+                              </a:rPr>
+                              <m:t>1</m:t>
+                            </m:r>
+                            <m:r>
+                              <a:rPr sz="3600" i="1">
+                                <a:solidFill>
+                                  <a:srgbClr val="000000"/>
+                                </a:solidFill>
+                                <a:latin typeface="Cambria Math" panose="02040503050406030204" pitchFamily="18" charset="0"/>
+                              </a:rPr>
+                              <m:t>)</m:t>
                             </m:r>
                           </m:sup>
                         </m:sSubSup>
@@ -11662,7 +12692,25 @@
                                 </a:solidFill>
                                 <a:latin typeface="Cambria Math" panose="02040503050406030204" pitchFamily="18" charset="0"/>
                               </a:rPr>
-                              <m:t>(1)</m:t>
+                              <m:t>(</m:t>
+                            </m:r>
+                            <m:r>
+                              <a:rPr sz="3600" i="1">
+                                <a:solidFill>
+                                  <a:srgbClr val="000000"/>
+                                </a:solidFill>
+                                <a:latin typeface="Cambria Math" panose="02040503050406030204" pitchFamily="18" charset="0"/>
+                              </a:rPr>
+                              <m:t>1</m:t>
+                            </m:r>
+                            <m:r>
+                              <a:rPr sz="3600" i="1">
+                                <a:solidFill>
+                                  <a:srgbClr val="000000"/>
+                                </a:solidFill>
+                                <a:latin typeface="Cambria Math" panose="02040503050406030204" pitchFamily="18" charset="0"/>
+                              </a:rPr>
+                              <m:t>)</m:t>
                             </m:r>
                           </m:sup>
                         </m:sSubSup>
@@ -11756,7 +12804,7 @@
             <a:effectLst/>
             <a:extLst>
               <a:ext uri="{C572A759-6A51-4108-AA02-DFA0A04FC94B}">
-                <ma14:wrappingTextBoxFlag xmlns="" xmlns:m="http://schemas.openxmlformats.org/officeDocument/2006/math" xmlns:a14="http://schemas.microsoft.com/office/drawing/2010/main" xmlns:ma14="http://schemas.microsoft.com/office/mac/drawingml/2011/main" val="1"/>
+                <ma14:wrappingTextBoxFlag xmlns:ma14="http://schemas.microsoft.com/office/mac/drawingml/2011/main" xmlns:a14="http://schemas.microsoft.com/office/drawing/2010/main" xmlns:m="http://schemas.openxmlformats.org/officeDocument/2006/math" xmlns="" val="1"/>
               </a:ext>
             </a:extLst>
           </p:spPr>
@@ -11822,7 +12870,7 @@
             <a:effectLst/>
             <a:extLst>
               <a:ext uri="{C572A759-6A51-4108-AA02-DFA0A04FC94B}">
-                <ma14:wrappingTextBoxFlag xmlns="" xmlns:m="http://schemas.openxmlformats.org/officeDocument/2006/math" xmlns:a14="http://schemas.microsoft.com/office/drawing/2010/main" xmlns:ma14="http://schemas.microsoft.com/office/mac/drawingml/2011/main" val="1"/>
+                <ma14:wrappingTextBoxFlag xmlns:ma14="http://schemas.microsoft.com/office/mac/drawingml/2011/main" xmlns:a14="http://schemas.microsoft.com/office/drawing/2010/main" xmlns:m="http://schemas.openxmlformats.org/officeDocument/2006/math" xmlns="" val="1"/>
               </a:ext>
             </a:extLst>
           </p:spPr>
@@ -11893,7 +12941,7 @@
             <a:effectLst/>
             <a:extLst>
               <a:ext uri="{C572A759-6A51-4108-AA02-DFA0A04FC94B}">
-                <ma14:wrappingTextBoxFlag xmlns="" xmlns:m="http://schemas.openxmlformats.org/officeDocument/2006/math" xmlns:a14="http://schemas.microsoft.com/office/drawing/2010/main" xmlns:ma14="http://schemas.microsoft.com/office/mac/drawingml/2011/main" val="1"/>
+                <ma14:wrappingTextBoxFlag xmlns:ma14="http://schemas.microsoft.com/office/mac/drawingml/2011/main" xmlns:a14="http://schemas.microsoft.com/office/drawing/2010/main" xmlns:m="http://schemas.openxmlformats.org/officeDocument/2006/math" xmlns="" val="1"/>
               </a:ext>
             </a:extLst>
           </p:spPr>
@@ -11961,7 +13009,7 @@
             <a:effectLst/>
             <a:extLst>
               <a:ext uri="{C572A759-6A51-4108-AA02-DFA0A04FC94B}">
-                <ma14:wrappingTextBoxFlag xmlns="" xmlns:m="http://schemas.openxmlformats.org/officeDocument/2006/math" xmlns:a14="http://schemas.microsoft.com/office/drawing/2010/main" xmlns:ma14="http://schemas.microsoft.com/office/mac/drawingml/2011/main" val="1"/>
+                <ma14:wrappingTextBoxFlag xmlns:ma14="http://schemas.microsoft.com/office/mac/drawingml/2011/main" xmlns:a14="http://schemas.microsoft.com/office/drawing/2010/main" xmlns:m="http://schemas.openxmlformats.org/officeDocument/2006/math" xmlns="" val="1"/>
               </a:ext>
             </a:extLst>
           </p:spPr>
@@ -12339,7 +13387,7 @@
           </a:ln>
           <a:extLst>
             <a:ext uri="{C572A759-6A51-4108-AA02-DFA0A04FC94B}">
-              <ma14:wrappingTextBoxFlag xmlns="" xmlns:m="http://schemas.openxmlformats.org/officeDocument/2006/math" xmlns:a14="http://schemas.microsoft.com/office/drawing/2010/main" xmlns:ma14="http://schemas.microsoft.com/office/mac/drawingml/2011/main" val="1"/>
+              <ma14:wrappingTextBoxFlag xmlns:ma14="http://schemas.microsoft.com/office/mac/drawingml/2011/main" xmlns:a14="http://schemas.microsoft.com/office/drawing/2010/main" xmlns:m="http://schemas.openxmlformats.org/officeDocument/2006/math" xmlns="" val="1"/>
             </a:ext>
           </a:extLst>
         </p:spPr>
@@ -12405,7 +13453,7 @@
           </a:ln>
           <a:extLst>
             <a:ext uri="{C572A759-6A51-4108-AA02-DFA0A04FC94B}">
-              <ma14:wrappingTextBoxFlag xmlns="" xmlns:m="http://schemas.openxmlformats.org/officeDocument/2006/math" xmlns:a14="http://schemas.microsoft.com/office/drawing/2010/main" xmlns:ma14="http://schemas.microsoft.com/office/mac/drawingml/2011/main" val="1"/>
+              <ma14:wrappingTextBoxFlag xmlns:ma14="http://schemas.microsoft.com/office/mac/drawingml/2011/main" xmlns:a14="http://schemas.microsoft.com/office/drawing/2010/main" xmlns:m="http://schemas.openxmlformats.org/officeDocument/2006/math" xmlns="" val="1"/>
             </a:ext>
           </a:extLst>
         </p:spPr>
@@ -12666,7 +13714,7 @@
           </a:ln>
           <a:extLst>
             <a:ext uri="{C572A759-6A51-4108-AA02-DFA0A04FC94B}">
-              <ma14:wrappingTextBoxFlag xmlns="" xmlns:m="http://schemas.openxmlformats.org/officeDocument/2006/math" xmlns:a14="http://schemas.microsoft.com/office/drawing/2010/main" xmlns:ma14="http://schemas.microsoft.com/office/mac/drawingml/2011/main" val="1"/>
+              <ma14:wrappingTextBoxFlag xmlns:ma14="http://schemas.microsoft.com/office/mac/drawingml/2011/main" xmlns:a14="http://schemas.microsoft.com/office/drawing/2010/main" xmlns:m="http://schemas.openxmlformats.org/officeDocument/2006/math" xmlns="" val="1"/>
             </a:ext>
           </a:extLst>
         </p:spPr>
@@ -12725,7 +13773,7 @@
           </a:ln>
           <a:extLst>
             <a:ext uri="{C572A759-6A51-4108-AA02-DFA0A04FC94B}">
-              <ma14:wrappingTextBoxFlag xmlns="" xmlns:m="http://schemas.openxmlformats.org/officeDocument/2006/math" xmlns:a14="http://schemas.microsoft.com/office/drawing/2010/main" xmlns:ma14="http://schemas.microsoft.com/office/mac/drawingml/2011/main" val="1"/>
+              <ma14:wrappingTextBoxFlag xmlns:ma14="http://schemas.microsoft.com/office/mac/drawingml/2011/main" xmlns:a14="http://schemas.microsoft.com/office/drawing/2010/main" xmlns:m="http://schemas.openxmlformats.org/officeDocument/2006/math" xmlns="" val="1"/>
             </a:ext>
           </a:extLst>
         </p:spPr>
@@ -12791,7 +13839,7 @@
           </a:ln>
           <a:extLst>
             <a:ext uri="{C572A759-6A51-4108-AA02-DFA0A04FC94B}">
-              <ma14:wrappingTextBoxFlag xmlns="" xmlns:m="http://schemas.openxmlformats.org/officeDocument/2006/math" xmlns:a14="http://schemas.microsoft.com/office/drawing/2010/main" xmlns:ma14="http://schemas.microsoft.com/office/mac/drawingml/2011/main" val="1"/>
+              <ma14:wrappingTextBoxFlag xmlns:ma14="http://schemas.microsoft.com/office/mac/drawingml/2011/main" xmlns:a14="http://schemas.microsoft.com/office/drawing/2010/main" xmlns:m="http://schemas.openxmlformats.org/officeDocument/2006/math" xmlns="" val="1"/>
             </a:ext>
           </a:extLst>
         </p:spPr>
@@ -13270,7 +14318,7 @@
           </a:ln>
           <a:extLst>
             <a:ext uri="{C572A759-6A51-4108-AA02-DFA0A04FC94B}">
-              <ma14:wrappingTextBoxFlag xmlns="" xmlns:m="http://schemas.openxmlformats.org/officeDocument/2006/math" xmlns:a14="http://schemas.microsoft.com/office/drawing/2010/main" xmlns:ma14="http://schemas.microsoft.com/office/mac/drawingml/2011/main" val="1"/>
+              <ma14:wrappingTextBoxFlag xmlns:ma14="http://schemas.microsoft.com/office/mac/drawingml/2011/main" xmlns:a14="http://schemas.microsoft.com/office/drawing/2010/main" xmlns:m="http://schemas.openxmlformats.org/officeDocument/2006/math" xmlns="" val="1"/>
             </a:ext>
           </a:extLst>
         </p:spPr>
@@ -13421,7 +14469,7 @@
               </a:ln>
               <a:extLst>
                 <a:ext uri="{C572A759-6A51-4108-AA02-DFA0A04FC94B}">
-                  <ma14:wrappingTextBoxFlag xmlns="" xmlns:m="http://schemas.openxmlformats.org/officeDocument/2006/math" xmlns:ma14="http://schemas.microsoft.com/office/mac/drawingml/2011/main" val="1"/>
+                  <ma14:wrappingTextBoxFlag xmlns:ma14="http://schemas.microsoft.com/office/mac/drawingml/2011/main" xmlns:m="http://schemas.openxmlformats.org/officeDocument/2006/math" xmlns="" val="1"/>
                 </a:ext>
               </a:extLst>
             </p:spPr>
@@ -14173,7 +15221,7 @@
               </a:ln>
               <a:extLst>
                 <a:ext uri="{C572A759-6A51-4108-AA02-DFA0A04FC94B}">
-                  <ma14:wrappingTextBoxFlag xmlns="" xmlns:m="http://schemas.openxmlformats.org/officeDocument/2006/math" xmlns:ma14="http://schemas.microsoft.com/office/mac/drawingml/2011/main" val="1"/>
+                  <ma14:wrappingTextBoxFlag xmlns:ma14="http://schemas.microsoft.com/office/mac/drawingml/2011/main" xmlns:m="http://schemas.openxmlformats.org/officeDocument/2006/math" xmlns="" val="1"/>
                 </a:ext>
               </a:extLst>
             </p:spPr>
@@ -14294,7 +15342,7 @@
               </a:ln>
               <a:extLst>
                 <a:ext uri="{C572A759-6A51-4108-AA02-DFA0A04FC94B}">
-                  <ma14:wrappingTextBoxFlag xmlns="" xmlns:m="http://schemas.openxmlformats.org/officeDocument/2006/math" xmlns:ma14="http://schemas.microsoft.com/office/mac/drawingml/2011/main" val="1"/>
+                  <ma14:wrappingTextBoxFlag xmlns:ma14="http://schemas.microsoft.com/office/mac/drawingml/2011/main" xmlns:m="http://schemas.openxmlformats.org/officeDocument/2006/math" xmlns="" val="1"/>
                 </a:ext>
               </a:extLst>
             </p:spPr>
@@ -14415,7 +15463,7 @@
               </a:ln>
               <a:extLst>
                 <a:ext uri="{C572A759-6A51-4108-AA02-DFA0A04FC94B}">
-                  <ma14:wrappingTextBoxFlag xmlns="" xmlns:m="http://schemas.openxmlformats.org/officeDocument/2006/math" xmlns:ma14="http://schemas.microsoft.com/office/mac/drawingml/2011/main" val="1"/>
+                  <ma14:wrappingTextBoxFlag xmlns:ma14="http://schemas.microsoft.com/office/mac/drawingml/2011/main" xmlns:m="http://schemas.openxmlformats.org/officeDocument/2006/math" xmlns="" val="1"/>
                 </a:ext>
               </a:extLst>
             </p:spPr>
@@ -14528,7 +15576,7 @@
           </a:ln>
           <a:extLst>
             <a:ext uri="{C572A759-6A51-4108-AA02-DFA0A04FC94B}">
-              <ma14:wrappingTextBoxFlag xmlns="" xmlns:m="http://schemas.openxmlformats.org/officeDocument/2006/math" xmlns:a14="http://schemas.microsoft.com/office/drawing/2010/main" xmlns:ma14="http://schemas.microsoft.com/office/mac/drawingml/2011/main" val="1"/>
+              <ma14:wrappingTextBoxFlag xmlns:ma14="http://schemas.microsoft.com/office/mac/drawingml/2011/main" xmlns:a14="http://schemas.microsoft.com/office/drawing/2010/main" xmlns:m="http://schemas.openxmlformats.org/officeDocument/2006/math" xmlns="" val="1"/>
             </a:ext>
           </a:extLst>
         </p:spPr>
@@ -14955,7 +16003,7 @@
                 <a:effectLst/>
                 <a:extLst>
                   <a:ext uri="{C572A759-6A51-4108-AA02-DFA0A04FC94B}">
-                    <ma14:wrappingTextBoxFlag xmlns="" xmlns:m="http://schemas.openxmlformats.org/officeDocument/2006/math" xmlns:ma14="http://schemas.microsoft.com/office/mac/drawingml/2011/main" val="1"/>
+                    <ma14:wrappingTextBoxFlag xmlns:ma14="http://schemas.microsoft.com/office/mac/drawingml/2011/main" xmlns:m="http://schemas.openxmlformats.org/officeDocument/2006/math" xmlns="" val="1"/>
                   </a:ext>
                 </a:extLst>
               </p:spPr>
@@ -15894,7 +16942,7 @@
                 <a:effectLst/>
                 <a:extLst>
                   <a:ext uri="{C572A759-6A51-4108-AA02-DFA0A04FC94B}">
-                    <ma14:wrappingTextBoxFlag xmlns="" xmlns:m="http://schemas.openxmlformats.org/officeDocument/2006/math" xmlns:ma14="http://schemas.microsoft.com/office/mac/drawingml/2011/main" val="1"/>
+                    <ma14:wrappingTextBoxFlag xmlns:ma14="http://schemas.microsoft.com/office/mac/drawingml/2011/main" xmlns:m="http://schemas.openxmlformats.org/officeDocument/2006/math" xmlns="" val="1"/>
                   </a:ext>
                 </a:extLst>
               </p:spPr>
@@ -16021,7 +17069,7 @@
                 <a:effectLst/>
                 <a:extLst>
                   <a:ext uri="{C572A759-6A51-4108-AA02-DFA0A04FC94B}">
-                    <ma14:wrappingTextBoxFlag xmlns="" xmlns:m="http://schemas.openxmlformats.org/officeDocument/2006/math" xmlns:ma14="http://schemas.microsoft.com/office/mac/drawingml/2011/main" val="1"/>
+                    <ma14:wrappingTextBoxFlag xmlns:ma14="http://schemas.microsoft.com/office/mac/drawingml/2011/main" xmlns:m="http://schemas.openxmlformats.org/officeDocument/2006/math" xmlns="" val="1"/>
                   </a:ext>
                 </a:extLst>
               </p:spPr>
@@ -16148,7 +17196,7 @@
                 <a:effectLst/>
                 <a:extLst>
                   <a:ext uri="{C572A759-6A51-4108-AA02-DFA0A04FC94B}">
-                    <ma14:wrappingTextBoxFlag xmlns="" xmlns:m="http://schemas.openxmlformats.org/officeDocument/2006/math" xmlns:ma14="http://schemas.microsoft.com/office/mac/drawingml/2011/main" val="1"/>
+                    <ma14:wrappingTextBoxFlag xmlns:ma14="http://schemas.microsoft.com/office/mac/drawingml/2011/main" xmlns:m="http://schemas.openxmlformats.org/officeDocument/2006/math" xmlns="" val="1"/>
                   </a:ext>
                 </a:extLst>
               </p:spPr>
@@ -16266,7 +17314,7 @@
           </a:ln>
           <a:extLst>
             <a:ext uri="{C572A759-6A51-4108-AA02-DFA0A04FC94B}">
-              <ma14:wrappingTextBoxFlag xmlns="" xmlns:m="http://schemas.openxmlformats.org/officeDocument/2006/math" xmlns:a14="http://schemas.microsoft.com/office/drawing/2010/main" xmlns:ma14="http://schemas.microsoft.com/office/mac/drawingml/2011/main" val="1"/>
+              <ma14:wrappingTextBoxFlag xmlns:ma14="http://schemas.microsoft.com/office/mac/drawingml/2011/main" xmlns:a14="http://schemas.microsoft.com/office/drawing/2010/main" xmlns:m="http://schemas.openxmlformats.org/officeDocument/2006/math" xmlns="" val="1"/>
             </a:ext>
           </a:extLst>
         </p:spPr>
@@ -16366,7 +17414,7 @@
           </a:ln>
           <a:extLst>
             <a:ext uri="{C572A759-6A51-4108-AA02-DFA0A04FC94B}">
-              <ma14:wrappingTextBoxFlag xmlns="" xmlns:m="http://schemas.openxmlformats.org/officeDocument/2006/math" xmlns:a14="http://schemas.microsoft.com/office/drawing/2010/main" xmlns:ma14="http://schemas.microsoft.com/office/mac/drawingml/2011/main" val="1"/>
+              <ma14:wrappingTextBoxFlag xmlns:ma14="http://schemas.microsoft.com/office/mac/drawingml/2011/main" xmlns:a14="http://schemas.microsoft.com/office/drawing/2010/main" xmlns:m="http://schemas.openxmlformats.org/officeDocument/2006/math" xmlns="" val="1"/>
             </a:ext>
           </a:extLst>
         </p:spPr>
@@ -16492,7 +17540,25 @@
                                   </a:solidFill>
                                   <a:latin typeface="Cambria Math" panose="02040503050406030204" pitchFamily="18" charset="0"/>
                                 </a:rPr>
-                                <m:t>0.213</m:t>
+                                <m:t>0</m:t>
+                              </m:r>
+                              <m:r>
+                                <a:rPr sz="3600" i="1">
+                                  <a:solidFill>
+                                    <a:srgbClr val="000000"/>
+                                  </a:solidFill>
+                                  <a:latin typeface="Cambria Math" panose="02040503050406030204" pitchFamily="18" charset="0"/>
+                                </a:rPr>
+                                <m:t>.</m:t>
+                              </m:r>
+                              <m:r>
+                                <a:rPr sz="3600" i="1">
+                                  <a:solidFill>
+                                    <a:srgbClr val="000000"/>
+                                  </a:solidFill>
+                                  <a:latin typeface="Cambria Math" panose="02040503050406030204" pitchFamily="18" charset="0"/>
+                                </a:rPr>
+                                <m:t>213</m:t>
                               </m:r>
                             </m:e>
                             <m:e>
@@ -16503,7 +17569,25 @@
                                   </a:solidFill>
                                   <a:latin typeface="Cambria Math" panose="02040503050406030204" pitchFamily="18" charset="0"/>
                                 </a:rPr>
-                                <m:t>0.423</m:t>
+                                <m:t>0</m:t>
+                              </m:r>
+                              <m:r>
+                                <a:rPr sz="3600" i="1">
+                                  <a:solidFill>
+                                    <a:srgbClr val="000000"/>
+                                  </a:solidFill>
+                                  <a:latin typeface="Cambria Math" panose="02040503050406030204" pitchFamily="18" charset="0"/>
+                                </a:rPr>
+                                <m:t>.</m:t>
+                              </m:r>
+                              <m:r>
+                                <a:rPr sz="3600" i="1">
+                                  <a:solidFill>
+                                    <a:srgbClr val="000000"/>
+                                  </a:solidFill>
+                                  <a:latin typeface="Cambria Math" panose="02040503050406030204" pitchFamily="18" charset="0"/>
+                                </a:rPr>
+                                <m:t>423</m:t>
                               </m:r>
                             </m:e>
                             <m:e>
@@ -16514,7 +17598,25 @@
                                   </a:solidFill>
                                   <a:latin typeface="Cambria Math" panose="02040503050406030204" pitchFamily="18" charset="0"/>
                                 </a:rPr>
-                                <m:t>0.786</m:t>
+                                <m:t>0</m:t>
+                              </m:r>
+                              <m:r>
+                                <a:rPr sz="3600" i="1">
+                                  <a:solidFill>
+                                    <a:srgbClr val="000000"/>
+                                  </a:solidFill>
+                                  <a:latin typeface="Cambria Math" panose="02040503050406030204" pitchFamily="18" charset="0"/>
+                                </a:rPr>
+                                <m:t>.</m:t>
+                              </m:r>
+                              <m:r>
+                                <a:rPr sz="3600" i="1">
+                                  <a:solidFill>
+                                    <a:srgbClr val="000000"/>
+                                  </a:solidFill>
+                                  <a:latin typeface="Cambria Math" panose="02040503050406030204" pitchFamily="18" charset="0"/>
+                                </a:rPr>
+                                <m:t>786</m:t>
                               </m:r>
                             </m:e>
                             <m:e>
@@ -16525,7 +17627,25 @@
                                   </a:solidFill>
                                   <a:latin typeface="Cambria Math" panose="02040503050406030204" pitchFamily="18" charset="0"/>
                                 </a:rPr>
-                                <m:t>0.143</m:t>
+                                <m:t>0</m:t>
+                              </m:r>
+                              <m:r>
+                                <a:rPr sz="3600" i="1">
+                                  <a:solidFill>
+                                    <a:srgbClr val="000000"/>
+                                  </a:solidFill>
+                                  <a:latin typeface="Cambria Math" panose="02040503050406030204" pitchFamily="18" charset="0"/>
+                                </a:rPr>
+                                <m:t>.</m:t>
+                              </m:r>
+                              <m:r>
+                                <a:rPr sz="3600" i="1">
+                                  <a:solidFill>
+                                    <a:srgbClr val="000000"/>
+                                  </a:solidFill>
+                                  <a:latin typeface="Cambria Math" panose="02040503050406030204" pitchFamily="18" charset="0"/>
+                                </a:rPr>
+                                <m:t>143</m:t>
                               </m:r>
                             </m:e>
                           </m:eqArr>
@@ -16901,7 +18021,7 @@
                 <a:effectLst/>
                 <a:extLst>
                   <a:ext uri="{C572A759-6A51-4108-AA02-DFA0A04FC94B}">
-                    <ma14:wrappingTextBoxFlag xmlns="" xmlns:m="http://schemas.openxmlformats.org/officeDocument/2006/math" xmlns:ma14="http://schemas.microsoft.com/office/mac/drawingml/2011/main" val="1"/>
+                    <ma14:wrappingTextBoxFlag xmlns:ma14="http://schemas.microsoft.com/office/mac/drawingml/2011/main" xmlns:m="http://schemas.openxmlformats.org/officeDocument/2006/math" xmlns="" val="1"/>
                   </a:ext>
                 </a:extLst>
               </p:spPr>
@@ -18677,7 +19797,7 @@
                 <a:effectLst/>
                 <a:extLst>
                   <a:ext uri="{C572A759-6A51-4108-AA02-DFA0A04FC94B}">
-                    <ma14:wrappingTextBoxFlag xmlns="" xmlns:m="http://schemas.openxmlformats.org/officeDocument/2006/math" xmlns:ma14="http://schemas.microsoft.com/office/mac/drawingml/2011/main" val="1"/>
+                    <ma14:wrappingTextBoxFlag xmlns:ma14="http://schemas.microsoft.com/office/mac/drawingml/2011/main" xmlns:m="http://schemas.openxmlformats.org/officeDocument/2006/math" xmlns="" val="1"/>
                   </a:ext>
                 </a:extLst>
               </p:spPr>
@@ -18804,7 +19924,7 @@
                 <a:effectLst/>
                 <a:extLst>
                   <a:ext uri="{C572A759-6A51-4108-AA02-DFA0A04FC94B}">
-                    <ma14:wrappingTextBoxFlag xmlns="" xmlns:m="http://schemas.openxmlformats.org/officeDocument/2006/math" xmlns:ma14="http://schemas.microsoft.com/office/mac/drawingml/2011/main" val="1"/>
+                    <ma14:wrappingTextBoxFlag xmlns:ma14="http://schemas.microsoft.com/office/mac/drawingml/2011/main" xmlns:m="http://schemas.openxmlformats.org/officeDocument/2006/math" xmlns="" val="1"/>
                   </a:ext>
                 </a:extLst>
               </p:spPr>
@@ -18931,7 +20051,7 @@
                 <a:effectLst/>
                 <a:extLst>
                   <a:ext uri="{C572A759-6A51-4108-AA02-DFA0A04FC94B}">
-                    <ma14:wrappingTextBoxFlag xmlns="" xmlns:m="http://schemas.openxmlformats.org/officeDocument/2006/math" xmlns:ma14="http://schemas.microsoft.com/office/mac/drawingml/2011/main" val="1"/>
+                    <ma14:wrappingTextBoxFlag xmlns:ma14="http://schemas.microsoft.com/office/mac/drawingml/2011/main" xmlns:m="http://schemas.openxmlformats.org/officeDocument/2006/math" xmlns="" val="1"/>
                   </a:ext>
                 </a:extLst>
               </p:spPr>
@@ -19075,7 +20195,7 @@
           </a:ln>
           <a:extLst>
             <a:ext uri="{C572A759-6A51-4108-AA02-DFA0A04FC94B}">
-              <ma14:wrappingTextBoxFlag xmlns="" xmlns:m="http://schemas.openxmlformats.org/officeDocument/2006/math" xmlns:a14="http://schemas.microsoft.com/office/drawing/2010/main" xmlns:ma14="http://schemas.microsoft.com/office/mac/drawingml/2011/main" val="1"/>
+              <ma14:wrappingTextBoxFlag xmlns:ma14="http://schemas.microsoft.com/office/mac/drawingml/2011/main" xmlns:a14="http://schemas.microsoft.com/office/drawing/2010/main" xmlns:m="http://schemas.openxmlformats.org/officeDocument/2006/math" xmlns="" val="1"/>
             </a:ext>
           </a:extLst>
         </p:spPr>
@@ -19963,7 +21083,16 @@
                                   </a:solidFill>
                                   <a:latin typeface="Cambria Math" panose="02040503050406030204" pitchFamily="18" charset="0"/>
                                 </a:rPr>
-                                <m:t>=1</m:t>
+                                <m:t>=</m:t>
+                              </m:r>
+                              <m:r>
+                                <a:rPr sz="3200" i="1">
+                                  <a:solidFill>
+                                    <a:srgbClr val="000000"/>
+                                  </a:solidFill>
+                                  <a:latin typeface="Cambria Math" panose="02040503050406030204" pitchFamily="18" charset="0"/>
+                                </a:rPr>
+                                <m:t>1</m:t>
                               </m:r>
                             </m:lim>
                           </m:limLow>
@@ -20031,7 +21160,16 @@
                                   </a:solidFill>
                                   <a:latin typeface="Cambria Math" panose="02040503050406030204" pitchFamily="18" charset="0"/>
                                 </a:rPr>
-                                <m:t>=1</m:t>
+                                <m:t>=</m:t>
+                              </m:r>
+                              <m:r>
+                                <a:rPr sz="3200" i="1">
+                                  <a:solidFill>
+                                    <a:srgbClr val="000000"/>
+                                  </a:solidFill>
+                                  <a:latin typeface="Cambria Math" panose="02040503050406030204" pitchFamily="18" charset="0"/>
+                                </a:rPr>
+                                <m:t>1</m:t>
                               </m:r>
                             </m:lim>
                           </m:limLow>
@@ -20291,7 +21429,25 @@
                               </a:solidFill>
                               <a:latin typeface="Cambria Math" panose="02040503050406030204" pitchFamily="18" charset="0"/>
                             </a:rPr>
-                            <m:t>+(1−</m:t>
+                            <m:t>+(</m:t>
+                          </m:r>
+                          <m:r>
+                            <a:rPr sz="3200" i="1">
+                              <a:solidFill>
+                                <a:srgbClr val="000000"/>
+                              </a:solidFill>
+                              <a:latin typeface="Cambria Math" panose="02040503050406030204" pitchFamily="18" charset="0"/>
+                            </a:rPr>
+                            <m:t>1</m:t>
+                          </m:r>
+                          <m:r>
+                            <a:rPr sz="3200" i="1">
+                              <a:solidFill>
+                                <a:srgbClr val="000000"/>
+                              </a:solidFill>
+                              <a:latin typeface="Cambria Math" panose="02040503050406030204" pitchFamily="18" charset="0"/>
+                            </a:rPr>
+                            <m:t>−</m:t>
                           </m:r>
                           <m:sSubSup>
                             <m:sSubSupPr>
@@ -20381,7 +21537,25 @@
                               </a:solidFill>
                               <a:latin typeface="Cambria Math" panose="02040503050406030204" pitchFamily="18" charset="0"/>
                             </a:rPr>
-                            <m:t>(1−</m:t>
+                            <m:t>(</m:t>
+                          </m:r>
+                          <m:r>
+                            <a:rPr sz="3200" i="1">
+                              <a:solidFill>
+                                <a:srgbClr val="000000"/>
+                              </a:solidFill>
+                              <a:latin typeface="Cambria Math" panose="02040503050406030204" pitchFamily="18" charset="0"/>
+                            </a:rPr>
+                            <m:t>1</m:t>
+                          </m:r>
+                          <m:r>
+                            <a:rPr sz="3200" i="1">
+                              <a:solidFill>
+                                <a:srgbClr val="000000"/>
+                              </a:solidFill>
+                              <a:latin typeface="Cambria Math" panose="02040503050406030204" pitchFamily="18" charset="0"/>
+                            </a:rPr>
+                            <m:t>−</m:t>
                           </m:r>
                           <m:sSub>
                             <m:sSubPr>
@@ -20743,7 +21917,7 @@
           </a:ln>
           <a:extLst>
             <a:ext uri="{C572A759-6A51-4108-AA02-DFA0A04FC94B}">
-              <ma14:wrappingTextBoxFlag xmlns="" xmlns:m="http://schemas.openxmlformats.org/officeDocument/2006/math" xmlns:a14="http://schemas.microsoft.com/office/drawing/2010/main" xmlns:ma14="http://schemas.microsoft.com/office/mac/drawingml/2011/main" val="1"/>
+              <ma14:wrappingTextBoxFlag xmlns:ma14="http://schemas.microsoft.com/office/mac/drawingml/2011/main" xmlns:a14="http://schemas.microsoft.com/office/drawing/2010/main" xmlns:m="http://schemas.openxmlformats.org/officeDocument/2006/math" xmlns="" val="1"/>
             </a:ext>
           </a:extLst>
         </p:spPr>
@@ -20830,7 +22004,7 @@
           </a:ln>
           <a:extLst>
             <a:ext uri="{C572A759-6A51-4108-AA02-DFA0A04FC94B}">
-              <ma14:wrappingTextBoxFlag xmlns="" xmlns:m="http://schemas.openxmlformats.org/officeDocument/2006/math" xmlns:a14="http://schemas.microsoft.com/office/drawing/2010/main" xmlns:ma14="http://schemas.microsoft.com/office/mac/drawingml/2011/main" val="1"/>
+              <ma14:wrappingTextBoxFlag xmlns:ma14="http://schemas.microsoft.com/office/mac/drawingml/2011/main" xmlns:a14="http://schemas.microsoft.com/office/drawing/2010/main" xmlns:m="http://schemas.openxmlformats.org/officeDocument/2006/math" xmlns="" val="1"/>
             </a:ext>
           </a:extLst>
         </p:spPr>
@@ -20893,7 +22067,7 @@
           </a:ln>
           <a:extLst>
             <a:ext uri="{C572A759-6A51-4108-AA02-DFA0A04FC94B}">
-              <ma14:wrappingTextBoxFlag xmlns="" xmlns:m="http://schemas.openxmlformats.org/officeDocument/2006/math" xmlns:a14="http://schemas.microsoft.com/office/drawing/2010/main" xmlns:ma14="http://schemas.microsoft.com/office/mac/drawingml/2011/main" val="1"/>
+              <ma14:wrappingTextBoxFlag xmlns:ma14="http://schemas.microsoft.com/office/mac/drawingml/2011/main" xmlns:a14="http://schemas.microsoft.com/office/drawing/2010/main" xmlns:m="http://schemas.openxmlformats.org/officeDocument/2006/math" xmlns="" val="1"/>
             </a:ext>
           </a:extLst>
         </p:spPr>
@@ -20957,7 +22131,7 @@
           </a:ln>
           <a:extLst>
             <a:ext uri="{C572A759-6A51-4108-AA02-DFA0A04FC94B}">
-              <ma14:wrappingTextBoxFlag xmlns="" xmlns:m="http://schemas.openxmlformats.org/officeDocument/2006/math" xmlns:a14="http://schemas.microsoft.com/office/drawing/2010/main" xmlns:ma14="http://schemas.microsoft.com/office/mac/drawingml/2011/main" val="1"/>
+              <ma14:wrappingTextBoxFlag xmlns:ma14="http://schemas.microsoft.com/office/mac/drawingml/2011/main" xmlns:a14="http://schemas.microsoft.com/office/drawing/2010/main" xmlns:m="http://schemas.openxmlformats.org/officeDocument/2006/math" xmlns="" val="1"/>
             </a:ext>
           </a:extLst>
         </p:spPr>
@@ -24359,7 +25533,7 @@
           </a:ln>
           <a:extLst>
             <a:ext uri="{C572A759-6A51-4108-AA02-DFA0A04FC94B}">
-              <ma14:wrappingTextBoxFlag xmlns="" xmlns:m="http://schemas.openxmlformats.org/officeDocument/2006/math" xmlns:a14="http://schemas.microsoft.com/office/drawing/2010/main" xmlns:ma14="http://schemas.microsoft.com/office/mac/drawingml/2011/main" val="1"/>
+              <ma14:wrappingTextBoxFlag xmlns:ma14="http://schemas.microsoft.com/office/mac/drawingml/2011/main" xmlns:a14="http://schemas.microsoft.com/office/drawing/2010/main" xmlns:m="http://schemas.openxmlformats.org/officeDocument/2006/math" xmlns="" val="1"/>
             </a:ext>
           </a:extLst>
         </p:spPr>
@@ -24425,7 +25599,7 @@
           </a:ln>
           <a:extLst>
             <a:ext uri="{C572A759-6A51-4108-AA02-DFA0A04FC94B}">
-              <ma14:wrappingTextBoxFlag xmlns="" xmlns:m="http://schemas.openxmlformats.org/officeDocument/2006/math" xmlns:a14="http://schemas.microsoft.com/office/drawing/2010/main" xmlns:ma14="http://schemas.microsoft.com/office/mac/drawingml/2011/main" val="1"/>
+              <ma14:wrappingTextBoxFlag xmlns:ma14="http://schemas.microsoft.com/office/mac/drawingml/2011/main" xmlns:a14="http://schemas.microsoft.com/office/drawing/2010/main" xmlns:m="http://schemas.openxmlformats.org/officeDocument/2006/math" xmlns="" val="1"/>
             </a:ext>
           </a:extLst>
         </p:spPr>
@@ -24686,7 +25860,7 @@
           </a:ln>
           <a:extLst>
             <a:ext uri="{C572A759-6A51-4108-AA02-DFA0A04FC94B}">
-              <ma14:wrappingTextBoxFlag xmlns="" xmlns:m="http://schemas.openxmlformats.org/officeDocument/2006/math" xmlns:a14="http://schemas.microsoft.com/office/drawing/2010/main" xmlns:ma14="http://schemas.microsoft.com/office/mac/drawingml/2011/main" val="1"/>
+              <ma14:wrappingTextBoxFlag xmlns:ma14="http://schemas.microsoft.com/office/mac/drawingml/2011/main" xmlns:a14="http://schemas.microsoft.com/office/drawing/2010/main" xmlns:m="http://schemas.openxmlformats.org/officeDocument/2006/math" xmlns="" val="1"/>
             </a:ext>
           </a:extLst>
         </p:spPr>
@@ -24745,7 +25919,7 @@
           </a:ln>
           <a:extLst>
             <a:ext uri="{C572A759-6A51-4108-AA02-DFA0A04FC94B}">
-              <ma14:wrappingTextBoxFlag xmlns="" xmlns:m="http://schemas.openxmlformats.org/officeDocument/2006/math" xmlns:a14="http://schemas.microsoft.com/office/drawing/2010/main" xmlns:ma14="http://schemas.microsoft.com/office/mac/drawingml/2011/main" val="1"/>
+              <ma14:wrappingTextBoxFlag xmlns:ma14="http://schemas.microsoft.com/office/mac/drawingml/2011/main" xmlns:a14="http://schemas.microsoft.com/office/drawing/2010/main" xmlns:m="http://schemas.openxmlformats.org/officeDocument/2006/math" xmlns="" val="1"/>
             </a:ext>
           </a:extLst>
         </p:spPr>
@@ -24811,7 +25985,7 @@
           </a:ln>
           <a:extLst>
             <a:ext uri="{C572A759-6A51-4108-AA02-DFA0A04FC94B}">
-              <ma14:wrappingTextBoxFlag xmlns="" xmlns:m="http://schemas.openxmlformats.org/officeDocument/2006/math" xmlns:a14="http://schemas.microsoft.com/office/drawing/2010/main" xmlns:ma14="http://schemas.microsoft.com/office/mac/drawingml/2011/main" val="1"/>
+              <ma14:wrappingTextBoxFlag xmlns:ma14="http://schemas.microsoft.com/office/mac/drawingml/2011/main" xmlns:a14="http://schemas.microsoft.com/office/drawing/2010/main" xmlns:m="http://schemas.openxmlformats.org/officeDocument/2006/math" xmlns="" val="1"/>
             </a:ext>
           </a:extLst>
         </p:spPr>
@@ -25290,7 +26464,7 @@
           </a:ln>
           <a:extLst>
             <a:ext uri="{C572A759-6A51-4108-AA02-DFA0A04FC94B}">
-              <ma14:wrappingTextBoxFlag xmlns="" xmlns:m="http://schemas.openxmlformats.org/officeDocument/2006/math" xmlns:a14="http://schemas.microsoft.com/office/drawing/2010/main" xmlns:ma14="http://schemas.microsoft.com/office/mac/drawingml/2011/main" val="1"/>
+              <ma14:wrappingTextBoxFlag xmlns:ma14="http://schemas.microsoft.com/office/mac/drawingml/2011/main" xmlns:a14="http://schemas.microsoft.com/office/drawing/2010/main" xmlns:m="http://schemas.openxmlformats.org/officeDocument/2006/math" xmlns="" val="1"/>
             </a:ext>
           </a:extLst>
         </p:spPr>
@@ -25334,7 +26508,7 @@
           </a:ln>
           <a:extLst>
             <a:ext uri="{C572A759-6A51-4108-AA02-DFA0A04FC94B}">
-              <ma14:wrappingTextBoxFlag xmlns="" xmlns:m="http://schemas.openxmlformats.org/officeDocument/2006/math" xmlns:a14="http://schemas.microsoft.com/office/drawing/2010/main" xmlns:ma14="http://schemas.microsoft.com/office/mac/drawingml/2011/main" val="1"/>
+              <ma14:wrappingTextBoxFlag xmlns:ma14="http://schemas.microsoft.com/office/mac/drawingml/2011/main" xmlns:a14="http://schemas.microsoft.com/office/drawing/2010/main" xmlns:m="http://schemas.openxmlformats.org/officeDocument/2006/math" xmlns="" val="1"/>
             </a:ext>
           </a:extLst>
         </p:spPr>
@@ -26197,7 +27371,7 @@
           </a:ln>
           <a:extLst>
             <a:ext uri="{C572A759-6A51-4108-AA02-DFA0A04FC94B}">
-              <ma14:wrappingTextBoxFlag xmlns="" xmlns:m="http://schemas.openxmlformats.org/officeDocument/2006/math" xmlns:a14="http://schemas.microsoft.com/office/drawing/2010/main" xmlns:ma14="http://schemas.microsoft.com/office/mac/drawingml/2011/main" val="1"/>
+              <ma14:wrappingTextBoxFlag xmlns:ma14="http://schemas.microsoft.com/office/mac/drawingml/2011/main" xmlns:a14="http://schemas.microsoft.com/office/drawing/2010/main" xmlns:m="http://schemas.openxmlformats.org/officeDocument/2006/math" xmlns="" val="1"/>
             </a:ext>
           </a:extLst>
         </p:spPr>
@@ -26259,7 +27433,7 @@
           </a:ln>
           <a:extLst>
             <a:ext uri="{C572A759-6A51-4108-AA02-DFA0A04FC94B}">
-              <ma14:wrappingTextBoxFlag xmlns="" xmlns:m="http://schemas.openxmlformats.org/officeDocument/2006/math" xmlns:a14="http://schemas.microsoft.com/office/drawing/2010/main" xmlns:ma14="http://schemas.microsoft.com/office/mac/drawingml/2011/main" val="1"/>
+              <ma14:wrappingTextBoxFlag xmlns:ma14="http://schemas.microsoft.com/office/mac/drawingml/2011/main" xmlns:a14="http://schemas.microsoft.com/office/drawing/2010/main" xmlns:m="http://schemas.openxmlformats.org/officeDocument/2006/math" xmlns="" val="1"/>
             </a:ext>
           </a:extLst>
         </p:spPr>
@@ -26326,7 +27500,7 @@
           </a:ln>
           <a:extLst>
             <a:ext uri="{C572A759-6A51-4108-AA02-DFA0A04FC94B}">
-              <ma14:wrappingTextBoxFlag xmlns="" xmlns:m="http://schemas.openxmlformats.org/officeDocument/2006/math" xmlns:a14="http://schemas.microsoft.com/office/drawing/2010/main" xmlns:ma14="http://schemas.microsoft.com/office/mac/drawingml/2011/main" val="1"/>
+              <ma14:wrappingTextBoxFlag xmlns:ma14="http://schemas.microsoft.com/office/mac/drawingml/2011/main" xmlns:a14="http://schemas.microsoft.com/office/drawing/2010/main" xmlns:m="http://schemas.openxmlformats.org/officeDocument/2006/math" xmlns="" val="1"/>
             </a:ext>
           </a:extLst>
         </p:spPr>
@@ -26390,7 +27564,7 @@
           </a:ln>
           <a:extLst>
             <a:ext uri="{C572A759-6A51-4108-AA02-DFA0A04FC94B}">
-              <ma14:wrappingTextBoxFlag xmlns="" xmlns:m="http://schemas.openxmlformats.org/officeDocument/2006/math" xmlns:a14="http://schemas.microsoft.com/office/drawing/2010/main" xmlns:ma14="http://schemas.microsoft.com/office/mac/drawingml/2011/main" val="1"/>
+              <ma14:wrappingTextBoxFlag xmlns:ma14="http://schemas.microsoft.com/office/mac/drawingml/2011/main" xmlns:a14="http://schemas.microsoft.com/office/drawing/2010/main" xmlns:m="http://schemas.openxmlformats.org/officeDocument/2006/math" xmlns="" val="1"/>
             </a:ext>
           </a:extLst>
         </p:spPr>
@@ -26562,7 +27736,25 @@
                                 </a:solidFill>
                                 <a:latin typeface="Cambria Math" panose="02040503050406030204" pitchFamily="18" charset="0"/>
                               </a:rPr>
-                              <m:t>+1)</m:t>
+                              <m:t>+</m:t>
+                            </m:r>
+                            <m:r>
+                              <a:rPr sz="3600" i="1">
+                                <a:solidFill>
+                                  <a:srgbClr val="000000"/>
+                                </a:solidFill>
+                                <a:latin typeface="Cambria Math" panose="02040503050406030204" pitchFamily="18" charset="0"/>
+                              </a:rPr>
+                              <m:t>1</m:t>
+                            </m:r>
+                            <m:r>
+                              <a:rPr sz="3600" i="1">
+                                <a:solidFill>
+                                  <a:srgbClr val="000000"/>
+                                </a:solidFill>
+                                <a:latin typeface="Cambria Math" panose="02040503050406030204" pitchFamily="18" charset="0"/>
+                              </a:rPr>
+                              <m:t>)</m:t>
                             </m:r>
                           </m:sup>
                         </m:sSubSup>
@@ -27180,7 +28372,25 @@
                                 </a:solidFill>
                                 <a:latin typeface="Cambria Math" panose="02040503050406030204" pitchFamily="18" charset="0"/>
                               </a:rPr>
-                              <m:t>+2)</m:t>
+                              <m:t>+</m:t>
+                            </m:r>
+                            <m:r>
+                              <a:rPr sz="3600" i="1">
+                                <a:solidFill>
+                                  <a:srgbClr val="000000"/>
+                                </a:solidFill>
+                                <a:latin typeface="Cambria Math" panose="02040503050406030204" pitchFamily="18" charset="0"/>
+                              </a:rPr>
+                              <m:t>2</m:t>
+                            </m:r>
+                            <m:r>
+                              <a:rPr sz="3600" i="1">
+                                <a:solidFill>
+                                  <a:srgbClr val="000000"/>
+                                </a:solidFill>
+                                <a:latin typeface="Cambria Math" panose="02040503050406030204" pitchFamily="18" charset="0"/>
+                              </a:rPr>
+                              <m:t>)</m:t>
                             </m:r>
                           </m:sup>
                         </m:sSubSup>
@@ -27386,7 +28596,25 @@
                                 </a:solidFill>
                                 <a:latin typeface="Cambria Math" panose="02040503050406030204" pitchFamily="18" charset="0"/>
                               </a:rPr>
-                              <m:t>+1)</m:t>
+                              <m:t>+</m:t>
+                            </m:r>
+                            <m:r>
+                              <a:rPr sz="3600" i="1">
+                                <a:solidFill>
+                                  <a:srgbClr val="000000"/>
+                                </a:solidFill>
+                                <a:latin typeface="Cambria Math" panose="02040503050406030204" pitchFamily="18" charset="0"/>
+                              </a:rPr>
+                              <m:t>1</m:t>
+                            </m:r>
+                            <m:r>
+                              <a:rPr sz="3600" i="1">
+                                <a:solidFill>
+                                  <a:srgbClr val="000000"/>
+                                </a:solidFill>
+                                <a:latin typeface="Cambria Math" panose="02040503050406030204" pitchFamily="18" charset="0"/>
+                              </a:rPr>
+                              <m:t>)</m:t>
                             </m:r>
                           </m:sup>
                         </m:sSubSup>
@@ -27592,7 +28820,25 @@
                                 </a:solidFill>
                                 <a:latin typeface="Cambria Math" panose="02040503050406030204" pitchFamily="18" charset="0"/>
                               </a:rPr>
-                              <m:t>+1)</m:t>
+                              <m:t>+</m:t>
+                            </m:r>
+                            <m:r>
+                              <a:rPr sz="3600" i="1">
+                                <a:solidFill>
+                                  <a:srgbClr val="000000"/>
+                                </a:solidFill>
+                                <a:latin typeface="Cambria Math" panose="02040503050406030204" pitchFamily="18" charset="0"/>
+                              </a:rPr>
+                              <m:t>1</m:t>
+                            </m:r>
+                            <m:r>
+                              <a:rPr sz="3600" i="1">
+                                <a:solidFill>
+                                  <a:srgbClr val="000000"/>
+                                </a:solidFill>
+                                <a:latin typeface="Cambria Math" panose="02040503050406030204" pitchFamily="18" charset="0"/>
+                              </a:rPr>
+                              <m:t>)</m:t>
                             </m:r>
                           </m:sup>
                         </m:sSubSup>
@@ -27694,7 +28940,7 @@
           </a:ln>
           <a:extLst>
             <a:ext uri="{C572A759-6A51-4108-AA02-DFA0A04FC94B}">
-              <ma14:wrappingTextBoxFlag xmlns="" xmlns:m="http://schemas.openxmlformats.org/officeDocument/2006/math" xmlns:a14="http://schemas.microsoft.com/office/drawing/2010/main" xmlns:ma14="http://schemas.microsoft.com/office/mac/drawingml/2011/main" val="1"/>
+              <ma14:wrappingTextBoxFlag xmlns:ma14="http://schemas.microsoft.com/office/mac/drawingml/2011/main" xmlns:a14="http://schemas.microsoft.com/office/drawing/2010/main" xmlns:m="http://schemas.openxmlformats.org/officeDocument/2006/math" xmlns="" val="1"/>
             </a:ext>
           </a:extLst>
         </p:spPr>
@@ -29233,7 +30479,7 @@
           </a:ln>
           <a:extLst>
             <a:ext uri="{C572A759-6A51-4108-AA02-DFA0A04FC94B}">
-              <ma14:wrappingTextBoxFlag xmlns="" xmlns:m="http://schemas.openxmlformats.org/officeDocument/2006/math" xmlns:a14="http://schemas.microsoft.com/office/drawing/2010/main" xmlns:ma14="http://schemas.microsoft.com/office/mac/drawingml/2011/main" val="1"/>
+              <ma14:wrappingTextBoxFlag xmlns:ma14="http://schemas.microsoft.com/office/mac/drawingml/2011/main" xmlns:a14="http://schemas.microsoft.com/office/drawing/2010/main" xmlns:m="http://schemas.openxmlformats.org/officeDocument/2006/math" xmlns="" val="1"/>
             </a:ext>
           </a:extLst>
         </p:spPr>
@@ -29338,7 +30584,7 @@
             <a:effectLst/>
             <a:extLst>
               <a:ext uri="{C572A759-6A51-4108-AA02-DFA0A04FC94B}">
-                <ma14:wrappingTextBoxFlag xmlns="" xmlns:m="http://schemas.openxmlformats.org/officeDocument/2006/math" xmlns:a14="http://schemas.microsoft.com/office/drawing/2010/main" xmlns:ma14="http://schemas.microsoft.com/office/mac/drawingml/2011/main" val="1"/>
+                <ma14:wrappingTextBoxFlag xmlns:ma14="http://schemas.microsoft.com/office/mac/drawingml/2011/main" xmlns:a14="http://schemas.microsoft.com/office/drawing/2010/main" xmlns:m="http://schemas.openxmlformats.org/officeDocument/2006/math" xmlns="" val="1"/>
               </a:ext>
             </a:extLst>
           </p:spPr>
@@ -29405,7 +30651,7 @@
             <a:effectLst/>
             <a:extLst>
               <a:ext uri="{C572A759-6A51-4108-AA02-DFA0A04FC94B}">
-                <ma14:wrappingTextBoxFlag xmlns="" xmlns:m="http://schemas.openxmlformats.org/officeDocument/2006/math" xmlns:a14="http://schemas.microsoft.com/office/drawing/2010/main" xmlns:ma14="http://schemas.microsoft.com/office/mac/drawingml/2011/main" val="1"/>
+                <ma14:wrappingTextBoxFlag xmlns:ma14="http://schemas.microsoft.com/office/mac/drawingml/2011/main" xmlns:a14="http://schemas.microsoft.com/office/drawing/2010/main" xmlns:m="http://schemas.openxmlformats.org/officeDocument/2006/math" xmlns="" val="1"/>
               </a:ext>
             </a:extLst>
           </p:spPr>
@@ -29473,7 +30719,7 @@
             <a:effectLst/>
             <a:extLst>
               <a:ext uri="{C572A759-6A51-4108-AA02-DFA0A04FC94B}">
-                <ma14:wrappingTextBoxFlag xmlns="" xmlns:m="http://schemas.openxmlformats.org/officeDocument/2006/math" xmlns:a14="http://schemas.microsoft.com/office/drawing/2010/main" xmlns:ma14="http://schemas.microsoft.com/office/mac/drawingml/2011/main" val="1"/>
+                <ma14:wrappingTextBoxFlag xmlns:ma14="http://schemas.microsoft.com/office/mac/drawingml/2011/main" xmlns:a14="http://schemas.microsoft.com/office/drawing/2010/main" xmlns:m="http://schemas.openxmlformats.org/officeDocument/2006/math" xmlns="" val="1"/>
               </a:ext>
             </a:extLst>
           </p:spPr>
@@ -34459,6 +35705,604 @@
           </p:sp>
         </mc:Fallback>
       </mc:AlternateContent>
+      <mc:AlternateContent xmlns:mc="http://schemas.openxmlformats.org/markup-compatibility/2006">
+        <mc:Choice xmlns:a14="http://schemas.microsoft.com/office/drawing/2010/main" Requires="a14">
+          <p:sp>
+            <p:nvSpPr>
+              <p:cNvPr id="3" name="Vergelijking">
+                <a:extLst>
+                  <a:ext uri="{FF2B5EF4-FFF2-40B4-BE49-F238E27FC236}">
+                    <a16:creationId xmlns:a16="http://schemas.microsoft.com/office/drawing/2014/main" id="{9570EF65-D85D-F49A-E56B-3C4816D7A131}"/>
+                  </a:ext>
+                </a:extLst>
+              </p:cNvPr>
+              <p:cNvSpPr txBox="1"/>
+              <p:nvPr/>
+            </p:nvSpPr>
+            <p:spPr>
+              <a:xfrm rot="19800000">
+                <a:off x="2423905" y="1086178"/>
+                <a:ext cx="4483087" cy="448777"/>
+              </a:xfrm>
+              <a:prstGeom prst="rect">
+                <a:avLst/>
+              </a:prstGeom>
+              <a:ln w="12700">
+                <a:miter lim="400000"/>
+              </a:ln>
+            </p:spPr>
+            <p:txBody>
+              <a:bodyPr wrap="none" lIns="0" tIns="0" rIns="0" bIns="0">
+                <a:spAutoFit/>
+              </a:bodyPr>
+              <a:lstStyle/>
+              <a:p>
+                <a:pPr algn="l" defTabSz="914400" latinLnBrk="1">
+                  <a:defRPr sz="1800"/>
+                </a:pPr>
+                <a14:m>
+                  <m:oMathPara xmlns:m="http://schemas.openxmlformats.org/officeDocument/2006/math">
+                    <m:oMathParaPr>
+                      <m:jc m:val="centerGroup"/>
+                    </m:oMathParaPr>
+                    <m:oMath xmlns:m="http://schemas.openxmlformats.org/officeDocument/2006/math">
+                      <m:sSup>
+                        <m:sSupPr>
+                          <m:ctrlPr>
+                            <a:rPr lang="ar-AE" sz="2800" i="1" smtClean="0">
+                              <a:solidFill>
+                                <a:srgbClr val="000000"/>
+                              </a:solidFill>
+                              <a:latin typeface="Cambria Math" panose="02040503050406030204" pitchFamily="18" charset="0"/>
+                            </a:rPr>
+                          </m:ctrlPr>
+                        </m:sSupPr>
+                        <m:e>
+                          <m:r>
+                            <a:rPr lang="ar-AE" sz="2800" i="1">
+                              <a:solidFill>
+                                <a:srgbClr val="000000"/>
+                              </a:solidFill>
+                              <a:latin typeface="Cambria Math" panose="02040503050406030204" pitchFamily="18" charset="0"/>
+                            </a:rPr>
+                            <m:t>𝛿</m:t>
+                          </m:r>
+                        </m:e>
+                        <m:sup>
+                          <m:r>
+                            <a:rPr lang="ar-AE" sz="2800" i="1">
+                              <a:solidFill>
+                                <a:srgbClr val="000000"/>
+                              </a:solidFill>
+                              <a:latin typeface="Cambria Math" panose="02040503050406030204" pitchFamily="18" charset="0"/>
+                            </a:rPr>
+                            <m:t>(</m:t>
+                          </m:r>
+                          <m:r>
+                            <a:rPr lang="ar-AE" sz="2800" b="0" i="1" smtClean="0">
+                              <a:solidFill>
+                                <a:srgbClr val="000000"/>
+                              </a:solidFill>
+                              <a:latin typeface="Cambria Math" panose="02040503050406030204" pitchFamily="18" charset="0"/>
+                            </a:rPr>
+                            <m:t>1</m:t>
+                          </m:r>
+                          <m:r>
+                            <a:rPr lang="ar-AE" sz="2800" i="1">
+                              <a:solidFill>
+                                <a:srgbClr val="000000"/>
+                              </a:solidFill>
+                              <a:latin typeface="Cambria Math" panose="02040503050406030204" pitchFamily="18" charset="0"/>
+                            </a:rPr>
+                            <m:t>)</m:t>
+                          </m:r>
+                        </m:sup>
+                      </m:sSup>
+                      <m:r>
+                        <a:rPr lang="ar-AE" sz="2800" i="1">
+                          <a:solidFill>
+                            <a:srgbClr val="000000"/>
+                          </a:solidFill>
+                          <a:latin typeface="Cambria Math" panose="02040503050406030204" pitchFamily="18" charset="0"/>
+                        </a:rPr>
+                        <m:t>=(</m:t>
+                      </m:r>
+                      <m:sSup>
+                        <m:sSupPr>
+                          <m:ctrlPr>
+                            <a:rPr lang="ar-AE" sz="2800" i="1">
+                              <a:solidFill>
+                                <a:srgbClr val="000000"/>
+                              </a:solidFill>
+                              <a:latin typeface="Cambria Math" panose="02040503050406030204" pitchFamily="18" charset="0"/>
+                            </a:rPr>
+                          </m:ctrlPr>
+                        </m:sSupPr>
+                        <m:e>
+                          <m:r>
+                            <m:rPr>
+                              <m:sty m:val="p"/>
+                            </m:rPr>
+                            <a:rPr lang="el-GR" sz="2800" i="1">
+                              <a:solidFill>
+                                <a:srgbClr val="000000"/>
+                              </a:solidFill>
+                              <a:latin typeface="Cambria Math" panose="02040503050406030204" pitchFamily="18" charset="0"/>
+                            </a:rPr>
+                            <m:t>Θ</m:t>
+                          </m:r>
+                        </m:e>
+                        <m:sup>
+                          <m:r>
+                            <a:rPr lang="ar-AE" sz="2800" i="1">
+                              <a:solidFill>
+                                <a:srgbClr val="000000"/>
+                              </a:solidFill>
+                              <a:latin typeface="Cambria Math" panose="02040503050406030204" pitchFamily="18" charset="0"/>
+                            </a:rPr>
+                            <m:t>(</m:t>
+                          </m:r>
+                          <m:r>
+                            <a:rPr lang="nl-NL" sz="2800" b="0" i="1" smtClean="0">
+                              <a:solidFill>
+                                <a:srgbClr val="000000"/>
+                              </a:solidFill>
+                              <a:latin typeface="Cambria Math" panose="02040503050406030204" pitchFamily="18" charset="0"/>
+                            </a:rPr>
+                            <m:t>1</m:t>
+                          </m:r>
+                          <m:r>
+                            <a:rPr lang="ar-AE" sz="2800" i="1">
+                              <a:solidFill>
+                                <a:srgbClr val="000000"/>
+                              </a:solidFill>
+                              <a:latin typeface="Cambria Math" panose="02040503050406030204" pitchFamily="18" charset="0"/>
+                            </a:rPr>
+                            <m:t>)</m:t>
+                          </m:r>
+                        </m:sup>
+                      </m:sSup>
+                      <m:sSup>
+                        <m:sSupPr>
+                          <m:ctrlPr>
+                            <a:rPr lang="ar-AE" sz="2800" i="1">
+                              <a:solidFill>
+                                <a:srgbClr val="000000"/>
+                              </a:solidFill>
+                              <a:latin typeface="Cambria Math" panose="02040503050406030204" pitchFamily="18" charset="0"/>
+                            </a:rPr>
+                          </m:ctrlPr>
+                        </m:sSupPr>
+                        <m:e>
+                          <m:r>
+                            <a:rPr lang="ar-AE" sz="2800" i="1">
+                              <a:solidFill>
+                                <a:srgbClr val="000000"/>
+                              </a:solidFill>
+                              <a:latin typeface="Cambria Math" panose="02040503050406030204" pitchFamily="18" charset="0"/>
+                            </a:rPr>
+                            <m:t>)</m:t>
+                          </m:r>
+                        </m:e>
+                        <m:sup>
+                          <m:r>
+                            <a:rPr lang="ar-AE" sz="2800" i="1">
+                              <a:solidFill>
+                                <a:srgbClr val="000000"/>
+                              </a:solidFill>
+                              <a:latin typeface="Cambria Math" panose="02040503050406030204" pitchFamily="18" charset="0"/>
+                            </a:rPr>
+                            <m:t>𝑇</m:t>
+                          </m:r>
+                        </m:sup>
+                      </m:sSup>
+                      <m:sSup>
+                        <m:sSupPr>
+                          <m:ctrlPr>
+                            <a:rPr lang="ar-AE" sz="2800" i="1">
+                              <a:solidFill>
+                                <a:srgbClr val="000000"/>
+                              </a:solidFill>
+                              <a:latin typeface="Cambria Math" panose="02040503050406030204" pitchFamily="18" charset="0"/>
+                            </a:rPr>
+                          </m:ctrlPr>
+                        </m:sSupPr>
+                        <m:e>
+                          <m:r>
+                            <a:rPr lang="ar-AE" sz="2800" i="1">
+                              <a:solidFill>
+                                <a:srgbClr val="000000"/>
+                              </a:solidFill>
+                              <a:latin typeface="Cambria Math" panose="02040503050406030204" pitchFamily="18" charset="0"/>
+                            </a:rPr>
+                            <m:t>𝛿</m:t>
+                          </m:r>
+                        </m:e>
+                        <m:sup>
+                          <m:r>
+                            <a:rPr lang="ar-AE" sz="2800" i="1">
+                              <a:solidFill>
+                                <a:srgbClr val="000000"/>
+                              </a:solidFill>
+                              <a:latin typeface="Cambria Math" panose="02040503050406030204" pitchFamily="18" charset="0"/>
+                            </a:rPr>
+                            <m:t>(</m:t>
+                          </m:r>
+                          <m:r>
+                            <a:rPr lang="nl-NL" sz="2800" b="0" i="1" smtClean="0">
+                              <a:solidFill>
+                                <a:srgbClr val="000000"/>
+                              </a:solidFill>
+                              <a:latin typeface="Cambria Math" panose="02040503050406030204" pitchFamily="18" charset="0"/>
+                            </a:rPr>
+                            <m:t>2</m:t>
+                          </m:r>
+                          <m:r>
+                            <a:rPr lang="ar-AE" sz="2800" i="1">
+                              <a:solidFill>
+                                <a:srgbClr val="000000"/>
+                              </a:solidFill>
+                              <a:latin typeface="Cambria Math" panose="02040503050406030204" pitchFamily="18" charset="0"/>
+                            </a:rPr>
+                            <m:t>)</m:t>
+                          </m:r>
+                        </m:sup>
+                      </m:sSup>
+                      <m:r>
+                        <a:rPr lang="ar-AE" sz="2800" i="1">
+                          <a:solidFill>
+                            <a:srgbClr val="000000"/>
+                          </a:solidFill>
+                          <a:latin typeface="Cambria Math" panose="02040503050406030204" pitchFamily="18" charset="0"/>
+                        </a:rPr>
+                        <m:t>×</m:t>
+                      </m:r>
+                      <m:sSup>
+                        <m:sSupPr>
+                          <m:ctrlPr>
+                            <a:rPr lang="ar-AE" sz="2800" i="1">
+                              <a:solidFill>
+                                <a:srgbClr val="000000"/>
+                              </a:solidFill>
+                              <a:latin typeface="Cambria Math" panose="02040503050406030204" pitchFamily="18" charset="0"/>
+                            </a:rPr>
+                          </m:ctrlPr>
+                        </m:sSupPr>
+                        <m:e>
+                          <m:r>
+                            <a:rPr lang="ar-AE" sz="2800" i="1">
+                              <a:solidFill>
+                                <a:srgbClr val="000000"/>
+                              </a:solidFill>
+                              <a:latin typeface="Cambria Math" panose="02040503050406030204" pitchFamily="18" charset="0"/>
+                            </a:rPr>
+                            <m:t>𝑔</m:t>
+                          </m:r>
+                        </m:e>
+                        <m:sup>
+                          <m:r>
+                            <a:rPr lang="ar-AE" sz="2800" i="1">
+                              <a:solidFill>
+                                <a:srgbClr val="000000"/>
+                              </a:solidFill>
+                              <a:latin typeface="Cambria Math" panose="02040503050406030204" pitchFamily="18" charset="0"/>
+                            </a:rPr>
+                            <m:t>′</m:t>
+                          </m:r>
+                        </m:sup>
+                      </m:sSup>
+                      <m:r>
+                        <a:rPr lang="ar-AE" sz="2800" i="1">
+                          <a:solidFill>
+                            <a:srgbClr val="000000"/>
+                          </a:solidFill>
+                          <a:latin typeface="Cambria Math" panose="02040503050406030204" pitchFamily="18" charset="0"/>
+                        </a:rPr>
+                        <m:t>(</m:t>
+                      </m:r>
+                      <m:sSup>
+                        <m:sSupPr>
+                          <m:ctrlPr>
+                            <a:rPr lang="ar-AE" sz="2800" i="1">
+                              <a:solidFill>
+                                <a:srgbClr val="000000"/>
+                              </a:solidFill>
+                              <a:latin typeface="Cambria Math" panose="02040503050406030204" pitchFamily="18" charset="0"/>
+                            </a:rPr>
+                          </m:ctrlPr>
+                        </m:sSupPr>
+                        <m:e>
+                          <m:r>
+                            <a:rPr lang="ar-AE" sz="2800" i="1">
+                              <a:solidFill>
+                                <a:srgbClr val="000000"/>
+                              </a:solidFill>
+                              <a:latin typeface="Cambria Math" panose="02040503050406030204" pitchFamily="18" charset="0"/>
+                            </a:rPr>
+                            <m:t>𝑧</m:t>
+                          </m:r>
+                        </m:e>
+                        <m:sup>
+                          <m:r>
+                            <a:rPr lang="ar-AE" sz="2800" i="1">
+                              <a:solidFill>
+                                <a:srgbClr val="000000"/>
+                              </a:solidFill>
+                              <a:latin typeface="Cambria Math" panose="02040503050406030204" pitchFamily="18" charset="0"/>
+                            </a:rPr>
+                            <m:t>(</m:t>
+                          </m:r>
+                          <m:r>
+                            <a:rPr lang="nl-NL" sz="2800" b="0" i="1" smtClean="0">
+                              <a:solidFill>
+                                <a:srgbClr val="000000"/>
+                              </a:solidFill>
+                              <a:latin typeface="Cambria Math" panose="02040503050406030204" pitchFamily="18" charset="0"/>
+                            </a:rPr>
+                            <m:t>1</m:t>
+                          </m:r>
+                          <m:r>
+                            <a:rPr lang="ar-AE" sz="2800" i="1">
+                              <a:solidFill>
+                                <a:srgbClr val="000000"/>
+                              </a:solidFill>
+                              <a:latin typeface="Cambria Math" panose="02040503050406030204" pitchFamily="18" charset="0"/>
+                            </a:rPr>
+                            <m:t>)</m:t>
+                          </m:r>
+                        </m:sup>
+                      </m:sSup>
+                      <m:r>
+                        <a:rPr lang="ar-AE" sz="2800" i="1">
+                          <a:solidFill>
+                            <a:srgbClr val="000000"/>
+                          </a:solidFill>
+                          <a:latin typeface="Cambria Math" panose="02040503050406030204" pitchFamily="18" charset="0"/>
+                        </a:rPr>
+                        <m:t>)</m:t>
+                      </m:r>
+                    </m:oMath>
+                  </m:oMathPara>
+                </a14:m>
+                <a:endParaRPr sz="2800"/>
+              </a:p>
+            </p:txBody>
+          </p:sp>
+        </mc:Choice>
+        <mc:Fallback>
+          <p:sp>
+            <p:nvSpPr>
+              <p:cNvPr id="3" name="Vergelijking">
+                <a:extLst>
+                  <a:ext uri="{FF2B5EF4-FFF2-40B4-BE49-F238E27FC236}">
+                    <a16:creationId xmlns:a16="http://schemas.microsoft.com/office/drawing/2014/main" id="{9570EF65-D85D-F49A-E56B-3C4816D7A131}"/>
+                  </a:ext>
+                </a:extLst>
+              </p:cNvPr>
+              <p:cNvSpPr txBox="1">
+                <a:spLocks noRot="1" noChangeAspect="1" noMove="1" noResize="1" noEditPoints="1" noAdjustHandles="1" noChangeArrowheads="1" noChangeShapeType="1" noTextEdit="1"/>
+              </p:cNvSpPr>
+              <p:nvPr/>
+            </p:nvSpPr>
+            <p:spPr>
+              <a:xfrm rot="19800000">
+                <a:off x="2423905" y="1086178"/>
+                <a:ext cx="4483087" cy="448777"/>
+              </a:xfrm>
+              <a:prstGeom prst="rect">
+                <a:avLst/>
+              </a:prstGeom>
+              <a:blipFill>
+                <a:blip r:embed="rId12"/>
+                <a:stretch>
+                  <a:fillRect/>
+                </a:stretch>
+              </a:blipFill>
+              <a:ln w="12700">
+                <a:miter lim="400000"/>
+              </a:ln>
+            </p:spPr>
+            <p:txBody>
+              <a:bodyPr/>
+              <a:lstStyle/>
+              <a:p>
+                <a:r>
+                  <a:rPr lang="nl-NL">
+                    <a:noFill/>
+                  </a:rPr>
+                  <a:t> </a:t>
+                </a:r>
+              </a:p>
+            </p:txBody>
+          </p:sp>
+        </mc:Fallback>
+      </mc:AlternateContent>
+      <mc:AlternateContent xmlns:mc="http://schemas.openxmlformats.org/markup-compatibility/2006">
+        <mc:Choice xmlns:a14="http://schemas.microsoft.com/office/drawing/2010/main" Requires="a14">
+          <p:sp>
+            <p:nvSpPr>
+              <p:cNvPr id="5" name="Vergelijking">
+                <a:extLst>
+                  <a:ext uri="{FF2B5EF4-FFF2-40B4-BE49-F238E27FC236}">
+                    <a16:creationId xmlns:a16="http://schemas.microsoft.com/office/drawing/2014/main" id="{AB0F6BAC-793B-8F0C-FACD-F74E83C43E29}"/>
+                  </a:ext>
+                </a:extLst>
+              </p:cNvPr>
+              <p:cNvSpPr txBox="1"/>
+              <p:nvPr/>
+            </p:nvSpPr>
+            <p:spPr>
+              <a:xfrm>
+                <a:off x="3129939" y="7414477"/>
+                <a:ext cx="1186094" cy="769441"/>
+              </a:xfrm>
+              <a:prstGeom prst="rect">
+                <a:avLst/>
+              </a:prstGeom>
+              <a:ln w="12700">
+                <a:miter lim="400000"/>
+              </a:ln>
+            </p:spPr>
+            <p:txBody>
+              <a:bodyPr wrap="none" lIns="0" tIns="0" rIns="0" bIns="0">
+                <a:spAutoFit/>
+              </a:bodyPr>
+              <a:lstStyle/>
+              <a:p>
+                <a:pPr algn="l" defTabSz="914400" latinLnBrk="1">
+                  <a:defRPr sz="1800"/>
+                </a:pPr>
+                <a14:m>
+                  <m:oMathPara xmlns:m="http://schemas.openxmlformats.org/officeDocument/2006/math">
+                    <m:oMathParaPr>
+                      <m:jc m:val="centerGroup"/>
+                    </m:oMathParaPr>
+                    <m:oMath xmlns:m="http://schemas.openxmlformats.org/officeDocument/2006/math">
+                      <m:sSup>
+                        <m:sSupPr>
+                          <m:ctrlPr>
+                            <a:rPr lang="ar-AE" sz="4800" i="1" smtClean="0">
+                              <a:solidFill>
+                                <a:srgbClr val="3B1E4D"/>
+                              </a:solidFill>
+                              <a:latin typeface="Cambria Math" panose="02040503050406030204" pitchFamily="18" charset="0"/>
+                            </a:rPr>
+                          </m:ctrlPr>
+                        </m:sSupPr>
+                        <m:e>
+                          <m:r>
+                            <m:rPr>
+                              <m:sty m:val="p"/>
+                            </m:rPr>
+                            <a:rPr lang="el-GR" sz="4800" i="1">
+                              <a:solidFill>
+                                <a:srgbClr val="3B1E4D"/>
+                              </a:solidFill>
+                              <a:latin typeface="Cambria Math" panose="02040503050406030204" pitchFamily="18" charset="0"/>
+                            </a:rPr>
+                            <m:t>Δ</m:t>
+                          </m:r>
+                        </m:e>
+                        <m:sup>
+                          <m:r>
+                            <a:rPr lang="ar-AE" sz="4800" i="1">
+                              <a:solidFill>
+                                <a:srgbClr val="3B1E4D"/>
+                              </a:solidFill>
+                              <a:latin typeface="Cambria Math" panose="02040503050406030204" pitchFamily="18" charset="0"/>
+                            </a:rPr>
+                            <m:t>(</m:t>
+                          </m:r>
+                          <m:r>
+                            <a:rPr lang="ar-AE" sz="4800" b="0" i="1" smtClean="0">
+                              <a:solidFill>
+                                <a:srgbClr val="3B1E4D"/>
+                              </a:solidFill>
+                              <a:latin typeface="Cambria Math" panose="02040503050406030204" pitchFamily="18" charset="0"/>
+                            </a:rPr>
+                            <m:t>1</m:t>
+                          </m:r>
+                          <m:r>
+                            <a:rPr lang="ar-AE" sz="4800" i="1">
+                              <a:solidFill>
+                                <a:srgbClr val="3B1E4D"/>
+                              </a:solidFill>
+                              <a:latin typeface="Cambria Math" panose="02040503050406030204" pitchFamily="18" charset="0"/>
+                            </a:rPr>
+                            <m:t>)</m:t>
+                          </m:r>
+                        </m:sup>
+                      </m:sSup>
+                    </m:oMath>
+                  </m:oMathPara>
+                </a14:m>
+                <a:endParaRPr sz="4800">
+                  <a:solidFill>
+                    <a:srgbClr val="3B1F4E"/>
+                  </a:solidFill>
+                </a:endParaRPr>
+              </a:p>
+            </p:txBody>
+          </p:sp>
+        </mc:Choice>
+        <mc:Fallback>
+          <p:sp>
+            <p:nvSpPr>
+              <p:cNvPr id="5" name="Vergelijking">
+                <a:extLst>
+                  <a:ext uri="{FF2B5EF4-FFF2-40B4-BE49-F238E27FC236}">
+                    <a16:creationId xmlns:a16="http://schemas.microsoft.com/office/drawing/2014/main" id="{AB0F6BAC-793B-8F0C-FACD-F74E83C43E29}"/>
+                  </a:ext>
+                </a:extLst>
+              </p:cNvPr>
+              <p:cNvSpPr txBox="1">
+                <a:spLocks noRot="1" noChangeAspect="1" noMove="1" noResize="1" noEditPoints="1" noAdjustHandles="1" noChangeArrowheads="1" noChangeShapeType="1" noTextEdit="1"/>
+              </p:cNvSpPr>
+              <p:nvPr/>
+            </p:nvSpPr>
+            <p:spPr>
+              <a:xfrm>
+                <a:off x="3129939" y="7414477"/>
+                <a:ext cx="1186094" cy="769441"/>
+              </a:xfrm>
+              <a:prstGeom prst="rect">
+                <a:avLst/>
+              </a:prstGeom>
+              <a:blipFill>
+                <a:blip r:embed="rId13"/>
+                <a:stretch>
+                  <a:fillRect/>
+                </a:stretch>
+              </a:blipFill>
+              <a:ln w="12700">
+                <a:miter lim="400000"/>
+              </a:ln>
+            </p:spPr>
+            <p:txBody>
+              <a:bodyPr/>
+              <a:lstStyle/>
+              <a:p>
+                <a:r>
+                  <a:rPr lang="nl-NL">
+                    <a:noFill/>
+                  </a:rPr>
+                  <a:t> </a:t>
+                </a:r>
+              </a:p>
+            </p:txBody>
+          </p:sp>
+        </mc:Fallback>
+      </mc:AlternateContent>
+      <p:pic>
+        <p:nvPicPr>
+          <p:cNvPr id="20" name="Afbeelding 19">
+            <a:extLst>
+              <a:ext uri="{FF2B5EF4-FFF2-40B4-BE49-F238E27FC236}">
+                <a16:creationId xmlns:a16="http://schemas.microsoft.com/office/drawing/2014/main" id="{832F3953-4573-A5B1-CC15-EBF261B11EAB}"/>
+              </a:ext>
+            </a:extLst>
+          </p:cNvPr>
+          <p:cNvPicPr>
+            <a:picLocks noChangeAspect="1"/>
+          </p:cNvPicPr>
+          <p:nvPr/>
+        </p:nvPicPr>
+        <p:blipFill>
+          <a:blip r:embed="rId14"/>
+          <a:stretch>
+            <a:fillRect/>
+          </a:stretch>
+        </p:blipFill>
+        <p:spPr>
+          <a:xfrm>
+            <a:off x="2750475" y="6798485"/>
+            <a:ext cx="1816233" cy="535556"/>
+          </a:xfrm>
+          <a:prstGeom prst="rect">
+            <a:avLst/>
+          </a:prstGeom>
+        </p:spPr>
+      </p:pic>
     </p:spTree>
   </p:cSld>
   <p:clrMapOvr>
@@ -35110,8 +36954,8 @@
           </a:p>
         </p:txBody>
       </p:sp>
-      <mc:AlternateContent xmlns:mc="http://schemas.openxmlformats.org/markup-compatibility/2006">
-        <mc:Choice xmlns:a14="http://schemas.microsoft.com/office/drawing/2010/main" Requires="a14">
+      <mc:AlternateContent xmlns:mc="http://schemas.openxmlformats.org/markup-compatibility/2006" xmlns:a14="http://schemas.microsoft.com/office/drawing/2010/main">
+        <mc:Choice Requires="a14">
           <p:sp>
             <p:nvSpPr>
               <p:cNvPr id="9" name="Tekstvak 8">
@@ -35158,6 +37002,7 @@
               </a:bodyPr>
               <a:lstStyle/>
               <a:p>
+                <a:pPr/>
                 <a14:m>
                   <m:oMathPara xmlns:m="http://schemas.openxmlformats.org/officeDocument/2006/math">
                     <m:oMathParaPr>
@@ -35402,7 +37247,21 @@
                               <a:latin typeface="Cambria Math" panose="02040503050406030204" pitchFamily="18" charset="0"/>
                               <a:ea typeface="Cambria Math" panose="02040503050406030204" pitchFamily="18" charset="0"/>
                             </a:rPr>
-                            <m:t>−1)</m:t>
+                            <m:t>−</m:t>
+                          </m:r>
+                          <m:r>
+                            <a:rPr lang="nl-NL" b="0" i="1" smtClean="0">
+                              <a:latin typeface="Cambria Math" panose="02040503050406030204" pitchFamily="18" charset="0"/>
+                              <a:ea typeface="Cambria Math" panose="02040503050406030204" pitchFamily="18" charset="0"/>
+                            </a:rPr>
+                            <m:t>1</m:t>
+                          </m:r>
+                          <m:r>
+                            <a:rPr lang="nl-NL" b="0" i="1" smtClean="0">
+                              <a:latin typeface="Cambria Math" panose="02040503050406030204" pitchFamily="18" charset="0"/>
+                              <a:ea typeface="Cambria Math" panose="02040503050406030204" pitchFamily="18" charset="0"/>
+                            </a:rPr>
+                            <m:t>)</m:t>
                           </m:r>
                         </m:sup>
                       </m:sSubSup>
@@ -35478,7 +37337,7 @@
             </p:txBody>
           </p:sp>
         </mc:Choice>
-        <mc:Fallback>
+        <mc:Fallback xmlns="">
           <p:sp>
             <p:nvSpPr>
               <p:cNvPr id="9" name="Tekstvak 8">
@@ -35573,7 +37432,7 @@
           </a:ln>
           <a:extLst>
             <a:ext uri="{C572A759-6A51-4108-AA02-DFA0A04FC94B}">
-              <ma14:wrappingTextBoxFlag xmlns="" xmlns:m="http://schemas.openxmlformats.org/officeDocument/2006/math" xmlns:a14="http://schemas.microsoft.com/office/drawing/2010/main" xmlns:ma14="http://schemas.microsoft.com/office/mac/drawingml/2011/main" val="1"/>
+              <ma14:wrappingTextBoxFlag xmlns:ma14="http://schemas.microsoft.com/office/mac/drawingml/2011/main" xmlns:a14="http://schemas.microsoft.com/office/drawing/2010/main" xmlns:m="http://schemas.openxmlformats.org/officeDocument/2006/math" xmlns="" val="1"/>
             </a:ext>
           </a:extLst>
         </p:spPr>
@@ -35771,7 +37630,7 @@
             <a:effectLst/>
             <a:extLst>
               <a:ext uri="{C572A759-6A51-4108-AA02-DFA0A04FC94B}">
-                <ma14:wrappingTextBoxFlag xmlns="" xmlns:m="http://schemas.openxmlformats.org/officeDocument/2006/math" xmlns:a14="http://schemas.microsoft.com/office/drawing/2010/main" xmlns:ma14="http://schemas.microsoft.com/office/mac/drawingml/2011/main" val="1"/>
+                <ma14:wrappingTextBoxFlag xmlns:ma14="http://schemas.microsoft.com/office/mac/drawingml/2011/main" xmlns:a14="http://schemas.microsoft.com/office/drawing/2010/main" xmlns:m="http://schemas.openxmlformats.org/officeDocument/2006/math" xmlns="" val="1"/>
               </a:ext>
             </a:extLst>
           </p:spPr>
@@ -36058,7 +37917,7 @@
           <a:effectLst/>
           <a:extLst>
             <a:ext uri="{C572A759-6A51-4108-AA02-DFA0A04FC94B}">
-              <ma14:wrappingTextBoxFlag xmlns="" xmlns:m="http://schemas.openxmlformats.org/officeDocument/2006/math" xmlns:a14="http://schemas.microsoft.com/office/drawing/2010/main" xmlns:ma14="http://schemas.microsoft.com/office/mac/drawingml/2011/main" val="1"/>
+              <ma14:wrappingTextBoxFlag xmlns:ma14="http://schemas.microsoft.com/office/mac/drawingml/2011/main" xmlns:a14="http://schemas.microsoft.com/office/drawing/2010/main" xmlns:m="http://schemas.openxmlformats.org/officeDocument/2006/math" xmlns="" val="1"/>
             </a:ext>
           </a:extLst>
         </p:spPr>
@@ -36105,7 +37964,7 @@
           </a:ln>
           <a:extLst>
             <a:ext uri="{C572A759-6A51-4108-AA02-DFA0A04FC94B}">
-              <ma14:wrappingTextBoxFlag xmlns="" xmlns:m="http://schemas.openxmlformats.org/officeDocument/2006/math" xmlns:a14="http://schemas.microsoft.com/office/drawing/2010/main" xmlns:ma14="http://schemas.microsoft.com/office/mac/drawingml/2011/main" val="1"/>
+              <ma14:wrappingTextBoxFlag xmlns:ma14="http://schemas.microsoft.com/office/mac/drawingml/2011/main" xmlns:a14="http://schemas.microsoft.com/office/drawing/2010/main" xmlns:m="http://schemas.openxmlformats.org/officeDocument/2006/math" xmlns="" val="1"/>
             </a:ext>
           </a:extLst>
         </p:spPr>
@@ -36941,7 +38800,7 @@
                 <a:effectLst/>
                 <a:extLst>
                   <a:ext uri="{C572A759-6A51-4108-AA02-DFA0A04FC94B}">
-                    <ma14:wrappingTextBoxFlag xmlns="" xmlns:m="http://schemas.openxmlformats.org/officeDocument/2006/math" xmlns:ma14="http://schemas.microsoft.com/office/mac/drawingml/2011/main" val="1"/>
+                    <ma14:wrappingTextBoxFlag xmlns:ma14="http://schemas.microsoft.com/office/mac/drawingml/2011/main" xmlns:m="http://schemas.openxmlformats.org/officeDocument/2006/math" xmlns="" val="1"/>
                   </a:ext>
                 </a:extLst>
               </p:spPr>
@@ -38609,7 +40468,7 @@
             <a:effectLst/>
             <a:extLst>
               <a:ext uri="{C572A759-6A51-4108-AA02-DFA0A04FC94B}">
-                <ma14:wrappingTextBoxFlag xmlns="" xmlns:m="http://schemas.openxmlformats.org/officeDocument/2006/math" xmlns:a14="http://schemas.microsoft.com/office/drawing/2010/main" xmlns:ma14="http://schemas.microsoft.com/office/mac/drawingml/2011/main" val="1"/>
+                <ma14:wrappingTextBoxFlag xmlns:ma14="http://schemas.microsoft.com/office/mac/drawingml/2011/main" xmlns:a14="http://schemas.microsoft.com/office/drawing/2010/main" xmlns:m="http://schemas.openxmlformats.org/officeDocument/2006/math" xmlns="" val="1"/>
               </a:ext>
             </a:extLst>
           </p:spPr>
@@ -38656,7 +40515,7 @@
             <a:effectLst/>
             <a:extLst>
               <a:ext uri="{C572A759-6A51-4108-AA02-DFA0A04FC94B}">
-                <ma14:wrappingTextBoxFlag xmlns="" xmlns:m="http://schemas.openxmlformats.org/officeDocument/2006/math" xmlns:a14="http://schemas.microsoft.com/office/drawing/2010/main" xmlns:ma14="http://schemas.microsoft.com/office/mac/drawingml/2011/main" val="1"/>
+                <ma14:wrappingTextBoxFlag xmlns:ma14="http://schemas.microsoft.com/office/mac/drawingml/2011/main" xmlns:a14="http://schemas.microsoft.com/office/drawing/2010/main" xmlns:m="http://schemas.openxmlformats.org/officeDocument/2006/math" xmlns="" val="1"/>
               </a:ext>
             </a:extLst>
           </p:spPr>
@@ -38912,7 +40771,25 @@
                                 </a:solidFill>
                                 <a:latin typeface="Cambria Math" panose="02040503050406030204" pitchFamily="18" charset="0"/>
                               </a:rPr>
-                              <m:t>(1)</m:t>
+                              <m:t>(</m:t>
+                            </m:r>
+                            <m:r>
+                              <a:rPr sz="3600" i="1">
+                                <a:solidFill>
+                                  <a:srgbClr val="000000"/>
+                                </a:solidFill>
+                                <a:latin typeface="Cambria Math" panose="02040503050406030204" pitchFamily="18" charset="0"/>
+                              </a:rPr>
+                              <m:t>1</m:t>
+                            </m:r>
+                            <m:r>
+                              <a:rPr sz="3600" i="1">
+                                <a:solidFill>
+                                  <a:srgbClr val="000000"/>
+                                </a:solidFill>
+                                <a:latin typeface="Cambria Math" panose="02040503050406030204" pitchFamily="18" charset="0"/>
+                              </a:rPr>
+                              <m:t>)</m:t>
                             </m:r>
                           </m:sup>
                         </m:sSubSup>
@@ -39047,7 +40924,25 @@
                                 </a:solidFill>
                                 <a:latin typeface="Cambria Math" panose="02040503050406030204" pitchFamily="18" charset="0"/>
                               </a:rPr>
-                              <m:t>(1)</m:t>
+                              <m:t>(</m:t>
+                            </m:r>
+                            <m:r>
+                              <a:rPr sz="3600" i="1">
+                                <a:solidFill>
+                                  <a:srgbClr val="000000"/>
+                                </a:solidFill>
+                                <a:latin typeface="Cambria Math" panose="02040503050406030204" pitchFamily="18" charset="0"/>
+                              </a:rPr>
+                              <m:t>1</m:t>
+                            </m:r>
+                            <m:r>
+                              <a:rPr sz="3600" i="1">
+                                <a:solidFill>
+                                  <a:srgbClr val="000000"/>
+                                </a:solidFill>
+                                <a:latin typeface="Cambria Math" panose="02040503050406030204" pitchFamily="18" charset="0"/>
+                              </a:rPr>
+                              <m:t>)</m:t>
                             </m:r>
                           </m:sup>
                         </m:sSubSup>
@@ -39182,7 +41077,25 @@
                                 </a:solidFill>
                                 <a:latin typeface="Cambria Math" panose="02040503050406030204" pitchFamily="18" charset="0"/>
                               </a:rPr>
-                              <m:t>(2)</m:t>
+                              <m:t>(</m:t>
+                            </m:r>
+                            <m:r>
+                              <a:rPr sz="3600" i="1">
+                                <a:solidFill>
+                                  <a:srgbClr val="000000"/>
+                                </a:solidFill>
+                                <a:latin typeface="Cambria Math" panose="02040503050406030204" pitchFamily="18" charset="0"/>
+                              </a:rPr>
+                              <m:t>2</m:t>
+                            </m:r>
+                            <m:r>
+                              <a:rPr sz="3600" i="1">
+                                <a:solidFill>
+                                  <a:srgbClr val="000000"/>
+                                </a:solidFill>
+                                <a:latin typeface="Cambria Math" panose="02040503050406030204" pitchFamily="18" charset="0"/>
+                              </a:rPr>
+                              <m:t>)</m:t>
                             </m:r>
                           </m:sup>
                         </m:sSubSup>
@@ -39317,7 +41230,25 @@
                                 </a:solidFill>
                                 <a:latin typeface="Cambria Math" panose="02040503050406030204" pitchFamily="18" charset="0"/>
                               </a:rPr>
-                              <m:t>(2)</m:t>
+                              <m:t>(</m:t>
+                            </m:r>
+                            <m:r>
+                              <a:rPr sz="3600" i="1">
+                                <a:solidFill>
+                                  <a:srgbClr val="000000"/>
+                                </a:solidFill>
+                                <a:latin typeface="Cambria Math" panose="02040503050406030204" pitchFamily="18" charset="0"/>
+                              </a:rPr>
+                              <m:t>2</m:t>
+                            </m:r>
+                            <m:r>
+                              <a:rPr sz="3600" i="1">
+                                <a:solidFill>
+                                  <a:srgbClr val="000000"/>
+                                </a:solidFill>
+                                <a:latin typeface="Cambria Math" panose="02040503050406030204" pitchFamily="18" charset="0"/>
+                              </a:rPr>
+                              <m:t>)</m:t>
                             </m:r>
                           </m:sup>
                         </m:sSubSup>
@@ -39455,7 +41386,25 @@
                                 </a:solidFill>
                                 <a:latin typeface="Cambria Math" panose="02040503050406030204" pitchFamily="18" charset="0"/>
                               </a:rPr>
-                              <m:t>(1)</m:t>
+                              <m:t>(</m:t>
+                            </m:r>
+                            <m:r>
+                              <a:rPr sz="3600" i="1">
+                                <a:solidFill>
+                                  <a:srgbClr val="000000"/>
+                                </a:solidFill>
+                                <a:latin typeface="Cambria Math" panose="02040503050406030204" pitchFamily="18" charset="0"/>
+                              </a:rPr>
+                              <m:t>1</m:t>
+                            </m:r>
+                            <m:r>
+                              <a:rPr sz="3600" i="1">
+                                <a:solidFill>
+                                  <a:srgbClr val="000000"/>
+                                </a:solidFill>
+                                <a:latin typeface="Cambria Math" panose="02040503050406030204" pitchFamily="18" charset="0"/>
+                              </a:rPr>
+                              <m:t>)</m:t>
                             </m:r>
                           </m:sup>
                         </m:sSubSup>
@@ -39593,7 +41542,25 @@
                                 </a:solidFill>
                                 <a:latin typeface="Cambria Math" panose="02040503050406030204" pitchFamily="18" charset="0"/>
                               </a:rPr>
-                              <m:t>(1)</m:t>
+                              <m:t>(</m:t>
+                            </m:r>
+                            <m:r>
+                              <a:rPr sz="3600" i="1">
+                                <a:solidFill>
+                                  <a:srgbClr val="000000"/>
+                                </a:solidFill>
+                                <a:latin typeface="Cambria Math" panose="02040503050406030204" pitchFamily="18" charset="0"/>
+                              </a:rPr>
+                              <m:t>1</m:t>
+                            </m:r>
+                            <m:r>
+                              <a:rPr sz="3600" i="1">
+                                <a:solidFill>
+                                  <a:srgbClr val="000000"/>
+                                </a:solidFill>
+                                <a:latin typeface="Cambria Math" panose="02040503050406030204" pitchFamily="18" charset="0"/>
+                              </a:rPr>
+                              <m:t>)</m:t>
                             </m:r>
                           </m:sup>
                         </m:sSubSup>
@@ -39731,7 +41698,25 @@
                                 </a:solidFill>
                                 <a:latin typeface="Cambria Math" panose="02040503050406030204" pitchFamily="18" charset="0"/>
                               </a:rPr>
-                              <m:t>(1)</m:t>
+                              <m:t>(</m:t>
+                            </m:r>
+                            <m:r>
+                              <a:rPr sz="3600" i="1">
+                                <a:solidFill>
+                                  <a:srgbClr val="000000"/>
+                                </a:solidFill>
+                                <a:latin typeface="Cambria Math" panose="02040503050406030204" pitchFamily="18" charset="0"/>
+                              </a:rPr>
+                              <m:t>1</m:t>
+                            </m:r>
+                            <m:r>
+                              <a:rPr sz="3600" i="1">
+                                <a:solidFill>
+                                  <a:srgbClr val="000000"/>
+                                </a:solidFill>
+                                <a:latin typeface="Cambria Math" panose="02040503050406030204" pitchFamily="18" charset="0"/>
+                              </a:rPr>
+                              <m:t>)</m:t>
                             </m:r>
                           </m:sup>
                         </m:sSubSup>
@@ -39869,7 +41854,25 @@
                                 </a:solidFill>
                                 <a:latin typeface="Cambria Math" panose="02040503050406030204" pitchFamily="18" charset="0"/>
                               </a:rPr>
-                              <m:t>(1)</m:t>
+                              <m:t>(</m:t>
+                            </m:r>
+                            <m:r>
+                              <a:rPr sz="3600" i="1">
+                                <a:solidFill>
+                                  <a:srgbClr val="000000"/>
+                                </a:solidFill>
+                                <a:latin typeface="Cambria Math" panose="02040503050406030204" pitchFamily="18" charset="0"/>
+                              </a:rPr>
+                              <m:t>1</m:t>
+                            </m:r>
+                            <m:r>
+                              <a:rPr sz="3600" i="1">
+                                <a:solidFill>
+                                  <a:srgbClr val="000000"/>
+                                </a:solidFill>
+                                <a:latin typeface="Cambria Math" panose="02040503050406030204" pitchFamily="18" charset="0"/>
+                              </a:rPr>
+                              <m:t>)</m:t>
                             </m:r>
                           </m:sup>
                         </m:sSubSup>
@@ -39963,7 +41966,7 @@
             <a:effectLst/>
             <a:extLst>
               <a:ext uri="{C572A759-6A51-4108-AA02-DFA0A04FC94B}">
-                <ma14:wrappingTextBoxFlag xmlns="" xmlns:m="http://schemas.openxmlformats.org/officeDocument/2006/math" xmlns:a14="http://schemas.microsoft.com/office/drawing/2010/main" xmlns:ma14="http://schemas.microsoft.com/office/mac/drawingml/2011/main" val="1"/>
+                <ma14:wrappingTextBoxFlag xmlns:ma14="http://schemas.microsoft.com/office/mac/drawingml/2011/main" xmlns:a14="http://schemas.microsoft.com/office/drawing/2010/main" xmlns:m="http://schemas.openxmlformats.org/officeDocument/2006/math" xmlns="" val="1"/>
               </a:ext>
             </a:extLst>
           </p:spPr>
@@ -40029,7 +42032,7 @@
             <a:effectLst/>
             <a:extLst>
               <a:ext uri="{C572A759-6A51-4108-AA02-DFA0A04FC94B}">
-                <ma14:wrappingTextBoxFlag xmlns="" xmlns:m="http://schemas.openxmlformats.org/officeDocument/2006/math" xmlns:a14="http://schemas.microsoft.com/office/drawing/2010/main" xmlns:ma14="http://schemas.microsoft.com/office/mac/drawingml/2011/main" val="1"/>
+                <ma14:wrappingTextBoxFlag xmlns:ma14="http://schemas.microsoft.com/office/mac/drawingml/2011/main" xmlns:a14="http://schemas.microsoft.com/office/drawing/2010/main" xmlns:m="http://schemas.openxmlformats.org/officeDocument/2006/math" xmlns="" val="1"/>
               </a:ext>
             </a:extLst>
           </p:spPr>
@@ -40100,7 +42103,7 @@
             <a:effectLst/>
             <a:extLst>
               <a:ext uri="{C572A759-6A51-4108-AA02-DFA0A04FC94B}">
-                <ma14:wrappingTextBoxFlag xmlns="" xmlns:m="http://schemas.openxmlformats.org/officeDocument/2006/math" xmlns:a14="http://schemas.microsoft.com/office/drawing/2010/main" xmlns:ma14="http://schemas.microsoft.com/office/mac/drawingml/2011/main" val="1"/>
+                <ma14:wrappingTextBoxFlag xmlns:ma14="http://schemas.microsoft.com/office/mac/drawingml/2011/main" xmlns:a14="http://schemas.microsoft.com/office/drawing/2010/main" xmlns:m="http://schemas.openxmlformats.org/officeDocument/2006/math" xmlns="" val="1"/>
               </a:ext>
             </a:extLst>
           </p:spPr>
@@ -40168,7 +42171,7 @@
             <a:effectLst/>
             <a:extLst>
               <a:ext uri="{C572A759-6A51-4108-AA02-DFA0A04FC94B}">
-                <ma14:wrappingTextBoxFlag xmlns="" xmlns:m="http://schemas.openxmlformats.org/officeDocument/2006/math" xmlns:a14="http://schemas.microsoft.com/office/drawing/2010/main" xmlns:ma14="http://schemas.microsoft.com/office/mac/drawingml/2011/main" val="1"/>
+                <ma14:wrappingTextBoxFlag xmlns:ma14="http://schemas.microsoft.com/office/mac/drawingml/2011/main" xmlns:a14="http://schemas.microsoft.com/office/drawing/2010/main" xmlns:m="http://schemas.openxmlformats.org/officeDocument/2006/math" xmlns="" val="1"/>
               </a:ext>
             </a:extLst>
           </p:spPr>
@@ -40213,7 +42216,7 @@
           </a:ln>
           <a:extLst>
             <a:ext uri="{C572A759-6A51-4108-AA02-DFA0A04FC94B}">
-              <ma14:wrappingTextBoxFlag xmlns="" xmlns:m="http://schemas.openxmlformats.org/officeDocument/2006/math" xmlns:a14="http://schemas.microsoft.com/office/drawing/2010/main" xmlns:ma14="http://schemas.microsoft.com/office/mac/drawingml/2011/main" val="1"/>
+              <ma14:wrappingTextBoxFlag xmlns:ma14="http://schemas.microsoft.com/office/mac/drawingml/2011/main" xmlns:a14="http://schemas.microsoft.com/office/drawing/2010/main" xmlns:m="http://schemas.openxmlformats.org/officeDocument/2006/math" xmlns="" val="1"/>
             </a:ext>
           </a:extLst>
         </p:spPr>
@@ -40377,7 +42380,16 @@
                               </a:solidFill>
                               <a:latin typeface="Cambria Math" panose="02040503050406030204" pitchFamily="18" charset="0"/>
                             </a:rPr>
-                            <m:t>=0</m:t>
+                            <m:t>=</m:t>
+                          </m:r>
+                          <m:r>
+                            <a:rPr sz="4800" i="1">
+                              <a:solidFill>
+                                <a:srgbClr val="000000"/>
+                              </a:solidFill>
+                              <a:latin typeface="Cambria Math" panose="02040503050406030204" pitchFamily="18" charset="0"/>
+                            </a:rPr>
+                            <m:t>0</m:t>
                           </m:r>
                         </m:oMath>
                       </m:oMathPara>
@@ -40453,7 +42465,7 @@
               <a:effectLst/>
               <a:extLst>
                 <a:ext uri="{C572A759-6A51-4108-AA02-DFA0A04FC94B}">
-                  <ma14:wrappingTextBoxFlag xmlns="" xmlns:m="http://schemas.openxmlformats.org/officeDocument/2006/math" xmlns:a14="http://schemas.microsoft.com/office/drawing/2010/main" xmlns:ma14="http://schemas.microsoft.com/office/mac/drawingml/2011/main" val="1"/>
+                  <ma14:wrappingTextBoxFlag xmlns:ma14="http://schemas.microsoft.com/office/mac/drawingml/2011/main" xmlns:a14="http://schemas.microsoft.com/office/drawing/2010/main" xmlns:m="http://schemas.openxmlformats.org/officeDocument/2006/math" xmlns="" val="1"/>
                 </a:ext>
               </a:extLst>
             </p:spPr>
@@ -40566,7 +42578,7 @@
           </a:ln>
           <a:extLst>
             <a:ext uri="{C572A759-6A51-4108-AA02-DFA0A04FC94B}">
-              <ma14:wrappingTextBoxFlag xmlns="" xmlns:m="http://schemas.openxmlformats.org/officeDocument/2006/math" xmlns:a14="http://schemas.microsoft.com/office/drawing/2010/main" xmlns:ma14="http://schemas.microsoft.com/office/mac/drawingml/2011/main" val="1"/>
+              <ma14:wrappingTextBoxFlag xmlns:ma14="http://schemas.microsoft.com/office/mac/drawingml/2011/main" xmlns:a14="http://schemas.microsoft.com/office/drawing/2010/main" xmlns:m="http://schemas.openxmlformats.org/officeDocument/2006/math" xmlns="" val="1"/>
             </a:ext>
           </a:extLst>
         </p:spPr>
@@ -40610,7 +42622,7 @@
           </a:ln>
           <a:extLst>
             <a:ext uri="{C572A759-6A51-4108-AA02-DFA0A04FC94B}">
-              <ma14:wrappingTextBoxFlag xmlns="" xmlns:m="http://schemas.openxmlformats.org/officeDocument/2006/math" xmlns:a14="http://schemas.microsoft.com/office/drawing/2010/main" xmlns:ma14="http://schemas.microsoft.com/office/mac/drawingml/2011/main" val="1"/>
+              <ma14:wrappingTextBoxFlag xmlns:ma14="http://schemas.microsoft.com/office/mac/drawingml/2011/main" xmlns:a14="http://schemas.microsoft.com/office/drawing/2010/main" xmlns:m="http://schemas.openxmlformats.org/officeDocument/2006/math" xmlns="" val="1"/>
             </a:ext>
           </a:extLst>
         </p:spPr>
@@ -40849,8 +42861,8 @@
           </p:sp>
         </mc:Fallback>
       </mc:AlternateContent>
-      <mc:AlternateContent xmlns:mc="http://schemas.openxmlformats.org/markup-compatibility/2006">
-        <mc:Choice xmlns:a14="http://schemas.microsoft.com/office/drawing/2010/main" Requires="a14">
+      <mc:AlternateContent xmlns:mc="http://schemas.openxmlformats.org/markup-compatibility/2006" xmlns:a14="http://schemas.microsoft.com/office/drawing/2010/main">
+        <mc:Choice Requires="a14">
           <p:sp>
             <p:nvSpPr>
               <p:cNvPr id="2" name="Tekstvak 1">
@@ -41054,7 +43066,7 @@
                                   <a:cs typeface="+mn-cs"/>
                                   <a:sym typeface="Helvetica Light"/>
                                 </a:rPr>
-                                <m:t>𝐿𝑜</m:t>
+                                <m:t>𝐿𝑜𝑢</m:t>
                               </m:r>
                               <m:r>
                                 <a:rPr kumimoji="0" lang="nl-NL" sz="3600" b="0" i="1" u="none" strike="noStrike" cap="none" spc="0" normalizeH="0" baseline="-25000" smtClean="0">
@@ -41071,7 +43083,7 @@
                                   <a:cs typeface="+mn-cs"/>
                                   <a:sym typeface="Helvetica Light"/>
                                 </a:rPr>
-                                <m:t>𝑢𝑡</m:t>
+                                <m:t>𝑡</m:t>
                               </m:r>
                             </m:den>
                           </m:f>
@@ -41098,7 +43110,7 @@
             </p:txBody>
           </p:sp>
         </mc:Choice>
-        <mc:Fallback>
+        <mc:Fallback xmlns="">
           <p:sp>
             <p:nvSpPr>
               <p:cNvPr id="2" name="Tekstvak 1">
@@ -41193,7 +43205,7 @@
           </a:ln>
           <a:extLst>
             <a:ext uri="{C572A759-6A51-4108-AA02-DFA0A04FC94B}">
-              <ma14:wrappingTextBoxFlag xmlns="" xmlns:m="http://schemas.openxmlformats.org/officeDocument/2006/math" xmlns:a14="http://schemas.microsoft.com/office/drawing/2010/main" xmlns:ma14="http://schemas.microsoft.com/office/mac/drawingml/2011/main" val="1"/>
+              <ma14:wrappingTextBoxFlag xmlns:ma14="http://schemas.microsoft.com/office/mac/drawingml/2011/main" xmlns:a14="http://schemas.microsoft.com/office/drawing/2010/main" xmlns:m="http://schemas.openxmlformats.org/officeDocument/2006/math" xmlns="" val="1"/>
             </a:ext>
           </a:extLst>
         </p:spPr>
@@ -41237,7 +43249,7 @@
           </a:ln>
           <a:extLst>
             <a:ext uri="{C572A759-6A51-4108-AA02-DFA0A04FC94B}">
-              <ma14:wrappingTextBoxFlag xmlns="" xmlns:m="http://schemas.openxmlformats.org/officeDocument/2006/math" xmlns:a14="http://schemas.microsoft.com/office/drawing/2010/main" xmlns:ma14="http://schemas.microsoft.com/office/mac/drawingml/2011/main" val="1"/>
+              <ma14:wrappingTextBoxFlag xmlns:ma14="http://schemas.microsoft.com/office/mac/drawingml/2011/main" xmlns:a14="http://schemas.microsoft.com/office/drawing/2010/main" xmlns:m="http://schemas.openxmlformats.org/officeDocument/2006/math" xmlns="" val="1"/>
             </a:ext>
           </a:extLst>
         </p:spPr>
@@ -41502,7 +43514,7 @@
           </a:ln>
           <a:extLst>
             <a:ext uri="{C572A759-6A51-4108-AA02-DFA0A04FC94B}">
-              <ma14:wrappingTextBoxFlag xmlns="" xmlns:m="http://schemas.openxmlformats.org/officeDocument/2006/math" xmlns:a14="http://schemas.microsoft.com/office/drawing/2010/main" xmlns:ma14="http://schemas.microsoft.com/office/mac/drawingml/2011/main" val="1"/>
+              <ma14:wrappingTextBoxFlag xmlns:ma14="http://schemas.microsoft.com/office/mac/drawingml/2011/main" xmlns:a14="http://schemas.microsoft.com/office/drawing/2010/main" xmlns:m="http://schemas.openxmlformats.org/officeDocument/2006/math" xmlns="" val="1"/>
             </a:ext>
           </a:extLst>
         </p:spPr>
@@ -41688,7 +43700,7 @@
           </a:ln>
           <a:extLst>
             <a:ext uri="{C572A759-6A51-4108-AA02-DFA0A04FC94B}">
-              <ma14:wrappingTextBoxFlag xmlns="" xmlns:m="http://schemas.openxmlformats.org/officeDocument/2006/math" xmlns:a14="http://schemas.microsoft.com/office/drawing/2010/main" xmlns:ma14="http://schemas.microsoft.com/office/mac/drawingml/2011/main" val="1"/>
+              <ma14:wrappingTextBoxFlag xmlns:ma14="http://schemas.microsoft.com/office/mac/drawingml/2011/main" xmlns:a14="http://schemas.microsoft.com/office/drawing/2010/main" xmlns:m="http://schemas.openxmlformats.org/officeDocument/2006/math" xmlns="" val="1"/>
             </a:ext>
           </a:extLst>
         </p:spPr>
@@ -41760,7 +43772,7 @@
           </a:ln>
           <a:extLst>
             <a:ext uri="{C572A759-6A51-4108-AA02-DFA0A04FC94B}">
-              <ma14:wrappingTextBoxFlag xmlns="" xmlns:m="http://schemas.openxmlformats.org/officeDocument/2006/math" xmlns:a14="http://schemas.microsoft.com/office/drawing/2010/main" xmlns:ma14="http://schemas.microsoft.com/office/mac/drawingml/2011/main" val="1"/>
+              <ma14:wrappingTextBoxFlag xmlns:ma14="http://schemas.microsoft.com/office/mac/drawingml/2011/main" xmlns:a14="http://schemas.microsoft.com/office/drawing/2010/main" xmlns:m="http://schemas.openxmlformats.org/officeDocument/2006/math" xmlns="" val="1"/>
             </a:ext>
           </a:extLst>
         </p:spPr>
@@ -43013,7 +45025,7 @@
           </a:ln>
           <a:extLst>
             <a:ext uri="{C572A759-6A51-4108-AA02-DFA0A04FC94B}">
-              <ma14:wrappingTextBoxFlag xmlns="" xmlns:m="http://schemas.openxmlformats.org/officeDocument/2006/math" xmlns:a14="http://schemas.microsoft.com/office/drawing/2010/main" xmlns:ma14="http://schemas.microsoft.com/office/mac/drawingml/2011/main" val="1"/>
+              <ma14:wrappingTextBoxFlag xmlns:ma14="http://schemas.microsoft.com/office/mac/drawingml/2011/main" xmlns:a14="http://schemas.microsoft.com/office/drawing/2010/main" xmlns:m="http://schemas.openxmlformats.org/officeDocument/2006/math" xmlns="" val="1"/>
             </a:ext>
           </a:extLst>
         </p:spPr>
@@ -43057,7 +45069,7 @@
           </a:ln>
           <a:extLst>
             <a:ext uri="{C572A759-6A51-4108-AA02-DFA0A04FC94B}">
-              <ma14:wrappingTextBoxFlag xmlns="" xmlns:m="http://schemas.openxmlformats.org/officeDocument/2006/math" xmlns:a14="http://schemas.microsoft.com/office/drawing/2010/main" xmlns:ma14="http://schemas.microsoft.com/office/mac/drawingml/2011/main" val="1"/>
+              <ma14:wrappingTextBoxFlag xmlns:ma14="http://schemas.microsoft.com/office/mac/drawingml/2011/main" xmlns:a14="http://schemas.microsoft.com/office/drawing/2010/main" xmlns:m="http://schemas.openxmlformats.org/officeDocument/2006/math" xmlns="" val="1"/>
             </a:ext>
           </a:extLst>
         </p:spPr>
@@ -43127,7 +45139,7 @@
           </a:ln>
           <a:extLst>
             <a:ext uri="{C572A759-6A51-4108-AA02-DFA0A04FC94B}">
-              <ma14:wrappingTextBoxFlag xmlns="" xmlns:m="http://schemas.openxmlformats.org/officeDocument/2006/math" xmlns:a14="http://schemas.microsoft.com/office/drawing/2010/main" xmlns:ma14="http://schemas.microsoft.com/office/mac/drawingml/2011/main" val="1"/>
+              <ma14:wrappingTextBoxFlag xmlns:ma14="http://schemas.microsoft.com/office/mac/drawingml/2011/main" xmlns:a14="http://schemas.microsoft.com/office/drawing/2010/main" xmlns:m="http://schemas.openxmlformats.org/officeDocument/2006/math" xmlns="" val="1"/>
             </a:ext>
           </a:extLst>
         </p:spPr>
@@ -43470,7 +45482,7 @@
           </a:ln>
           <a:extLst>
             <a:ext uri="{C572A759-6A51-4108-AA02-DFA0A04FC94B}">
-              <ma14:wrappingTextBoxFlag xmlns="" xmlns:m="http://schemas.openxmlformats.org/officeDocument/2006/math" xmlns:a14="http://schemas.microsoft.com/office/drawing/2010/main" xmlns:ma14="http://schemas.microsoft.com/office/mac/drawingml/2011/main" val="1"/>
+              <ma14:wrappingTextBoxFlag xmlns:ma14="http://schemas.microsoft.com/office/mac/drawingml/2011/main" xmlns:a14="http://schemas.microsoft.com/office/drawing/2010/main" xmlns:m="http://schemas.openxmlformats.org/officeDocument/2006/math" xmlns="" val="1"/>
             </a:ext>
           </a:extLst>
         </p:spPr>
@@ -43514,7 +45526,7 @@
           </a:ln>
           <a:extLst>
             <a:ext uri="{C572A759-6A51-4108-AA02-DFA0A04FC94B}">
-              <ma14:wrappingTextBoxFlag xmlns="" xmlns:m="http://schemas.openxmlformats.org/officeDocument/2006/math" xmlns:a14="http://schemas.microsoft.com/office/drawing/2010/main" xmlns:ma14="http://schemas.microsoft.com/office/mac/drawingml/2011/main" val="1"/>
+              <ma14:wrappingTextBoxFlag xmlns:ma14="http://schemas.microsoft.com/office/mac/drawingml/2011/main" xmlns:a14="http://schemas.microsoft.com/office/drawing/2010/main" xmlns:m="http://schemas.openxmlformats.org/officeDocument/2006/math" xmlns="" val="1"/>
             </a:ext>
           </a:extLst>
         </p:spPr>
@@ -43617,7 +45629,7 @@
             <a:effectLst/>
             <a:extLst>
               <a:ext uri="{C572A759-6A51-4108-AA02-DFA0A04FC94B}">
-                <ma14:wrappingTextBoxFlag xmlns="" xmlns:m="http://schemas.openxmlformats.org/officeDocument/2006/math" xmlns:a14="http://schemas.microsoft.com/office/drawing/2010/main" xmlns:ma14="http://schemas.microsoft.com/office/mac/drawingml/2011/main" val="1"/>
+                <ma14:wrappingTextBoxFlag xmlns:ma14="http://schemas.microsoft.com/office/mac/drawingml/2011/main" xmlns:a14="http://schemas.microsoft.com/office/drawing/2010/main" xmlns:m="http://schemas.openxmlformats.org/officeDocument/2006/math" xmlns="" val="1"/>
               </a:ext>
             </a:extLst>
           </p:spPr>
@@ -44020,7 +46032,7 @@
             <a:effectLst/>
             <a:extLst>
               <a:ext uri="{C572A759-6A51-4108-AA02-DFA0A04FC94B}">
-                <ma14:wrappingTextBoxFlag xmlns="" xmlns:m="http://schemas.openxmlformats.org/officeDocument/2006/math" xmlns:a14="http://schemas.microsoft.com/office/drawing/2010/main" xmlns:ma14="http://schemas.microsoft.com/office/mac/drawingml/2011/main" val="1"/>
+                <ma14:wrappingTextBoxFlag xmlns:ma14="http://schemas.microsoft.com/office/mac/drawingml/2011/main" xmlns:a14="http://schemas.microsoft.com/office/drawing/2010/main" xmlns:m="http://schemas.openxmlformats.org/officeDocument/2006/math" xmlns="" val="1"/>
               </a:ext>
             </a:extLst>
           </p:spPr>
@@ -46168,7 +48180,7 @@
             <a:effectLst/>
             <a:extLst>
               <a:ext uri="{C572A759-6A51-4108-AA02-DFA0A04FC94B}">
-                <ma14:wrappingTextBoxFlag xmlns="" xmlns:m="http://schemas.openxmlformats.org/officeDocument/2006/math" xmlns:a14="http://schemas.microsoft.com/office/drawing/2010/main" xmlns:ma14="http://schemas.microsoft.com/office/mac/drawingml/2011/main" val="1"/>
+                <ma14:wrappingTextBoxFlag xmlns:ma14="http://schemas.microsoft.com/office/mac/drawingml/2011/main" xmlns:a14="http://schemas.microsoft.com/office/drawing/2010/main" xmlns:m="http://schemas.openxmlformats.org/officeDocument/2006/math" xmlns="" val="1"/>
               </a:ext>
             </a:extLst>
           </p:spPr>
@@ -46215,7 +48227,7 @@
             <a:effectLst/>
             <a:extLst>
               <a:ext uri="{C572A759-6A51-4108-AA02-DFA0A04FC94B}">
-                <ma14:wrappingTextBoxFlag xmlns="" xmlns:m="http://schemas.openxmlformats.org/officeDocument/2006/math" xmlns:a14="http://schemas.microsoft.com/office/drawing/2010/main" xmlns:ma14="http://schemas.microsoft.com/office/mac/drawingml/2011/main" val="1"/>
+                <ma14:wrappingTextBoxFlag xmlns:ma14="http://schemas.microsoft.com/office/mac/drawingml/2011/main" xmlns:a14="http://schemas.microsoft.com/office/drawing/2010/main" xmlns:m="http://schemas.openxmlformats.org/officeDocument/2006/math" xmlns="" val="1"/>
               </a:ext>
             </a:extLst>
           </p:spPr>
@@ -46262,7 +48274,7 @@
             <a:effectLst/>
             <a:extLst>
               <a:ext uri="{C572A759-6A51-4108-AA02-DFA0A04FC94B}">
-                <ma14:wrappingTextBoxFlag xmlns="" xmlns:m="http://schemas.openxmlformats.org/officeDocument/2006/math" xmlns:a14="http://schemas.microsoft.com/office/drawing/2010/main" xmlns:ma14="http://schemas.microsoft.com/office/mac/drawingml/2011/main" val="1"/>
+                <ma14:wrappingTextBoxFlag xmlns:ma14="http://schemas.microsoft.com/office/mac/drawingml/2011/main" xmlns:a14="http://schemas.microsoft.com/office/drawing/2010/main" xmlns:m="http://schemas.openxmlformats.org/officeDocument/2006/math" xmlns="" val="1"/>
               </a:ext>
             </a:extLst>
           </p:spPr>
@@ -46712,7 +48724,7 @@
           </a:ln>
           <a:extLst>
             <a:ext uri="{C572A759-6A51-4108-AA02-DFA0A04FC94B}">
-              <ma14:wrappingTextBoxFlag xmlns="" xmlns:m="http://schemas.openxmlformats.org/officeDocument/2006/math" xmlns:a14="http://schemas.microsoft.com/office/drawing/2010/main" xmlns:ma14="http://schemas.microsoft.com/office/mac/drawingml/2011/main" val="1"/>
+              <ma14:wrappingTextBoxFlag xmlns:ma14="http://schemas.microsoft.com/office/mac/drawingml/2011/main" xmlns:a14="http://schemas.microsoft.com/office/drawing/2010/main" xmlns:m="http://schemas.openxmlformats.org/officeDocument/2006/math" xmlns="" val="1"/>
             </a:ext>
           </a:extLst>
         </p:spPr>
@@ -46778,7 +48790,7 @@
           </a:ln>
           <a:extLst>
             <a:ext uri="{C572A759-6A51-4108-AA02-DFA0A04FC94B}">
-              <ma14:wrappingTextBoxFlag xmlns="" xmlns:m="http://schemas.openxmlformats.org/officeDocument/2006/math" xmlns:a14="http://schemas.microsoft.com/office/drawing/2010/main" xmlns:ma14="http://schemas.microsoft.com/office/mac/drawingml/2011/main" val="1"/>
+              <ma14:wrappingTextBoxFlag xmlns:ma14="http://schemas.microsoft.com/office/mac/drawingml/2011/main" xmlns:a14="http://schemas.microsoft.com/office/drawing/2010/main" xmlns:m="http://schemas.openxmlformats.org/officeDocument/2006/math" xmlns="" val="1"/>
             </a:ext>
           </a:extLst>
         </p:spPr>
@@ -46918,7 +48930,7 @@
           </a:ln>
           <a:extLst>
             <a:ext uri="{C572A759-6A51-4108-AA02-DFA0A04FC94B}">
-              <ma14:wrappingTextBoxFlag xmlns="" xmlns:m="http://schemas.openxmlformats.org/officeDocument/2006/math" xmlns:a14="http://schemas.microsoft.com/office/drawing/2010/main" xmlns:ma14="http://schemas.microsoft.com/office/mac/drawingml/2011/main" val="1"/>
+              <ma14:wrappingTextBoxFlag xmlns:ma14="http://schemas.microsoft.com/office/mac/drawingml/2011/main" xmlns:a14="http://schemas.microsoft.com/office/drawing/2010/main" xmlns:m="http://schemas.openxmlformats.org/officeDocument/2006/math" xmlns="" val="1"/>
             </a:ext>
           </a:extLst>
         </p:spPr>
@@ -46962,7 +48974,7 @@
           </a:ln>
           <a:extLst>
             <a:ext uri="{C572A759-6A51-4108-AA02-DFA0A04FC94B}">
-              <ma14:wrappingTextBoxFlag xmlns="" xmlns:m="http://schemas.openxmlformats.org/officeDocument/2006/math" xmlns:a14="http://schemas.microsoft.com/office/drawing/2010/main" xmlns:ma14="http://schemas.microsoft.com/office/mac/drawingml/2011/main" val="1"/>
+              <ma14:wrappingTextBoxFlag xmlns:ma14="http://schemas.microsoft.com/office/mac/drawingml/2011/main" xmlns:a14="http://schemas.microsoft.com/office/drawing/2010/main" xmlns:m="http://schemas.openxmlformats.org/officeDocument/2006/math" xmlns="" val="1"/>
             </a:ext>
           </a:extLst>
         </p:spPr>
@@ -47529,7 +49541,7 @@
           </a:ln>
           <a:extLst>
             <a:ext uri="{C572A759-6A51-4108-AA02-DFA0A04FC94B}">
-              <ma14:wrappingTextBoxFlag xmlns="" xmlns:m="http://schemas.openxmlformats.org/officeDocument/2006/math" xmlns:a14="http://schemas.microsoft.com/office/drawing/2010/main" xmlns:ma14="http://schemas.microsoft.com/office/mac/drawingml/2011/main" val="1"/>
+              <ma14:wrappingTextBoxFlag xmlns:ma14="http://schemas.microsoft.com/office/mac/drawingml/2011/main" xmlns:a14="http://schemas.microsoft.com/office/drawing/2010/main" xmlns:m="http://schemas.openxmlformats.org/officeDocument/2006/math" xmlns="" val="1"/>
             </a:ext>
           </a:extLst>
         </p:spPr>
@@ -47595,7 +49607,7 @@
           </a:ln>
           <a:extLst>
             <a:ext uri="{C572A759-6A51-4108-AA02-DFA0A04FC94B}">
-              <ma14:wrappingTextBoxFlag xmlns="" xmlns:m="http://schemas.openxmlformats.org/officeDocument/2006/math" xmlns:a14="http://schemas.microsoft.com/office/drawing/2010/main" xmlns:ma14="http://schemas.microsoft.com/office/mac/drawingml/2011/main" val="1"/>
+              <ma14:wrappingTextBoxFlag xmlns:ma14="http://schemas.microsoft.com/office/mac/drawingml/2011/main" xmlns:a14="http://schemas.microsoft.com/office/drawing/2010/main" xmlns:m="http://schemas.openxmlformats.org/officeDocument/2006/math" xmlns="" val="1"/>
             </a:ext>
           </a:extLst>
         </p:spPr>
@@ -47735,7 +49747,7 @@
           </a:ln>
           <a:extLst>
             <a:ext uri="{C572A759-6A51-4108-AA02-DFA0A04FC94B}">
-              <ma14:wrappingTextBoxFlag xmlns="" xmlns:m="http://schemas.openxmlformats.org/officeDocument/2006/math" xmlns:a14="http://schemas.microsoft.com/office/drawing/2010/main" xmlns:ma14="http://schemas.microsoft.com/office/mac/drawingml/2011/main" val="1"/>
+              <ma14:wrappingTextBoxFlag xmlns:ma14="http://schemas.microsoft.com/office/mac/drawingml/2011/main" xmlns:a14="http://schemas.microsoft.com/office/drawing/2010/main" xmlns:m="http://schemas.openxmlformats.org/officeDocument/2006/math" xmlns="" val="1"/>
             </a:ext>
           </a:extLst>
         </p:spPr>
@@ -47779,7 +49791,7 @@
           </a:ln>
           <a:extLst>
             <a:ext uri="{C572A759-6A51-4108-AA02-DFA0A04FC94B}">
-              <ma14:wrappingTextBoxFlag xmlns="" xmlns:m="http://schemas.openxmlformats.org/officeDocument/2006/math" xmlns:a14="http://schemas.microsoft.com/office/drawing/2010/main" xmlns:ma14="http://schemas.microsoft.com/office/mac/drawingml/2011/main" val="1"/>
+              <ma14:wrappingTextBoxFlag xmlns:ma14="http://schemas.microsoft.com/office/mac/drawingml/2011/main" xmlns:a14="http://schemas.microsoft.com/office/drawing/2010/main" xmlns:m="http://schemas.openxmlformats.org/officeDocument/2006/math" xmlns="" val="1"/>
             </a:ext>
           </a:extLst>
         </p:spPr>
@@ -48270,7 +50282,7 @@
           </a:ln>
           <a:extLst>
             <a:ext uri="{C572A759-6A51-4108-AA02-DFA0A04FC94B}">
-              <ma14:wrappingTextBoxFlag xmlns="" xmlns:m="http://schemas.openxmlformats.org/officeDocument/2006/math" xmlns:a14="http://schemas.microsoft.com/office/drawing/2010/main" xmlns:ma14="http://schemas.microsoft.com/office/mac/drawingml/2011/main" val="1"/>
+              <ma14:wrappingTextBoxFlag xmlns:ma14="http://schemas.microsoft.com/office/mac/drawingml/2011/main" xmlns:a14="http://schemas.microsoft.com/office/drawing/2010/main" xmlns:m="http://schemas.openxmlformats.org/officeDocument/2006/math" xmlns="" val="1"/>
             </a:ext>
           </a:extLst>
         </p:spPr>
@@ -48393,7 +50405,25 @@
                             </a:solidFill>
                             <a:latin typeface="Cambria Math" panose="02040503050406030204" pitchFamily="18" charset="0"/>
                           </a:rPr>
-                          <m:t>(2)</m:t>
+                          <m:t>(</m:t>
+                        </m:r>
+                        <m:r>
+                          <a:rPr sz="4800" i="1">
+                            <a:solidFill>
+                              <a:srgbClr val="000000"/>
+                            </a:solidFill>
+                            <a:latin typeface="Cambria Math" panose="02040503050406030204" pitchFamily="18" charset="0"/>
+                          </a:rPr>
+                          <m:t>2</m:t>
+                        </m:r>
+                        <m:r>
+                          <a:rPr sz="4800" i="1">
+                            <a:solidFill>
+                              <a:srgbClr val="000000"/>
+                            </a:solidFill>
+                            <a:latin typeface="Cambria Math" panose="02040503050406030204" pitchFamily="18" charset="0"/>
+                          </a:rPr>
+                          <m:t>)</m:t>
                         </m:r>
                       </m:sup>
                     </m:sSubSup>
@@ -48468,7 +50498,25 @@
                             </a:solidFill>
                             <a:latin typeface="Cambria Math" panose="02040503050406030204" pitchFamily="18" charset="0"/>
                           </a:rPr>
-                          <m:t>(1)</m:t>
+                          <m:t>(</m:t>
+                        </m:r>
+                        <m:r>
+                          <a:rPr sz="4800" i="1">
+                            <a:solidFill>
+                              <a:srgbClr val="000000"/>
+                            </a:solidFill>
+                            <a:latin typeface="Cambria Math" panose="02040503050406030204" pitchFamily="18" charset="0"/>
+                          </a:rPr>
+                          <m:t>1</m:t>
+                        </m:r>
+                        <m:r>
+                          <a:rPr sz="4800" i="1">
+                            <a:solidFill>
+                              <a:srgbClr val="000000"/>
+                            </a:solidFill>
+                            <a:latin typeface="Cambria Math" panose="02040503050406030204" pitchFamily="18" charset="0"/>
+                          </a:rPr>
+                          <m:t>)</m:t>
                         </m:r>
                       </m:sup>
                     </m:sSubSup>
@@ -48513,7 +50561,25 @@
                             </a:solidFill>
                             <a:latin typeface="Cambria Math" panose="02040503050406030204" pitchFamily="18" charset="0"/>
                           </a:rPr>
-                          <m:t>(1)</m:t>
+                          <m:t>(</m:t>
+                        </m:r>
+                        <m:r>
+                          <a:rPr sz="4800" i="1">
+                            <a:solidFill>
+                              <a:srgbClr val="000000"/>
+                            </a:solidFill>
+                            <a:latin typeface="Cambria Math" panose="02040503050406030204" pitchFamily="18" charset="0"/>
+                          </a:rPr>
+                          <m:t>1</m:t>
+                        </m:r>
+                        <m:r>
+                          <a:rPr sz="4800" i="1">
+                            <a:solidFill>
+                              <a:srgbClr val="000000"/>
+                            </a:solidFill>
+                            <a:latin typeface="Cambria Math" panose="02040503050406030204" pitchFamily="18" charset="0"/>
+                          </a:rPr>
+                          <m:t>)</m:t>
                         </m:r>
                       </m:sup>
                     </m:sSubSup>
@@ -48570,7 +50636,25 @@
                             </a:solidFill>
                             <a:latin typeface="Cambria Math" panose="02040503050406030204" pitchFamily="18" charset="0"/>
                           </a:rPr>
-                          <m:t>(1)</m:t>
+                          <m:t>(</m:t>
+                        </m:r>
+                        <m:r>
+                          <a:rPr sz="4800" i="1">
+                            <a:solidFill>
+                              <a:srgbClr val="000000"/>
+                            </a:solidFill>
+                            <a:latin typeface="Cambria Math" panose="02040503050406030204" pitchFamily="18" charset="0"/>
+                          </a:rPr>
+                          <m:t>1</m:t>
+                        </m:r>
+                        <m:r>
+                          <a:rPr sz="4800" i="1">
+                            <a:solidFill>
+                              <a:srgbClr val="000000"/>
+                            </a:solidFill>
+                            <a:latin typeface="Cambria Math" panose="02040503050406030204" pitchFamily="18" charset="0"/>
+                          </a:rPr>
+                          <m:t>)</m:t>
                         </m:r>
                       </m:sup>
                     </m:sSubSup>
@@ -48615,7 +50699,25 @@
                             </a:solidFill>
                             <a:latin typeface="Cambria Math" panose="02040503050406030204" pitchFamily="18" charset="0"/>
                           </a:rPr>
-                          <m:t>(1)</m:t>
+                          <m:t>(</m:t>
+                        </m:r>
+                        <m:r>
+                          <a:rPr sz="4800" i="1">
+                            <a:solidFill>
+                              <a:srgbClr val="000000"/>
+                            </a:solidFill>
+                            <a:latin typeface="Cambria Math" panose="02040503050406030204" pitchFamily="18" charset="0"/>
+                          </a:rPr>
+                          <m:t>1</m:t>
+                        </m:r>
+                        <m:r>
+                          <a:rPr sz="4800" i="1">
+                            <a:solidFill>
+                              <a:srgbClr val="000000"/>
+                            </a:solidFill>
+                            <a:latin typeface="Cambria Math" panose="02040503050406030204" pitchFamily="18" charset="0"/>
+                          </a:rPr>
+                          <m:t>)</m:t>
                         </m:r>
                       </m:sup>
                     </m:sSubSup>
@@ -48740,7 +50842,25 @@
                               </a:solidFill>
                               <a:latin typeface="Cambria Math" panose="02040503050406030204" pitchFamily="18" charset="0"/>
                             </a:rPr>
-                            <m:t>(1)</m:t>
+                            <m:t>(</m:t>
+                          </m:r>
+                          <m:r>
+                            <a:rPr sz="4800" i="1">
+                              <a:solidFill>
+                                <a:srgbClr val="000000"/>
+                              </a:solidFill>
+                              <a:latin typeface="Cambria Math" panose="02040503050406030204" pitchFamily="18" charset="0"/>
+                            </a:rPr>
+                            <m:t>1</m:t>
+                          </m:r>
+                          <m:r>
+                            <a:rPr sz="4800" i="1">
+                              <a:solidFill>
+                                <a:srgbClr val="000000"/>
+                              </a:solidFill>
+                              <a:latin typeface="Cambria Math" panose="02040503050406030204" pitchFamily="18" charset="0"/>
+                            </a:rPr>
+                            <m:t>)</m:t>
                           </m:r>
                         </m:sup>
                       </m:sSup>
@@ -49016,7 +51136,7 @@
             <a:effectLst/>
             <a:extLst>
               <a:ext uri="{C572A759-6A51-4108-AA02-DFA0A04FC94B}">
-                <ma14:wrappingTextBoxFlag xmlns="" xmlns:m="http://schemas.openxmlformats.org/officeDocument/2006/math" xmlns:a14="http://schemas.microsoft.com/office/drawing/2010/main" xmlns:ma14="http://schemas.microsoft.com/office/mac/drawingml/2011/main" val="1"/>
+                <ma14:wrappingTextBoxFlag xmlns:ma14="http://schemas.microsoft.com/office/mac/drawingml/2011/main" xmlns:a14="http://schemas.microsoft.com/office/drawing/2010/main" xmlns:m="http://schemas.openxmlformats.org/officeDocument/2006/math" xmlns="" val="1"/>
               </a:ext>
             </a:extLst>
           </p:spPr>
@@ -49086,7 +51206,7 @@
             <a:effectLst/>
             <a:extLst>
               <a:ext uri="{C572A759-6A51-4108-AA02-DFA0A04FC94B}">
-                <ma14:wrappingTextBoxFlag xmlns="" xmlns:m="http://schemas.openxmlformats.org/officeDocument/2006/math" xmlns:a14="http://schemas.microsoft.com/office/drawing/2010/main" xmlns:ma14="http://schemas.microsoft.com/office/mac/drawingml/2011/main" val="1"/>
+                <ma14:wrappingTextBoxFlag xmlns:ma14="http://schemas.microsoft.com/office/mac/drawingml/2011/main" xmlns:a14="http://schemas.microsoft.com/office/drawing/2010/main" xmlns:m="http://schemas.openxmlformats.org/officeDocument/2006/math" xmlns="" val="1"/>
               </a:ext>
             </a:extLst>
           </p:spPr>
@@ -49209,7 +51329,7 @@
             <a:effectLst/>
             <a:extLst>
               <a:ext uri="{C572A759-6A51-4108-AA02-DFA0A04FC94B}">
-                <ma14:wrappingTextBoxFlag xmlns="" xmlns:m="http://schemas.openxmlformats.org/officeDocument/2006/math" xmlns:a14="http://schemas.microsoft.com/office/drawing/2010/main" xmlns:ma14="http://schemas.microsoft.com/office/mac/drawingml/2011/main" val="1"/>
+                <ma14:wrappingTextBoxFlag xmlns:ma14="http://schemas.microsoft.com/office/mac/drawingml/2011/main" xmlns:a14="http://schemas.microsoft.com/office/drawing/2010/main" xmlns:m="http://schemas.openxmlformats.org/officeDocument/2006/math" xmlns="" val="1"/>
               </a:ext>
             </a:extLst>
           </p:spPr>
@@ -49256,7 +51376,7 @@
             <a:effectLst/>
             <a:extLst>
               <a:ext uri="{C572A759-6A51-4108-AA02-DFA0A04FC94B}">
-                <ma14:wrappingTextBoxFlag xmlns="" xmlns:m="http://schemas.openxmlformats.org/officeDocument/2006/math" xmlns:a14="http://schemas.microsoft.com/office/drawing/2010/main" xmlns:ma14="http://schemas.microsoft.com/office/mac/drawingml/2011/main" val="1"/>
+                <ma14:wrappingTextBoxFlag xmlns:ma14="http://schemas.microsoft.com/office/mac/drawingml/2011/main" xmlns:a14="http://schemas.microsoft.com/office/drawing/2010/main" xmlns:m="http://schemas.openxmlformats.org/officeDocument/2006/math" xmlns="" val="1"/>
               </a:ext>
             </a:extLst>
           </p:spPr>
@@ -49475,7 +51595,7 @@
             <a:effectLst/>
             <a:extLst>
               <a:ext uri="{C572A759-6A51-4108-AA02-DFA0A04FC94B}">
-                <ma14:wrappingTextBoxFlag xmlns="" xmlns:m="http://schemas.openxmlformats.org/officeDocument/2006/math" xmlns:a14="http://schemas.microsoft.com/office/drawing/2010/main" xmlns:ma14="http://schemas.microsoft.com/office/mac/drawingml/2011/main" val="1"/>
+                <ma14:wrappingTextBoxFlag xmlns:ma14="http://schemas.microsoft.com/office/mac/drawingml/2011/main" xmlns:a14="http://schemas.microsoft.com/office/drawing/2010/main" xmlns:m="http://schemas.openxmlformats.org/officeDocument/2006/math" xmlns="" val="1"/>
               </a:ext>
             </a:extLst>
           </p:spPr>
@@ -49538,7 +51658,7 @@
             <a:effectLst/>
             <a:extLst>
               <a:ext uri="{C572A759-6A51-4108-AA02-DFA0A04FC94B}">
-                <ma14:wrappingTextBoxFlag xmlns="" xmlns:m="http://schemas.openxmlformats.org/officeDocument/2006/math" xmlns:a14="http://schemas.microsoft.com/office/drawing/2010/main" xmlns:ma14="http://schemas.microsoft.com/office/mac/drawingml/2011/main" val="1"/>
+                <ma14:wrappingTextBoxFlag xmlns:ma14="http://schemas.microsoft.com/office/mac/drawingml/2011/main" xmlns:a14="http://schemas.microsoft.com/office/drawing/2010/main" xmlns:m="http://schemas.openxmlformats.org/officeDocument/2006/math" xmlns="" val="1"/>
               </a:ext>
             </a:extLst>
           </p:spPr>
@@ -49645,7 +51765,25 @@
                                 </a:solidFill>
                                 <a:latin typeface="Cambria Math" panose="02040503050406030204" pitchFamily="18" charset="0"/>
                               </a:rPr>
-                              <m:t>(1)</m:t>
+                              <m:t>(</m:t>
+                            </m:r>
+                            <m:r>
+                              <a:rPr sz="3600" i="1">
+                                <a:solidFill>
+                                  <a:srgbClr val="000000"/>
+                                </a:solidFill>
+                                <a:latin typeface="Cambria Math" panose="02040503050406030204" pitchFamily="18" charset="0"/>
+                              </a:rPr>
+                              <m:t>1</m:t>
+                            </m:r>
+                            <m:r>
+                              <a:rPr sz="3600" i="1">
+                                <a:solidFill>
+                                  <a:srgbClr val="000000"/>
+                                </a:solidFill>
+                                <a:latin typeface="Cambria Math" panose="02040503050406030204" pitchFamily="18" charset="0"/>
+                              </a:rPr>
+                              <m:t>)</m:t>
                             </m:r>
                           </m:sup>
                         </m:sSubSup>
@@ -49780,7 +51918,25 @@
                                 </a:solidFill>
                                 <a:latin typeface="Cambria Math" panose="02040503050406030204" pitchFamily="18" charset="0"/>
                               </a:rPr>
-                              <m:t>(1)</m:t>
+                              <m:t>(</m:t>
+                            </m:r>
+                            <m:r>
+                              <a:rPr sz="3600" i="1">
+                                <a:solidFill>
+                                  <a:srgbClr val="000000"/>
+                                </a:solidFill>
+                                <a:latin typeface="Cambria Math" panose="02040503050406030204" pitchFamily="18" charset="0"/>
+                              </a:rPr>
+                              <m:t>1</m:t>
+                            </m:r>
+                            <m:r>
+                              <a:rPr sz="3600" i="1">
+                                <a:solidFill>
+                                  <a:srgbClr val="000000"/>
+                                </a:solidFill>
+                                <a:latin typeface="Cambria Math" panose="02040503050406030204" pitchFamily="18" charset="0"/>
+                              </a:rPr>
+                              <m:t>)</m:t>
                             </m:r>
                           </m:sup>
                         </m:sSubSup>
@@ -49915,7 +52071,25 @@
                                 </a:solidFill>
                                 <a:latin typeface="Cambria Math" panose="02040503050406030204" pitchFamily="18" charset="0"/>
                               </a:rPr>
-                              <m:t>(2)</m:t>
+                              <m:t>(</m:t>
+                            </m:r>
+                            <m:r>
+                              <a:rPr sz="3600" i="1">
+                                <a:solidFill>
+                                  <a:srgbClr val="000000"/>
+                                </a:solidFill>
+                                <a:latin typeface="Cambria Math" panose="02040503050406030204" pitchFamily="18" charset="0"/>
+                              </a:rPr>
+                              <m:t>2</m:t>
+                            </m:r>
+                            <m:r>
+                              <a:rPr sz="3600" i="1">
+                                <a:solidFill>
+                                  <a:srgbClr val="000000"/>
+                                </a:solidFill>
+                                <a:latin typeface="Cambria Math" panose="02040503050406030204" pitchFamily="18" charset="0"/>
+                              </a:rPr>
+                              <m:t>)</m:t>
                             </m:r>
                           </m:sup>
                         </m:sSubSup>
@@ -50050,7 +52224,25 @@
                                 </a:solidFill>
                                 <a:latin typeface="Cambria Math" panose="02040503050406030204" pitchFamily="18" charset="0"/>
                               </a:rPr>
-                              <m:t>(2)</m:t>
+                              <m:t>(</m:t>
+                            </m:r>
+                            <m:r>
+                              <a:rPr sz="3600" i="1">
+                                <a:solidFill>
+                                  <a:srgbClr val="000000"/>
+                                </a:solidFill>
+                                <a:latin typeface="Cambria Math" panose="02040503050406030204" pitchFamily="18" charset="0"/>
+                              </a:rPr>
+                              <m:t>2</m:t>
+                            </m:r>
+                            <m:r>
+                              <a:rPr sz="3600" i="1">
+                                <a:solidFill>
+                                  <a:srgbClr val="000000"/>
+                                </a:solidFill>
+                                <a:latin typeface="Cambria Math" panose="02040503050406030204" pitchFamily="18" charset="0"/>
+                              </a:rPr>
+                              <m:t>)</m:t>
                             </m:r>
                           </m:sup>
                         </m:sSubSup>
@@ -50188,7 +52380,25 @@
                                 </a:solidFill>
                                 <a:latin typeface="Cambria Math" panose="02040503050406030204" pitchFamily="18" charset="0"/>
                               </a:rPr>
-                              <m:t>(1)</m:t>
+                              <m:t>(</m:t>
+                            </m:r>
+                            <m:r>
+                              <a:rPr sz="3600" i="1">
+                                <a:solidFill>
+                                  <a:srgbClr val="000000"/>
+                                </a:solidFill>
+                                <a:latin typeface="Cambria Math" panose="02040503050406030204" pitchFamily="18" charset="0"/>
+                              </a:rPr>
+                              <m:t>1</m:t>
+                            </m:r>
+                            <m:r>
+                              <a:rPr sz="3600" i="1">
+                                <a:solidFill>
+                                  <a:srgbClr val="000000"/>
+                                </a:solidFill>
+                                <a:latin typeface="Cambria Math" panose="02040503050406030204" pitchFamily="18" charset="0"/>
+                              </a:rPr>
+                              <m:t>)</m:t>
                             </m:r>
                           </m:sup>
                         </m:sSubSup>
@@ -50326,7 +52536,25 @@
                                 </a:solidFill>
                                 <a:latin typeface="Cambria Math" panose="02040503050406030204" pitchFamily="18" charset="0"/>
                               </a:rPr>
-                              <m:t>(1)</m:t>
+                              <m:t>(</m:t>
+                            </m:r>
+                            <m:r>
+                              <a:rPr sz="3600" i="1">
+                                <a:solidFill>
+                                  <a:srgbClr val="000000"/>
+                                </a:solidFill>
+                                <a:latin typeface="Cambria Math" panose="02040503050406030204" pitchFamily="18" charset="0"/>
+                              </a:rPr>
+                              <m:t>1</m:t>
+                            </m:r>
+                            <m:r>
+                              <a:rPr sz="3600" i="1">
+                                <a:solidFill>
+                                  <a:srgbClr val="000000"/>
+                                </a:solidFill>
+                                <a:latin typeface="Cambria Math" panose="02040503050406030204" pitchFamily="18" charset="0"/>
+                              </a:rPr>
+                              <m:t>)</m:t>
                             </m:r>
                           </m:sup>
                         </m:sSubSup>
@@ -50464,7 +52692,25 @@
                                 </a:solidFill>
                                 <a:latin typeface="Cambria Math" panose="02040503050406030204" pitchFamily="18" charset="0"/>
                               </a:rPr>
-                              <m:t>(1)</m:t>
+                              <m:t>(</m:t>
+                            </m:r>
+                            <m:r>
+                              <a:rPr sz="3600" i="1">
+                                <a:solidFill>
+                                  <a:srgbClr val="000000"/>
+                                </a:solidFill>
+                                <a:latin typeface="Cambria Math" panose="02040503050406030204" pitchFamily="18" charset="0"/>
+                              </a:rPr>
+                              <m:t>1</m:t>
+                            </m:r>
+                            <m:r>
+                              <a:rPr sz="3600" i="1">
+                                <a:solidFill>
+                                  <a:srgbClr val="000000"/>
+                                </a:solidFill>
+                                <a:latin typeface="Cambria Math" panose="02040503050406030204" pitchFamily="18" charset="0"/>
+                              </a:rPr>
+                              <m:t>)</m:t>
                             </m:r>
                           </m:sup>
                         </m:sSubSup>
@@ -50602,7 +52848,25 @@
                                 </a:solidFill>
                                 <a:latin typeface="Cambria Math" panose="02040503050406030204" pitchFamily="18" charset="0"/>
                               </a:rPr>
-                              <m:t>(1)</m:t>
+                              <m:t>(</m:t>
+                            </m:r>
+                            <m:r>
+                              <a:rPr sz="3600" i="1">
+                                <a:solidFill>
+                                  <a:srgbClr val="000000"/>
+                                </a:solidFill>
+                                <a:latin typeface="Cambria Math" panose="02040503050406030204" pitchFamily="18" charset="0"/>
+                              </a:rPr>
+                              <m:t>1</m:t>
+                            </m:r>
+                            <m:r>
+                              <a:rPr sz="3600" i="1">
+                                <a:solidFill>
+                                  <a:srgbClr val="000000"/>
+                                </a:solidFill>
+                                <a:latin typeface="Cambria Math" panose="02040503050406030204" pitchFamily="18" charset="0"/>
+                              </a:rPr>
+                              <m:t>)</m:t>
                             </m:r>
                           </m:sup>
                         </m:sSubSup>

</xml_diff>